<commit_message>
updating slides and adding video link
</commit_message>
<xml_diff>
--- a/ClassMaterials/Inheritance/Slides/Inheritance.pptx
+++ b/ClassMaterials/Inheritance/Slides/Inheritance.pptx
@@ -5,10 +5,10 @@
     <p:sldMasterId id="2147484251" r:id="rId1"/>
   </p:sldMasterIdLst>
   <p:notesMasterIdLst>
-    <p:notesMasterId r:id="rId22"/>
+    <p:notesMasterId r:id="rId23"/>
   </p:notesMasterIdLst>
   <p:handoutMasterIdLst>
-    <p:handoutMasterId r:id="rId23"/>
+    <p:handoutMasterId r:id="rId24"/>
   </p:handoutMasterIdLst>
   <p:sldIdLst>
     <p:sldId id="256" r:id="rId2"/>
@@ -23,14 +23,15 @@
     <p:sldId id="375" r:id="rId11"/>
     <p:sldId id="376" r:id="rId12"/>
     <p:sldId id="387" r:id="rId13"/>
-    <p:sldId id="377" r:id="rId14"/>
-    <p:sldId id="378" r:id="rId15"/>
-    <p:sldId id="380" r:id="rId16"/>
-    <p:sldId id="389" r:id="rId17"/>
-    <p:sldId id="379" r:id="rId18"/>
-    <p:sldId id="388" r:id="rId19"/>
-    <p:sldId id="381" r:id="rId20"/>
-    <p:sldId id="390" r:id="rId21"/>
+    <p:sldId id="391" r:id="rId14"/>
+    <p:sldId id="377" r:id="rId15"/>
+    <p:sldId id="378" r:id="rId16"/>
+    <p:sldId id="380" r:id="rId17"/>
+    <p:sldId id="389" r:id="rId18"/>
+    <p:sldId id="379" r:id="rId19"/>
+    <p:sldId id="388" r:id="rId20"/>
+    <p:sldId id="381" r:id="rId21"/>
+    <p:sldId id="390" r:id="rId22"/>
   </p:sldIdLst>
   <p:sldSz cx="9144000" cy="6858000" type="screen4x3"/>
   <p:notesSz cx="7010400" cy="9296400"/>
@@ -295,7 +296,7 @@
               <a:pPr>
                 <a:defRPr/>
               </a:pPr>
-              <a:t>1/21/2020</a:t>
+              <a:t>4/19/2020</a:t>
             </a:fld>
             <a:endParaRPr lang="en-US"/>
           </a:p>
@@ -530,7 +531,7 @@
               <a:pPr>
                 <a:defRPr/>
               </a:pPr>
-              <a:t>1/21/2020</a:t>
+              <a:t>4/19/2020</a:t>
             </a:fld>
             <a:endParaRPr lang="en-US"/>
           </a:p>
@@ -1549,7 +1550,7 @@
             <a:fld id="{AEF60CBC-2A70-49D3-9866-05F00BCCB9E5}" type="slidenum">
               <a:rPr lang="en-US" smtClean="0"/>
               <a:pPr/>
-              <a:t>13</a:t>
+              <a:t>14</a:t>
             </a:fld>
             <a:endParaRPr lang="en-US" smtClean="0"/>
           </a:p>
@@ -1660,7 +1661,7 @@
             <a:fld id="{AE88C4F2-B63F-49B5-8554-101017854A6D}" type="slidenum">
               <a:rPr lang="en-US" smtClean="0"/>
               <a:pPr/>
-              <a:t>14</a:t>
+              <a:t>15</a:t>
             </a:fld>
             <a:endParaRPr lang="en-US" smtClean="0"/>
           </a:p>
@@ -1760,7 +1761,7 @@
             <a:fld id="{D52993E5-32C8-4EC2-BBC6-DB69025B6125}" type="slidenum">
               <a:rPr lang="en-US" smtClean="0"/>
               <a:pPr/>
-              <a:t>15</a:t>
+              <a:t>16</a:t>
             </a:fld>
             <a:endParaRPr lang="en-US" smtClean="0"/>
           </a:p>
@@ -1906,7 +1907,7 @@
               <a:pPr>
                 <a:defRPr/>
               </a:pPr>
-              <a:t>16</a:t>
+              <a:t>17</a:t>
             </a:fld>
             <a:endParaRPr lang="en-US"/>
           </a:p>
@@ -2041,7 +2042,7 @@
               <a:pPr>
                 <a:defRPr/>
               </a:pPr>
-              <a:t>17</a:t>
+              <a:t>18</a:t>
             </a:fld>
             <a:endParaRPr lang="en-US"/>
           </a:p>
@@ -2690,7 +2691,7 @@
               <a:pPr>
                 <a:defRPr/>
               </a:pPr>
-              <a:t>18</a:t>
+              <a:t>19</a:t>
             </a:fld>
             <a:endParaRPr lang="en-US"/>
           </a:p>
@@ -2782,7 +2783,7 @@
               <a:pPr>
                 <a:defRPr/>
               </a:pPr>
-              <a:t>19</a:t>
+              <a:t>20</a:t>
             </a:fld>
             <a:endParaRPr lang="en-US"/>
           </a:p>
@@ -4303,7 +4304,7 @@
               <a:pPr>
                 <a:defRPr/>
               </a:pPr>
-              <a:t>Tuesday, January 21, 2020</a:t>
+              <a:t>Sunday, April 19, 2020</a:t>
             </a:fld>
             <a:endParaRPr lang="en-US" dirty="0"/>
           </a:p>
@@ -4488,7 +4489,7 @@
               <a:pPr>
                 <a:defRPr/>
               </a:pPr>
-              <a:t>Tuesday, January 21, 2020</a:t>
+              <a:t>Sunday, April 19, 2020</a:t>
             </a:fld>
             <a:endParaRPr lang="en-US" dirty="0"/>
           </a:p>
@@ -4683,7 +4684,7 @@
               <a:pPr>
                 <a:defRPr/>
               </a:pPr>
-              <a:t>Tuesday, January 21, 2020</a:t>
+              <a:t>Sunday, April 19, 2020</a:t>
             </a:fld>
             <a:endParaRPr lang="en-US" dirty="0"/>
           </a:p>
@@ -4868,7 +4869,7 @@
               <a:pPr>
                 <a:defRPr/>
               </a:pPr>
-              <a:t>Tuesday, January 21, 2020</a:t>
+              <a:t>Sunday, April 19, 2020</a:t>
             </a:fld>
             <a:endParaRPr lang="en-US" dirty="0"/>
           </a:p>
@@ -5129,7 +5130,7 @@
               <a:pPr>
                 <a:defRPr/>
               </a:pPr>
-              <a:t>Tuesday, January 21, 2020</a:t>
+              <a:t>Sunday, April 19, 2020</a:t>
             </a:fld>
             <a:endParaRPr lang="en-US"/>
           </a:p>
@@ -5432,7 +5433,7 @@
               <a:pPr>
                 <a:defRPr/>
               </a:pPr>
-              <a:t>Tuesday, January 21, 2020</a:t>
+              <a:t>Sunday, April 19, 2020</a:t>
             </a:fld>
             <a:endParaRPr lang="en-US"/>
           </a:p>
@@ -5869,7 +5870,7 @@
               <a:pPr>
                 <a:defRPr/>
               </a:pPr>
-              <a:t>Tuesday, January 21, 2020</a:t>
+              <a:t>Sunday, April 19, 2020</a:t>
             </a:fld>
             <a:endParaRPr lang="en-US"/>
           </a:p>
@@ -6002,7 +6003,7 @@
               <a:pPr>
                 <a:defRPr/>
               </a:pPr>
-              <a:t>Tuesday, January 21, 2020</a:t>
+              <a:t>Sunday, April 19, 2020</a:t>
             </a:fld>
             <a:endParaRPr lang="en-US"/>
           </a:p>
@@ -6112,7 +6113,7 @@
               <a:pPr>
                 <a:defRPr/>
               </a:pPr>
-              <a:t>Tuesday, January 21, 2020</a:t>
+              <a:t>Sunday, April 19, 2020</a:t>
             </a:fld>
             <a:endParaRPr lang="en-US" dirty="0"/>
           </a:p>
@@ -6404,7 +6405,7 @@
               <a:pPr>
                 <a:defRPr/>
               </a:pPr>
-              <a:t>Tuesday, January 21, 2020</a:t>
+              <a:t>Sunday, April 19, 2020</a:t>
             </a:fld>
             <a:endParaRPr lang="en-US"/>
           </a:p>
@@ -6672,7 +6673,7 @@
               <a:pPr>
                 <a:defRPr/>
               </a:pPr>
-              <a:t>Tuesday, January 21, 2020</a:t>
+              <a:t>Sunday, April 19, 2020</a:t>
             </a:fld>
             <a:endParaRPr lang="en-US"/>
           </a:p>
@@ -6900,7 +6901,7 @@
               <a:pPr>
                 <a:defRPr/>
               </a:pPr>
-              <a:t>Tuesday, January 21, 2020</a:t>
+              <a:t>Sunday, April 19, 2020</a:t>
             </a:fld>
             <a:endParaRPr lang="en-US" dirty="0"/>
           </a:p>
@@ -7507,21 +7508,8 @@
                   <a:schemeClr val="accent3"/>
                 </a:solidFill>
               </a:rPr>
-              <a:t>Only have access to protected, public, and package level </a:t>
-            </a:r>
-            <a:r>
-              <a:rPr lang="en-US" dirty="0" smtClean="0">
-                <a:solidFill>
-                  <a:schemeClr val="accent3"/>
-                </a:solidFill>
-              </a:rPr>
-              <a:t>fields</a:t>
-            </a:r>
-            <a:endParaRPr lang="en-US" dirty="0" smtClean="0">
-              <a:solidFill>
-                <a:schemeClr val="accent3"/>
-              </a:solidFill>
-            </a:endParaRPr>
+              <a:t>Only have access to protected, public, and package level fields</a:t>
+            </a:r>
           </a:p>
           <a:p>
             <a:pPr lvl="1">
@@ -8131,13 +8119,8 @@
             <a:pPr lvl="1"/>
             <a:r>
               <a:rPr lang="en-US" sz="2000" dirty="0" smtClean="0"/>
-              <a:t>5 cost </a:t>
-            </a:r>
-            <a:r>
-              <a:rPr lang="en-US" sz="2000" dirty="0" smtClean="0"/>
-              <a:t>$3.00</a:t>
-            </a:r>
-            <a:endParaRPr lang="en-US" sz="2000" dirty="0" smtClean="0"/>
+              <a:t>5 cost $3.00</a:t>
+            </a:r>
           </a:p>
           <a:p>
             <a:r>
@@ -8194,7 +8177,7 @@
       </p:grpSpPr>
       <p:sp>
         <p:nvSpPr>
-          <p:cNvPr id="3" name="Title 2"/>
+          <p:cNvPr id="2" name="Title 1"/>
           <p:cNvSpPr>
             <a:spLocks noGrp="1"/>
           </p:cNvSpPr>
@@ -8207,12 +8190,9 @@
           <a:bodyPr/>
           <a:lstStyle/>
           <a:p>
-            <a:pPr>
-              <a:defRPr/>
-            </a:pPr>
             <a:r>
               <a:rPr lang="en-US" dirty="0" smtClean="0"/>
-              <a:t>Polymorphism and Subclasses</a:t>
+              <a:t>Design to Implement</a:t>
             </a:r>
             <a:endParaRPr lang="en-US" dirty="0"/>
           </a:p>
@@ -8220,7 +8200,7 @@
       </p:sp>
       <p:sp>
         <p:nvSpPr>
-          <p:cNvPr id="2" name="Content Placeholder 1"/>
+          <p:cNvPr id="3" name="Content Placeholder 2"/>
           <p:cNvSpPr>
             <a:spLocks noGrp="1"/>
           </p:cNvSpPr>
@@ -8230,334 +8210,66 @@
         </p:nvSpPr>
         <p:spPr/>
         <p:txBody>
-          <a:bodyPr>
-            <a:normAutofit fontScale="85000" lnSpcReduction="10000"/>
-          </a:bodyPr>
-          <a:lstStyle/>
-          <a:p>
-            <a:pPr>
-              <a:defRPr/>
-            </a:pPr>
-            <a:r>
-              <a:rPr lang="en-US" dirty="0" smtClean="0"/>
-              <a:t>A subclass instance </a:t>
-            </a:r>
-            <a:r>
-              <a:rPr lang="en-US" b="1" dirty="0" smtClean="0"/>
-              <a:t>is a</a:t>
-            </a:r>
-            <a:r>
-              <a:rPr lang="en-US" dirty="0" smtClean="0"/>
-              <a:t> </a:t>
-            </a:r>
-            <a:r>
-              <a:rPr lang="en-US" dirty="0" err="1" smtClean="0"/>
-              <a:t>superclass</a:t>
-            </a:r>
-            <a:r>
-              <a:rPr lang="en-US" dirty="0" smtClean="0"/>
-              <a:t> instance</a:t>
-            </a:r>
-          </a:p>
-          <a:p>
-            <a:pPr lvl="1">
-              <a:defRPr/>
-            </a:pPr>
-            <a:r>
-              <a:rPr lang="en-US" dirty="0" smtClean="0"/>
-              <a:t>Polymorphism still works!</a:t>
-            </a:r>
-          </a:p>
-          <a:p>
-            <a:pPr lvl="1">
-              <a:defRPr/>
-            </a:pPr>
-            <a:r>
-              <a:rPr lang="en-US" b="1" dirty="0" err="1" smtClean="0">
-                <a:solidFill>
-                  <a:schemeClr val="accent3"/>
-                </a:solidFill>
-                <a:latin typeface="Lucida Sans Typewriter" pitchFamily="49" charset="0"/>
-              </a:rPr>
-              <a:t>BankAccount</a:t>
-            </a:r>
-            <a:r>
-              <a:rPr lang="en-US" b="1" dirty="0" smtClean="0">
-                <a:solidFill>
-                  <a:schemeClr val="accent3"/>
-                </a:solidFill>
-                <a:latin typeface="Lucida Sans Typewriter" pitchFamily="49" charset="0"/>
-              </a:rPr>
-              <a:t> </a:t>
-            </a:r>
-            <a:r>
-              <a:rPr lang="en-US" b="1" dirty="0" err="1" smtClean="0">
-                <a:solidFill>
-                  <a:schemeClr val="accent3"/>
-                </a:solidFill>
-                <a:latin typeface="Lucida Sans Typewriter" pitchFamily="49" charset="0"/>
-              </a:rPr>
-              <a:t>ba</a:t>
-            </a:r>
-            <a:r>
-              <a:rPr lang="en-US" b="1" dirty="0" smtClean="0">
-                <a:solidFill>
-                  <a:schemeClr val="accent3"/>
-                </a:solidFill>
-                <a:latin typeface="Lucida Sans Typewriter" pitchFamily="49" charset="0"/>
-              </a:rPr>
-              <a:t> = new </a:t>
-            </a:r>
-            <a:r>
-              <a:rPr lang="en-US" b="1" dirty="0" err="1" smtClean="0">
-                <a:solidFill>
-                  <a:schemeClr val="accent3"/>
-                </a:solidFill>
-                <a:latin typeface="Lucida Sans Typewriter" pitchFamily="49" charset="0"/>
-              </a:rPr>
-              <a:t>CheckingAccount</a:t>
-            </a:r>
-            <a:r>
-              <a:rPr lang="en-US" b="1" dirty="0" smtClean="0">
-                <a:solidFill>
-                  <a:schemeClr val="accent3"/>
-                </a:solidFill>
-                <a:latin typeface="Lucida Sans Typewriter" pitchFamily="49" charset="0"/>
-              </a:rPr>
-              <a:t>();</a:t>
-            </a:r>
-            <a:br>
-              <a:rPr lang="en-US" b="1" dirty="0" smtClean="0">
-                <a:solidFill>
-                  <a:schemeClr val="accent3"/>
-                </a:solidFill>
-                <a:latin typeface="Lucida Sans Typewriter" pitchFamily="49" charset="0"/>
-              </a:rPr>
-            </a:br>
-            <a:r>
-              <a:rPr lang="en-US" b="1" dirty="0" smtClean="0">
-                <a:solidFill>
-                  <a:schemeClr val="accent3"/>
-                </a:solidFill>
-                <a:latin typeface="Lucida Sans Typewriter" pitchFamily="49" charset="0"/>
-              </a:rPr>
-              <a:t>ba.deposit(100);</a:t>
-            </a:r>
-          </a:p>
-          <a:p>
-            <a:pPr lvl="1">
-              <a:defRPr/>
-            </a:pPr>
-            <a:endParaRPr lang="en-US" dirty="0" smtClean="0"/>
-          </a:p>
-          <a:p>
-            <a:pPr>
-              <a:defRPr/>
-            </a:pPr>
-            <a:r>
-              <a:rPr lang="en-US" dirty="0" smtClean="0"/>
-              <a:t>But not the other way around!</a:t>
-            </a:r>
-          </a:p>
-          <a:p>
-            <a:pPr lvl="1">
-              <a:defRPr/>
-            </a:pPr>
-            <a:r>
-              <a:rPr lang="en-US" b="1" dirty="0" err="1" smtClean="0">
-                <a:solidFill>
-                  <a:schemeClr val="accent2"/>
-                </a:solidFill>
-                <a:latin typeface="Lucida Sans Typewriter" pitchFamily="49" charset="0"/>
-              </a:rPr>
-              <a:t>CheckingAccount</a:t>
-            </a:r>
-            <a:r>
-              <a:rPr lang="en-US" b="1" dirty="0" smtClean="0">
-                <a:solidFill>
-                  <a:schemeClr val="accent2"/>
-                </a:solidFill>
-                <a:latin typeface="Lucida Sans Typewriter" pitchFamily="49" charset="0"/>
-              </a:rPr>
-              <a:t> ca = new </a:t>
-            </a:r>
-            <a:r>
-              <a:rPr lang="en-US" b="1" dirty="0" err="1" smtClean="0">
-                <a:solidFill>
-                  <a:schemeClr val="accent2"/>
-                </a:solidFill>
-                <a:latin typeface="Lucida Sans Typewriter" pitchFamily="49" charset="0"/>
-              </a:rPr>
-              <a:t>BankAccount</a:t>
-            </a:r>
-            <a:r>
-              <a:rPr lang="en-US" b="1" dirty="0" smtClean="0">
-                <a:solidFill>
-                  <a:schemeClr val="accent2"/>
-                </a:solidFill>
-                <a:latin typeface="Lucida Sans Typewriter" pitchFamily="49" charset="0"/>
-              </a:rPr>
-              <a:t>();</a:t>
-            </a:r>
-            <a:br>
-              <a:rPr lang="en-US" b="1" dirty="0" smtClean="0">
-                <a:solidFill>
-                  <a:schemeClr val="accent2"/>
-                </a:solidFill>
-                <a:latin typeface="Lucida Sans Typewriter" pitchFamily="49" charset="0"/>
-              </a:rPr>
-            </a:br>
-            <a:r>
-              <a:rPr lang="en-US" b="1" dirty="0" err="1" smtClean="0">
-                <a:solidFill>
-                  <a:schemeClr val="accent2"/>
-                </a:solidFill>
-                <a:latin typeface="Lucida Sans Typewriter" pitchFamily="49" charset="0"/>
-              </a:rPr>
-              <a:t>ca.deductFees</a:t>
-            </a:r>
-            <a:r>
-              <a:rPr lang="en-US" b="1" dirty="0" smtClean="0">
-                <a:solidFill>
-                  <a:schemeClr val="accent2"/>
-                </a:solidFill>
-                <a:latin typeface="Lucida Sans Typewriter" pitchFamily="49" charset="0"/>
-              </a:rPr>
-              <a:t>();</a:t>
-            </a:r>
-          </a:p>
-          <a:p>
-            <a:pPr lvl="1">
-              <a:defRPr/>
-            </a:pPr>
-            <a:endParaRPr lang="en-US" dirty="0" smtClean="0"/>
-          </a:p>
-          <a:p>
-            <a:pPr>
-              <a:defRPr/>
-            </a:pPr>
-            <a:r>
-              <a:rPr lang="en-US" dirty="0" smtClean="0"/>
-              <a:t>Why not?</a:t>
-            </a:r>
-          </a:p>
-        </p:txBody>
-      </p:sp>
-      <p:sp>
-        <p:nvSpPr>
-          <p:cNvPr id="4" name="Line Callout 2 3"/>
-          <p:cNvSpPr/>
+          <a:bodyPr/>
+          <a:lstStyle/>
+          <a:p>
+            <a:r>
+              <a:rPr lang="en-US" dirty="0" err="1" smtClean="0">
+                <a:hlinkClick r:id="rId2"/>
+              </a:rPr>
+              <a:t>plantuml</a:t>
+            </a:r>
+            <a:endParaRPr lang="en-US" dirty="0"/>
+          </a:p>
+        </p:txBody>
+      </p:sp>
+      <p:pic>
+        <p:nvPicPr>
+          <p:cNvPr id="2054" name="Picture 6" descr="PlantUML diagram"/>
+          <p:cNvPicPr>
+            <a:picLocks noChangeAspect="1" noChangeArrowheads="1"/>
+          </p:cNvPicPr>
           <p:nvPr/>
-        </p:nvSpPr>
-        <p:spPr>
-          <a:xfrm>
-            <a:off x="5334000" y="4991100"/>
-            <a:ext cx="1905000" cy="1016000"/>
-          </a:xfrm>
-          <a:prstGeom prst="borderCallout2">
-            <a:avLst>
-              <a:gd name="adj1" fmla="val 18750"/>
-              <a:gd name="adj2" fmla="val -8333"/>
-              <a:gd name="adj3" fmla="val 18750"/>
-              <a:gd name="adj4" fmla="val -16667"/>
-              <a:gd name="adj5" fmla="val -56448"/>
-              <a:gd name="adj6" fmla="val -58870"/>
-            </a:avLst>
-          </a:prstGeom>
-        </p:spPr>
-        <p:style>
-          <a:lnRef idx="1">
-            <a:schemeClr val="accent2"/>
-          </a:lnRef>
-          <a:fillRef idx="3">
-            <a:schemeClr val="accent2"/>
-          </a:fillRef>
-          <a:effectRef idx="2">
-            <a:schemeClr val="accent2"/>
-          </a:effectRef>
-          <a:fontRef idx="minor">
-            <a:schemeClr val="lt1"/>
-          </a:fontRef>
-        </p:style>
-        <p:txBody>
-          <a:bodyPr anchor="ctr"/>
-          <a:lstStyle/>
-          <a:p>
-            <a:pPr algn="ctr">
-              <a:defRPr/>
-            </a:pPr>
-            <a:r>
-              <a:rPr lang="en-US" sz="2800" dirty="0"/>
-              <a:t>BOOM!</a:t>
-            </a:r>
-          </a:p>
-        </p:txBody>
-      </p:sp>
-      <p:sp>
-        <p:nvSpPr>
-          <p:cNvPr id="7" name="Rectangle 9"/>
-          <p:cNvSpPr>
-            <a:spLocks/>
-          </p:cNvSpPr>
-          <p:nvPr/>
-        </p:nvSpPr>
+        </p:nvPicPr>
+        <p:blipFill>
+          <a:blip r:embed="rId3">
+            <a:extLst>
+              <a:ext uri="{28A0092B-C50C-407E-A947-70E740481C1C}">
+                <a14:useLocalDpi xmlns:a14="http://schemas.microsoft.com/office/drawing/2010/main" val="0"/>
+              </a:ext>
+            </a:extLst>
+          </a:blip>
+          <a:srcRect/>
+          <a:stretch>
+            <a:fillRect/>
+          </a:stretch>
+        </p:blipFill>
         <p:spPr bwMode="auto">
           <a:xfrm>
-            <a:off x="8432800" y="6334564"/>
-            <a:ext cx="558800" cy="419100"/>
+            <a:off x="2590800" y="1752600"/>
+            <a:ext cx="5081588" cy="4732984"/>
           </a:xfrm>
           <a:prstGeom prst="rect">
             <a:avLst/>
           </a:prstGeom>
-          <a:ln>
-            <a:headEnd/>
-            <a:tailEnd/>
-          </a:ln>
+          <a:noFill/>
+          <a:extLst>
+            <a:ext uri="{909E8E84-426E-40DD-AFC4-6F175D3DCCD1}">
+              <a14:hiddenFill xmlns:a14="http://schemas.microsoft.com/office/drawing/2010/main">
+                <a:solidFill>
+                  <a:srgbClr val="FFFFFF"/>
+                </a:solidFill>
+              </a14:hiddenFill>
+            </a:ext>
+          </a:extLst>
         </p:spPr>
-        <p:style>
-          <a:lnRef idx="2">
-            <a:schemeClr val="accent3">
-              <a:shade val="50000"/>
-            </a:schemeClr>
-          </a:lnRef>
-          <a:fillRef idx="1">
-            <a:schemeClr val="accent3"/>
-          </a:fillRef>
-          <a:effectRef idx="0">
-            <a:schemeClr val="accent3"/>
-          </a:effectRef>
-          <a:fontRef idx="minor">
-            <a:schemeClr val="lt1"/>
-          </a:fontRef>
-        </p:style>
-        <p:txBody>
-          <a:bodyPr lIns="0" tIns="0" rIns="0" bIns="0" anchor="ctr"/>
-          <a:lstStyle/>
-          <a:p>
-            <a:pPr algn="ctr">
-              <a:defRPr/>
-            </a:pPr>
-            <a:r>
-              <a:rPr lang="en-US" sz="1800" dirty="0" smtClean="0">
-                <a:solidFill>
-                  <a:schemeClr val="bg1"/>
-                </a:solidFill>
-                <a:cs typeface="Arial" pitchFamily="34" charset="0"/>
-                <a:sym typeface="Arial" pitchFamily="34" charset="0"/>
-              </a:rPr>
-              <a:t>Q6</a:t>
-            </a:r>
-            <a:endParaRPr lang="en-US" sz="1800" dirty="0">
-              <a:solidFill>
-                <a:schemeClr val="bg1"/>
-              </a:solidFill>
-              <a:cs typeface="Arial" pitchFamily="34" charset="0"/>
-              <a:sym typeface="Arial" pitchFamily="34" charset="0"/>
-            </a:endParaRPr>
-          </a:p>
-        </p:txBody>
-      </p:sp>
+      </p:pic>
     </p:spTree>
+    <p:extLst>
+      <p:ext uri="{BB962C8B-B14F-4D97-AF65-F5344CB8AC3E}">
+        <p14:creationId xmlns:p14="http://schemas.microsoft.com/office/powerpoint/2010/main" val="2922646918"/>
+      </p:ext>
+    </p:extLst>
   </p:cSld>
   <p:clrMapOvr>
     <a:masterClrMapping/>
@@ -8609,7 +8321,7 @@
             </a:pPr>
             <a:r>
               <a:rPr lang="en-US" dirty="0" smtClean="0"/>
-              <a:t>Another Example</a:t>
+              <a:t>Polymorphism and Subclasses</a:t>
             </a:r>
             <a:endParaRPr lang="en-US" dirty="0"/>
           </a:p>
@@ -8627,7 +8339,9 @@
         </p:nvSpPr>
         <p:spPr/>
         <p:txBody>
-          <a:bodyPr/>
+          <a:bodyPr>
+            <a:normAutofit fontScale="85000" lnSpcReduction="10000"/>
+          </a:bodyPr>
           <a:lstStyle/>
           <a:p>
             <a:pPr>
@@ -8635,7 +8349,23 @@
             </a:pPr>
             <a:r>
               <a:rPr lang="en-US" dirty="0" smtClean="0"/>
-              <a:t>Can use:</a:t>
+              <a:t>A subclass instance </a:t>
+            </a:r>
+            <a:r>
+              <a:rPr lang="en-US" b="1" dirty="0" smtClean="0"/>
+              <a:t>is a</a:t>
+            </a:r>
+            <a:r>
+              <a:rPr lang="en-US" dirty="0" smtClean="0"/>
+              <a:t> </a:t>
+            </a:r>
+            <a:r>
+              <a:rPr lang="en-US" dirty="0" err="1" smtClean="0"/>
+              <a:t>superclass</a:t>
+            </a:r>
+            <a:r>
+              <a:rPr lang="en-US" dirty="0" smtClean="0"/>
+              <a:t> instance</a:t>
             </a:r>
           </a:p>
           <a:p>
@@ -8643,232 +8373,296 @@
               <a:defRPr/>
             </a:pPr>
             <a:r>
-              <a:rPr lang="en-US" sz="2000" b="1" dirty="0" smtClean="0">
+              <a:rPr lang="en-US" dirty="0" smtClean="0"/>
+              <a:t>Polymorphism still works!</a:t>
+            </a:r>
+          </a:p>
+          <a:p>
+            <a:pPr lvl="1">
+              <a:defRPr/>
+            </a:pPr>
+            <a:r>
+              <a:rPr lang="en-US" b="1" dirty="0" err="1" smtClean="0">
                 <a:solidFill>
                   <a:schemeClr val="accent3"/>
                 </a:solidFill>
                 <a:latin typeface="Lucida Sans Typewriter" pitchFamily="49" charset="0"/>
               </a:rPr>
-              <a:t>public void transfer(double amount, </a:t>
-            </a:r>
-            <a:r>
-              <a:rPr lang="en-US" sz="2000" b="1" dirty="0" err="1" smtClean="0">
+              <a:t>BankAccount</a:t>
+            </a:r>
+            <a:r>
+              <a:rPr lang="en-US" b="1" dirty="0" smtClean="0">
                 <a:solidFill>
                   <a:schemeClr val="accent3"/>
                 </a:solidFill>
                 <a:latin typeface="Lucida Sans Typewriter" pitchFamily="49" charset="0"/>
               </a:rPr>
+              <a:t> </a:t>
+            </a:r>
+            <a:r>
+              <a:rPr lang="en-US" b="1" dirty="0" err="1" smtClean="0">
+                <a:solidFill>
+                  <a:schemeClr val="accent3"/>
+                </a:solidFill>
+                <a:latin typeface="Lucida Sans Typewriter" pitchFamily="49" charset="0"/>
+              </a:rPr>
+              <a:t>ba</a:t>
+            </a:r>
+            <a:r>
+              <a:rPr lang="en-US" b="1" dirty="0" smtClean="0">
+                <a:solidFill>
+                  <a:schemeClr val="accent3"/>
+                </a:solidFill>
+                <a:latin typeface="Lucida Sans Typewriter" pitchFamily="49" charset="0"/>
+              </a:rPr>
+              <a:t> = new </a:t>
+            </a:r>
+            <a:r>
+              <a:rPr lang="en-US" b="1" dirty="0" err="1" smtClean="0">
+                <a:solidFill>
+                  <a:schemeClr val="accent3"/>
+                </a:solidFill>
+                <a:latin typeface="Lucida Sans Typewriter" pitchFamily="49" charset="0"/>
+              </a:rPr>
+              <a:t>CheckingAccount</a:t>
+            </a:r>
+            <a:r>
+              <a:rPr lang="en-US" b="1" dirty="0" smtClean="0">
+                <a:solidFill>
+                  <a:schemeClr val="accent3"/>
+                </a:solidFill>
+                <a:latin typeface="Lucida Sans Typewriter" pitchFamily="49" charset="0"/>
+              </a:rPr>
+              <a:t>();</a:t>
+            </a:r>
+            <a:br>
+              <a:rPr lang="en-US" b="1" dirty="0" smtClean="0">
+                <a:solidFill>
+                  <a:schemeClr val="accent3"/>
+                </a:solidFill>
+                <a:latin typeface="Lucida Sans Typewriter" pitchFamily="49" charset="0"/>
+              </a:rPr>
+            </a:br>
+            <a:r>
+              <a:rPr lang="en-US" b="1" dirty="0" smtClean="0">
+                <a:solidFill>
+                  <a:schemeClr val="accent3"/>
+                </a:solidFill>
+                <a:latin typeface="Lucida Sans Typewriter" pitchFamily="49" charset="0"/>
+              </a:rPr>
+              <a:t>ba.deposit(100);</a:t>
+            </a:r>
+          </a:p>
+          <a:p>
+            <a:pPr lvl="1">
+              <a:defRPr/>
+            </a:pPr>
+            <a:endParaRPr lang="en-US" dirty="0" smtClean="0"/>
+          </a:p>
+          <a:p>
+            <a:pPr>
+              <a:defRPr/>
+            </a:pPr>
+            <a:r>
+              <a:rPr lang="en-US" dirty="0" smtClean="0"/>
+              <a:t>But not the other way around!</a:t>
+            </a:r>
+          </a:p>
+          <a:p>
+            <a:pPr lvl="1">
+              <a:defRPr/>
+            </a:pPr>
+            <a:r>
+              <a:rPr lang="en-US" b="1" dirty="0" err="1" smtClean="0">
+                <a:solidFill>
+                  <a:schemeClr val="accent2"/>
+                </a:solidFill>
+                <a:latin typeface="Lucida Sans Typewriter" pitchFamily="49" charset="0"/>
+              </a:rPr>
+              <a:t>CheckingAccount</a:t>
+            </a:r>
+            <a:r>
+              <a:rPr lang="en-US" b="1" dirty="0" smtClean="0">
+                <a:solidFill>
+                  <a:schemeClr val="accent2"/>
+                </a:solidFill>
+                <a:latin typeface="Lucida Sans Typewriter" pitchFamily="49" charset="0"/>
+              </a:rPr>
+              <a:t> ca = new </a:t>
+            </a:r>
+            <a:r>
+              <a:rPr lang="en-US" b="1" dirty="0" err="1" smtClean="0">
+                <a:solidFill>
+                  <a:schemeClr val="accent2"/>
+                </a:solidFill>
+                <a:latin typeface="Lucida Sans Typewriter" pitchFamily="49" charset="0"/>
+              </a:rPr>
               <a:t>BankAccount</a:t>
             </a:r>
             <a:r>
-              <a:rPr lang="en-US" sz="2000" b="1" dirty="0" smtClean="0">
-                <a:solidFill>
-                  <a:schemeClr val="accent3"/>
+              <a:rPr lang="en-US" b="1" dirty="0" smtClean="0">
+                <a:solidFill>
+                  <a:schemeClr val="accent2"/>
                 </a:solidFill>
                 <a:latin typeface="Lucida Sans Typewriter" pitchFamily="49" charset="0"/>
               </a:rPr>
-              <a:t> o){</a:t>
+              <a:t>();</a:t>
             </a:r>
             <a:br>
-              <a:rPr lang="en-US" sz="2000" b="1" dirty="0" smtClean="0">
-                <a:solidFill>
-                  <a:schemeClr val="accent3"/>
+              <a:rPr lang="en-US" b="1" dirty="0" smtClean="0">
+                <a:solidFill>
+                  <a:schemeClr val="accent2"/>
                 </a:solidFill>
                 <a:latin typeface="Lucida Sans Typewriter" pitchFamily="49" charset="0"/>
               </a:rPr>
             </a:br>
             <a:r>
-              <a:rPr lang="en-US" sz="2000" b="1" dirty="0" smtClean="0">
-                <a:solidFill>
-                  <a:schemeClr val="accent3"/>
+              <a:rPr lang="en-US" b="1" dirty="0" err="1" smtClean="0">
+                <a:solidFill>
+                  <a:schemeClr val="accent2"/>
                 </a:solidFill>
                 <a:latin typeface="Lucida Sans Typewriter" pitchFamily="49" charset="0"/>
               </a:rPr>
-              <a:t>    </a:t>
-            </a:r>
-            <a:r>
-              <a:rPr lang="en-US" sz="2000" b="1" dirty="0" err="1" smtClean="0">
-                <a:solidFill>
-                  <a:schemeClr val="accent3"/>
+              <a:t>ca.deductFees</a:t>
+            </a:r>
+            <a:r>
+              <a:rPr lang="en-US" b="1" dirty="0" smtClean="0">
+                <a:solidFill>
+                  <a:schemeClr val="accent2"/>
                 </a:solidFill>
                 <a:latin typeface="Lucida Sans Typewriter" pitchFamily="49" charset="0"/>
               </a:rPr>
-              <a:t>this.withdraw</a:t>
-            </a:r>
-            <a:r>
-              <a:rPr lang="en-US" sz="2000" b="1" dirty="0" smtClean="0">
-                <a:solidFill>
-                  <a:schemeClr val="accent3"/>
-                </a:solidFill>
-                <a:latin typeface="Lucida Sans Typewriter" pitchFamily="49" charset="0"/>
-              </a:rPr>
-              <a:t>(amount);</a:t>
-            </a:r>
-            <a:br>
-              <a:rPr lang="en-US" sz="2000" b="1" dirty="0" smtClean="0">
-                <a:solidFill>
-                  <a:schemeClr val="accent3"/>
-                </a:solidFill>
-                <a:latin typeface="Lucida Sans Typewriter" pitchFamily="49" charset="0"/>
-              </a:rPr>
-            </a:br>
-            <a:r>
-              <a:rPr lang="en-US" sz="2000" b="1" dirty="0" smtClean="0">
-                <a:solidFill>
-                  <a:schemeClr val="accent3"/>
-                </a:solidFill>
-                <a:latin typeface="Lucida Sans Typewriter" pitchFamily="49" charset="0"/>
-              </a:rPr>
-              <a:t>    </a:t>
-            </a:r>
-            <a:r>
-              <a:rPr lang="en-US" sz="2000" b="1" dirty="0" err="1" smtClean="0">
-                <a:solidFill>
-                  <a:schemeClr val="accent3"/>
-                </a:solidFill>
-                <a:latin typeface="Lucida Sans Typewriter" pitchFamily="49" charset="0"/>
-              </a:rPr>
-              <a:t>o.deposit</a:t>
-            </a:r>
-            <a:r>
-              <a:rPr lang="en-US" sz="2000" b="1" dirty="0" smtClean="0">
-                <a:solidFill>
-                  <a:schemeClr val="accent3"/>
-                </a:solidFill>
-                <a:latin typeface="Lucida Sans Typewriter" pitchFamily="49" charset="0"/>
-              </a:rPr>
-              <a:t>(amount);</a:t>
-            </a:r>
-            <a:br>
-              <a:rPr lang="en-US" sz="2000" b="1" dirty="0" smtClean="0">
-                <a:solidFill>
-                  <a:schemeClr val="accent3"/>
-                </a:solidFill>
-                <a:latin typeface="Lucida Sans Typewriter" pitchFamily="49" charset="0"/>
-              </a:rPr>
-            </a:br>
-            <a:r>
-              <a:rPr lang="en-US" sz="2000" b="1" dirty="0" smtClean="0">
-                <a:solidFill>
-                  <a:schemeClr val="accent3"/>
-                </a:solidFill>
-                <a:latin typeface="Lucida Sans Typewriter" pitchFamily="49" charset="0"/>
-              </a:rPr>
-              <a:t>}</a:t>
-            </a:r>
+              <a:t>();</a:t>
+            </a:r>
+          </a:p>
+          <a:p>
+            <a:pPr lvl="1">
+              <a:defRPr/>
+            </a:pPr>
+            <a:endParaRPr lang="en-US" dirty="0" smtClean="0"/>
+          </a:p>
+          <a:p>
+            <a:pPr>
+              <a:defRPr/>
+            </a:pPr>
             <a:r>
               <a:rPr lang="en-US" dirty="0" smtClean="0"/>
-              <a:t/>
-            </a:r>
-            <a:br>
-              <a:rPr lang="en-US" dirty="0" smtClean="0"/>
-            </a:br>
-            <a:r>
-              <a:rPr lang="en-US" dirty="0" smtClean="0"/>
-              <a:t>in </a:t>
-            </a:r>
-            <a:r>
-              <a:rPr lang="en-US" dirty="0" err="1" smtClean="0"/>
-              <a:t>BankAccount</a:t>
-            </a:r>
-            <a:endParaRPr lang="en-US" dirty="0" smtClean="0"/>
-          </a:p>
-          <a:p>
-            <a:pPr>
-              <a:defRPr/>
-            </a:pPr>
-            <a:r>
-              <a:rPr lang="en-US" dirty="0" smtClean="0"/>
-              <a:t>To transfer between different accounts:</a:t>
-            </a:r>
-          </a:p>
-          <a:p>
-            <a:pPr lvl="1">
-              <a:defRPr/>
-            </a:pPr>
-            <a:r>
-              <a:rPr lang="en-US" sz="2000" b="1" dirty="0" err="1" smtClean="0">
-                <a:solidFill>
-                  <a:schemeClr val="accent3"/>
-                </a:solidFill>
-                <a:latin typeface="Lucida Sans Typewriter" pitchFamily="49" charset="0"/>
-              </a:rPr>
-              <a:t>SavingsAccount</a:t>
-            </a:r>
-            <a:r>
-              <a:rPr lang="en-US" sz="2000" b="1" dirty="0" smtClean="0">
-                <a:solidFill>
-                  <a:schemeClr val="accent3"/>
-                </a:solidFill>
-                <a:latin typeface="Lucida Sans Typewriter" pitchFamily="49" charset="0"/>
-              </a:rPr>
-              <a:t> </a:t>
-            </a:r>
-            <a:r>
-              <a:rPr lang="en-US" sz="2000" b="1" dirty="0" err="1" smtClean="0">
-                <a:solidFill>
-                  <a:schemeClr val="accent3"/>
-                </a:solidFill>
-                <a:latin typeface="Lucida Sans Typewriter" pitchFamily="49" charset="0"/>
-              </a:rPr>
-              <a:t>sa</a:t>
-            </a:r>
-            <a:r>
-              <a:rPr lang="en-US" sz="2000" b="1" dirty="0" smtClean="0">
-                <a:solidFill>
-                  <a:schemeClr val="accent3"/>
-                </a:solidFill>
-                <a:latin typeface="Lucida Sans Typewriter" pitchFamily="49" charset="0"/>
-              </a:rPr>
-              <a:t> = …;</a:t>
-            </a:r>
-          </a:p>
-          <a:p>
-            <a:pPr lvl="1">
-              <a:defRPr/>
-            </a:pPr>
-            <a:r>
-              <a:rPr lang="en-US" sz="2000" b="1" dirty="0" err="1" smtClean="0">
-                <a:solidFill>
-                  <a:schemeClr val="accent3"/>
-                </a:solidFill>
-                <a:latin typeface="Lucida Sans Typewriter" pitchFamily="49" charset="0"/>
-              </a:rPr>
-              <a:t>CheckingAccount</a:t>
-            </a:r>
-            <a:r>
-              <a:rPr lang="en-US" sz="2000" b="1" dirty="0" smtClean="0">
-                <a:solidFill>
-                  <a:schemeClr val="accent3"/>
-                </a:solidFill>
-                <a:latin typeface="Lucida Sans Typewriter" pitchFamily="49" charset="0"/>
-              </a:rPr>
-              <a:t> ca = …;</a:t>
-            </a:r>
-          </a:p>
-          <a:p>
-            <a:pPr lvl="1">
-              <a:defRPr/>
-            </a:pPr>
-            <a:r>
-              <a:rPr lang="en-US" sz="2000" b="1" dirty="0" err="1" smtClean="0">
-                <a:solidFill>
-                  <a:schemeClr val="accent3"/>
-                </a:solidFill>
-                <a:latin typeface="Lucida Sans Typewriter" pitchFamily="49" charset="0"/>
-              </a:rPr>
-              <a:t>sa.transfer</a:t>
-            </a:r>
-            <a:r>
-              <a:rPr lang="en-US" sz="2000" b="1" dirty="0" smtClean="0">
-                <a:solidFill>
-                  <a:schemeClr val="accent3"/>
-                </a:solidFill>
-                <a:latin typeface="Lucida Sans Typewriter" pitchFamily="49" charset="0"/>
-              </a:rPr>
-              <a:t>(100, ca);</a:t>
-            </a:r>
-            <a:endParaRPr lang="en-US" sz="2000" dirty="0"/>
+              <a:t>Why not?</a:t>
+            </a:r>
+          </a:p>
+        </p:txBody>
+      </p:sp>
+      <p:sp>
+        <p:nvSpPr>
+          <p:cNvPr id="4" name="Line Callout 2 3"/>
+          <p:cNvSpPr/>
+          <p:nvPr/>
+        </p:nvSpPr>
+        <p:spPr>
+          <a:xfrm>
+            <a:off x="5334000" y="4991100"/>
+            <a:ext cx="1905000" cy="1016000"/>
+          </a:xfrm>
+          <a:prstGeom prst="borderCallout2">
+            <a:avLst>
+              <a:gd name="adj1" fmla="val 18750"/>
+              <a:gd name="adj2" fmla="val -8333"/>
+              <a:gd name="adj3" fmla="val 18750"/>
+              <a:gd name="adj4" fmla="val -16667"/>
+              <a:gd name="adj5" fmla="val -56448"/>
+              <a:gd name="adj6" fmla="val -58870"/>
+            </a:avLst>
+          </a:prstGeom>
+        </p:spPr>
+        <p:style>
+          <a:lnRef idx="1">
+            <a:schemeClr val="accent2"/>
+          </a:lnRef>
+          <a:fillRef idx="3">
+            <a:schemeClr val="accent2"/>
+          </a:fillRef>
+          <a:effectRef idx="2">
+            <a:schemeClr val="accent2"/>
+          </a:effectRef>
+          <a:fontRef idx="minor">
+            <a:schemeClr val="lt1"/>
+          </a:fontRef>
+        </p:style>
+        <p:txBody>
+          <a:bodyPr anchor="ctr"/>
+          <a:lstStyle/>
+          <a:p>
+            <a:pPr algn="ctr">
+              <a:defRPr/>
+            </a:pPr>
+            <a:r>
+              <a:rPr lang="en-US" sz="2800" dirty="0"/>
+              <a:t>BOOM!</a:t>
+            </a:r>
+          </a:p>
+        </p:txBody>
+      </p:sp>
+      <p:sp>
+        <p:nvSpPr>
+          <p:cNvPr id="7" name="Rectangle 9"/>
+          <p:cNvSpPr>
+            <a:spLocks/>
+          </p:cNvSpPr>
+          <p:nvPr/>
+        </p:nvSpPr>
+        <p:spPr bwMode="auto">
+          <a:xfrm>
+            <a:off x="8432800" y="6334564"/>
+            <a:ext cx="558800" cy="419100"/>
+          </a:xfrm>
+          <a:prstGeom prst="rect">
+            <a:avLst/>
+          </a:prstGeom>
+          <a:ln>
+            <a:headEnd/>
+            <a:tailEnd/>
+          </a:ln>
+        </p:spPr>
+        <p:style>
+          <a:lnRef idx="2">
+            <a:schemeClr val="accent3">
+              <a:shade val="50000"/>
+            </a:schemeClr>
+          </a:lnRef>
+          <a:fillRef idx="1">
+            <a:schemeClr val="accent3"/>
+          </a:fillRef>
+          <a:effectRef idx="0">
+            <a:schemeClr val="accent3"/>
+          </a:effectRef>
+          <a:fontRef idx="minor">
+            <a:schemeClr val="lt1"/>
+          </a:fontRef>
+        </p:style>
+        <p:txBody>
+          <a:bodyPr lIns="0" tIns="0" rIns="0" bIns="0" anchor="ctr"/>
+          <a:lstStyle/>
+          <a:p>
+            <a:pPr algn="ctr">
+              <a:defRPr/>
+            </a:pPr>
+            <a:r>
+              <a:rPr lang="en-US" sz="1800" dirty="0" smtClean="0">
+                <a:solidFill>
+                  <a:schemeClr val="bg1"/>
+                </a:solidFill>
+                <a:cs typeface="Arial" pitchFamily="34" charset="0"/>
+                <a:sym typeface="Arial" pitchFamily="34" charset="0"/>
+              </a:rPr>
+              <a:t>Q6</a:t>
+            </a:r>
+            <a:endParaRPr lang="en-US" sz="1800" dirty="0">
+              <a:solidFill>
+                <a:schemeClr val="bg1"/>
+              </a:solidFill>
+              <a:cs typeface="Arial" pitchFamily="34" charset="0"/>
+              <a:sym typeface="Arial" pitchFamily="34" charset="0"/>
+            </a:endParaRPr>
           </a:p>
         </p:txBody>
       </p:sp>
@@ -8924,7 +8718,7 @@
             </a:pPr>
             <a:r>
               <a:rPr lang="en-US" dirty="0" smtClean="0"/>
-              <a:t>Access Modifiers</a:t>
+              <a:t>Another Example</a:t>
             </a:r>
             <a:endParaRPr lang="en-US" dirty="0"/>
           </a:p>
@@ -8942,142 +8736,200 @@
         </p:nvSpPr>
         <p:spPr/>
         <p:txBody>
-          <a:bodyPr>
-            <a:normAutofit fontScale="85000" lnSpcReduction="20000"/>
-          </a:bodyPr>
-          <a:lstStyle/>
+          <a:bodyPr/>
+          <a:lstStyle/>
+          <a:p>
+            <a:pPr>
+              <a:defRPr/>
+            </a:pPr>
+            <a:r>
+              <a:rPr lang="en-US" dirty="0" smtClean="0"/>
+              <a:t>Can use:</a:t>
+            </a:r>
+          </a:p>
           <a:p>
             <a:pPr lvl="1">
               <a:defRPr/>
             </a:pPr>
             <a:r>
-              <a:rPr lang="en-US" b="1" dirty="0" smtClean="0">
+              <a:rPr lang="en-US" sz="2000" b="1" dirty="0" smtClean="0">
                 <a:solidFill>
                   <a:schemeClr val="accent3"/>
                 </a:solidFill>
                 <a:latin typeface="Lucida Sans Typewriter" pitchFamily="49" charset="0"/>
               </a:rPr>
-              <a:t>public</a:t>
+              <a:t>public void transfer(double amount, </a:t>
+            </a:r>
+            <a:r>
+              <a:rPr lang="en-US" sz="2000" b="1" dirty="0" err="1" smtClean="0">
+                <a:solidFill>
+                  <a:schemeClr val="accent3"/>
+                </a:solidFill>
+                <a:latin typeface="Lucida Sans Typewriter" pitchFamily="49" charset="0"/>
+              </a:rPr>
+              <a:t>BankAccount</a:t>
+            </a:r>
+            <a:r>
+              <a:rPr lang="en-US" sz="2000" b="1" dirty="0" smtClean="0">
+                <a:solidFill>
+                  <a:schemeClr val="accent3"/>
+                </a:solidFill>
+                <a:latin typeface="Lucida Sans Typewriter" pitchFamily="49" charset="0"/>
+              </a:rPr>
+              <a:t> o){</a:t>
+            </a:r>
+            <a:br>
+              <a:rPr lang="en-US" sz="2000" b="1" dirty="0" smtClean="0">
+                <a:solidFill>
+                  <a:schemeClr val="accent3"/>
+                </a:solidFill>
+                <a:latin typeface="Lucida Sans Typewriter" pitchFamily="49" charset="0"/>
+              </a:rPr>
+            </a:br>
+            <a:r>
+              <a:rPr lang="en-US" sz="2000" b="1" dirty="0" smtClean="0">
+                <a:solidFill>
+                  <a:schemeClr val="accent3"/>
+                </a:solidFill>
+                <a:latin typeface="Lucida Sans Typewriter" pitchFamily="49" charset="0"/>
+              </a:rPr>
+              <a:t>    </a:t>
+            </a:r>
+            <a:r>
+              <a:rPr lang="en-US" sz="2000" b="1" dirty="0" err="1" smtClean="0">
+                <a:solidFill>
+                  <a:schemeClr val="accent3"/>
+                </a:solidFill>
+                <a:latin typeface="Lucida Sans Typewriter" pitchFamily="49" charset="0"/>
+              </a:rPr>
+              <a:t>this.withdraw</a:t>
+            </a:r>
+            <a:r>
+              <a:rPr lang="en-US" sz="2000" b="1" dirty="0" smtClean="0">
+                <a:solidFill>
+                  <a:schemeClr val="accent3"/>
+                </a:solidFill>
+                <a:latin typeface="Lucida Sans Typewriter" pitchFamily="49" charset="0"/>
+              </a:rPr>
+              <a:t>(amount);</a:t>
+            </a:r>
+            <a:br>
+              <a:rPr lang="en-US" sz="2000" b="1" dirty="0" smtClean="0">
+                <a:solidFill>
+                  <a:schemeClr val="accent3"/>
+                </a:solidFill>
+                <a:latin typeface="Lucida Sans Typewriter" pitchFamily="49" charset="0"/>
+              </a:rPr>
+            </a:br>
+            <a:r>
+              <a:rPr lang="en-US" sz="2000" b="1" dirty="0" smtClean="0">
+                <a:solidFill>
+                  <a:schemeClr val="accent3"/>
+                </a:solidFill>
+                <a:latin typeface="Lucida Sans Typewriter" pitchFamily="49" charset="0"/>
+              </a:rPr>
+              <a:t>    </a:t>
+            </a:r>
+            <a:r>
+              <a:rPr lang="en-US" sz="2000" b="1" dirty="0" err="1" smtClean="0">
+                <a:solidFill>
+                  <a:schemeClr val="accent3"/>
+                </a:solidFill>
+                <a:latin typeface="Lucida Sans Typewriter" pitchFamily="49" charset="0"/>
+              </a:rPr>
+              <a:t>o.deposit</a:t>
+            </a:r>
+            <a:r>
+              <a:rPr lang="en-US" sz="2000" b="1" dirty="0" smtClean="0">
+                <a:solidFill>
+                  <a:schemeClr val="accent3"/>
+                </a:solidFill>
+                <a:latin typeface="Lucida Sans Typewriter" pitchFamily="49" charset="0"/>
+              </a:rPr>
+              <a:t>(amount);</a:t>
+            </a:r>
+            <a:br>
+              <a:rPr lang="en-US" sz="2000" b="1" dirty="0" smtClean="0">
+                <a:solidFill>
+                  <a:schemeClr val="accent3"/>
+                </a:solidFill>
+                <a:latin typeface="Lucida Sans Typewriter" pitchFamily="49" charset="0"/>
+              </a:rPr>
+            </a:br>
+            <a:r>
+              <a:rPr lang="en-US" sz="2000" b="1" dirty="0" smtClean="0">
+                <a:solidFill>
+                  <a:schemeClr val="accent3"/>
+                </a:solidFill>
+                <a:latin typeface="Lucida Sans Typewriter" pitchFamily="49" charset="0"/>
+              </a:rPr>
+              <a:t>}</a:t>
             </a:r>
             <a:r>
               <a:rPr lang="en-US" dirty="0" smtClean="0"/>
-              <a:t>—any code can see it</a:t>
-            </a:r>
-          </a:p>
-          <a:p>
-            <a:pPr lvl="1">
-              <a:defRPr/>
-            </a:pPr>
-            <a:r>
-              <a:rPr lang="en-US" b="1" dirty="0" smtClean="0">
-                <a:solidFill>
-                  <a:schemeClr val="accent3"/>
-                </a:solidFill>
-                <a:latin typeface="Lucida Sans Typewriter" pitchFamily="49" charset="0"/>
-              </a:rPr>
-              <a:t>protected</a:t>
-            </a:r>
-            <a:r>
-              <a:rPr lang="en-US" dirty="0" smtClean="0"/>
-              <a:t>— package and subclasses can see it</a:t>
-            </a:r>
-          </a:p>
-          <a:p>
-            <a:pPr lvl="1">
-              <a:defRPr/>
-            </a:pPr>
-            <a:r>
-              <a:rPr lang="en-US" b="1" dirty="0" smtClean="0">
-                <a:solidFill>
-                  <a:schemeClr val="accent3"/>
-                </a:solidFill>
-                <a:latin typeface="Lucida Sans Typewriter" pitchFamily="49" charset="0"/>
-              </a:rPr>
-              <a:t>default</a:t>
-            </a:r>
-            <a:r>
-              <a:rPr lang="en-US" dirty="0" smtClean="0"/>
-              <a:t>—anything in the package can see it</a:t>
-            </a:r>
-            <a:endParaRPr lang="en-US" b="1" dirty="0" smtClean="0">
-              <a:solidFill>
-                <a:schemeClr val="accent3"/>
-              </a:solidFill>
-              <a:latin typeface="Lucida Sans Typewriter" pitchFamily="49" charset="0"/>
-            </a:endParaRPr>
-          </a:p>
-          <a:p>
-            <a:pPr lvl="1">
-              <a:defRPr/>
-            </a:pPr>
-            <a:r>
-              <a:rPr lang="en-US" b="1" dirty="0" smtClean="0">
-                <a:solidFill>
-                  <a:schemeClr val="accent3"/>
-                </a:solidFill>
-                <a:latin typeface="Lucida Sans Typewriter" pitchFamily="49" charset="0"/>
-              </a:rPr>
-              <a:t>private</a:t>
-            </a:r>
-            <a:r>
-              <a:rPr lang="en-US" dirty="0" smtClean="0"/>
-              <a:t>—only the class itself can see it</a:t>
-            </a:r>
-          </a:p>
-          <a:p>
-            <a:pPr lvl="1">
-              <a:defRPr/>
-            </a:pPr>
-            <a:endParaRPr lang="en-US" dirty="0" smtClean="0"/>
-          </a:p>
-          <a:p>
-            <a:pPr>
-              <a:defRPr/>
-            </a:pPr>
-            <a:r>
-              <a:rPr lang="en-US" dirty="0" smtClean="0"/>
-              <a:t>Notes:</a:t>
-            </a:r>
-          </a:p>
-          <a:p>
-            <a:pPr lvl="1">
-              <a:defRPr/>
-            </a:pPr>
-            <a:r>
-              <a:rPr lang="en-US" b="1" dirty="0" smtClean="0"/>
-              <a:t>default</a:t>
-            </a:r>
-            <a:r>
-              <a:rPr lang="en-US" dirty="0" smtClean="0"/>
-              <a:t> (i.e., no modifier)—only code </a:t>
+              <a:t/>
             </a:r>
             <a:br>
               <a:rPr lang="en-US" dirty="0" smtClean="0"/>
             </a:br>
             <a:r>
               <a:rPr lang="en-US" dirty="0" smtClean="0"/>
-              <a:t>in the same </a:t>
-            </a:r>
-            <a:r>
-              <a:rPr lang="en-US" b="1" dirty="0" smtClean="0">
+              <a:t>in </a:t>
+            </a:r>
+            <a:r>
+              <a:rPr lang="en-US" dirty="0" err="1" smtClean="0"/>
+              <a:t>BankAccount</a:t>
+            </a:r>
+            <a:endParaRPr lang="en-US" dirty="0" smtClean="0"/>
+          </a:p>
+          <a:p>
+            <a:pPr>
+              <a:defRPr/>
+            </a:pPr>
+            <a:r>
+              <a:rPr lang="en-US" dirty="0" smtClean="0"/>
+              <a:t>To transfer between different accounts:</a:t>
+            </a:r>
+          </a:p>
+          <a:p>
+            <a:pPr lvl="1">
+              <a:defRPr/>
+            </a:pPr>
+            <a:r>
+              <a:rPr lang="en-US" sz="2000" b="1" dirty="0" err="1" smtClean="0">
                 <a:solidFill>
                   <a:schemeClr val="accent3"/>
                 </a:solidFill>
-              </a:rPr>
-              <a:t>package</a:t>
-            </a:r>
-            <a:r>
-              <a:rPr lang="en-US" dirty="0" smtClean="0"/>
-              <a:t> can see it</a:t>
-            </a:r>
-          </a:p>
-          <a:p>
-            <a:pPr lvl="2">
-              <a:defRPr/>
-            </a:pPr>
-            <a:r>
-              <a:rPr lang="en-US" dirty="0" smtClean="0"/>
-              <a:t>good choice for classes</a:t>
+                <a:latin typeface="Lucida Sans Typewriter" pitchFamily="49" charset="0"/>
+              </a:rPr>
+              <a:t>SavingsAccount</a:t>
+            </a:r>
+            <a:r>
+              <a:rPr lang="en-US" sz="2000" b="1" dirty="0" smtClean="0">
+                <a:solidFill>
+                  <a:schemeClr val="accent3"/>
+                </a:solidFill>
+                <a:latin typeface="Lucida Sans Typewriter" pitchFamily="49" charset="0"/>
+              </a:rPr>
+              <a:t> </a:t>
+            </a:r>
+            <a:r>
+              <a:rPr lang="en-US" sz="2000" b="1" dirty="0" err="1" smtClean="0">
+                <a:solidFill>
+                  <a:schemeClr val="accent3"/>
+                </a:solidFill>
+                <a:latin typeface="Lucida Sans Typewriter" pitchFamily="49" charset="0"/>
+              </a:rPr>
+              <a:t>sa</a:t>
+            </a:r>
+            <a:r>
+              <a:rPr lang="en-US" sz="2000" b="1" dirty="0" smtClean="0">
+                <a:solidFill>
+                  <a:schemeClr val="accent3"/>
+                </a:solidFill>
+                <a:latin typeface="Lucida Sans Typewriter" pitchFamily="49" charset="0"/>
+              </a:rPr>
+              <a:t> = …;</a:t>
             </a:r>
           </a:p>
           <a:p>
@@ -9085,182 +8937,47 @@
               <a:defRPr/>
             </a:pPr>
             <a:r>
-              <a:rPr lang="en-US" b="1" dirty="0" smtClean="0">
+              <a:rPr lang="en-US" sz="2000" b="1" dirty="0" err="1" smtClean="0">
                 <a:solidFill>
                   <a:schemeClr val="accent3"/>
                 </a:solidFill>
                 <a:latin typeface="Lucida Sans Typewriter" pitchFamily="49" charset="0"/>
               </a:rPr>
-              <a:t>protected</a:t>
-            </a:r>
-            <a:r>
-              <a:rPr lang="en-US" dirty="0" smtClean="0"/>
-              <a:t>—like default, but </a:t>
-            </a:r>
-            <a:br>
-              <a:rPr lang="en-US" dirty="0" smtClean="0"/>
-            </a:br>
-            <a:r>
-              <a:rPr lang="en-US" dirty="0" smtClean="0"/>
-              <a:t>subclasses also have access</a:t>
-            </a:r>
-          </a:p>
-          <a:p>
-            <a:pPr lvl="2">
-              <a:defRPr/>
-            </a:pPr>
-            <a:r>
-              <a:rPr lang="en-US" dirty="0" smtClean="0"/>
-              <a:t>sometimes useful for helper methods</a:t>
-            </a:r>
-            <a:endParaRPr lang="en-US" dirty="0"/>
-          </a:p>
-        </p:txBody>
-      </p:sp>
-      <p:sp>
-        <p:nvSpPr>
-          <p:cNvPr id="5" name="Right Brace 4"/>
-          <p:cNvSpPr/>
-          <p:nvPr/>
-        </p:nvSpPr>
-        <p:spPr>
-          <a:xfrm>
-            <a:off x="6553200" y="3505200"/>
-            <a:ext cx="533400" cy="2501900"/>
-          </a:xfrm>
-          <a:prstGeom prst="rightBrace">
-            <a:avLst/>
-          </a:prstGeom>
-        </p:spPr>
-        <p:style>
-          <a:lnRef idx="1">
-            <a:schemeClr val="accent2"/>
-          </a:lnRef>
-          <a:fillRef idx="0">
-            <a:schemeClr val="accent2"/>
-          </a:fillRef>
-          <a:effectRef idx="0">
-            <a:schemeClr val="accent2"/>
-          </a:effectRef>
-          <a:fontRef idx="minor">
-            <a:schemeClr val="tx1"/>
-          </a:fontRef>
-        </p:style>
-        <p:txBody>
-          <a:bodyPr anchor="ctr"/>
-          <a:lstStyle/>
-          <a:p>
-            <a:pPr algn="ctr">
-              <a:defRPr/>
-            </a:pPr>
-            <a:endParaRPr lang="en-US"/>
-          </a:p>
-        </p:txBody>
-      </p:sp>
-      <p:sp>
-        <p:nvSpPr>
-          <p:cNvPr id="6" name="Rounded Rectangle 5"/>
-          <p:cNvSpPr/>
-          <p:nvPr/>
-        </p:nvSpPr>
-        <p:spPr>
-          <a:xfrm>
-            <a:off x="7162800" y="3733800"/>
-            <a:ext cx="1371600" cy="2057400"/>
-          </a:xfrm>
-          <a:prstGeom prst="roundRect">
-            <a:avLst/>
-          </a:prstGeom>
-        </p:spPr>
-        <p:style>
-          <a:lnRef idx="1">
-            <a:schemeClr val="accent2"/>
-          </a:lnRef>
-          <a:fillRef idx="3">
-            <a:schemeClr val="accent2"/>
-          </a:fillRef>
-          <a:effectRef idx="2">
-            <a:schemeClr val="accent2"/>
-          </a:effectRef>
-          <a:fontRef idx="minor">
-            <a:schemeClr val="lt1"/>
-          </a:fontRef>
-        </p:style>
-        <p:txBody>
-          <a:bodyPr anchor="ctr"/>
-          <a:lstStyle/>
-          <a:p>
-            <a:pPr algn="ctr">
-              <a:defRPr/>
-            </a:pPr>
-            <a:r>
-              <a:rPr lang="en-US" sz="2800" dirty="0"/>
-              <a:t>Bad for fields!</a:t>
-            </a:r>
-          </a:p>
-        </p:txBody>
-      </p:sp>
-      <p:sp>
-        <p:nvSpPr>
-          <p:cNvPr id="8" name="Rectangle 9"/>
-          <p:cNvSpPr>
-            <a:spLocks/>
-          </p:cNvSpPr>
-          <p:nvPr/>
-        </p:nvSpPr>
-        <p:spPr bwMode="auto">
-          <a:xfrm>
-            <a:off x="8432800" y="6334564"/>
-            <a:ext cx="558800" cy="419100"/>
-          </a:xfrm>
-          <a:prstGeom prst="rect">
-            <a:avLst/>
-          </a:prstGeom>
-          <a:ln>
-            <a:headEnd/>
-            <a:tailEnd/>
-          </a:ln>
-        </p:spPr>
-        <p:style>
-          <a:lnRef idx="2">
-            <a:schemeClr val="accent3">
-              <a:shade val="50000"/>
-            </a:schemeClr>
-          </a:lnRef>
-          <a:fillRef idx="1">
-            <a:schemeClr val="accent3"/>
-          </a:fillRef>
-          <a:effectRef idx="0">
-            <a:schemeClr val="accent3"/>
-          </a:effectRef>
-          <a:fontRef idx="minor">
-            <a:schemeClr val="lt1"/>
-          </a:fontRef>
-        </p:style>
-        <p:txBody>
-          <a:bodyPr lIns="0" tIns="0" rIns="0" bIns="0" anchor="ctr"/>
-          <a:lstStyle/>
-          <a:p>
-            <a:pPr algn="ctr">
-              <a:defRPr/>
-            </a:pPr>
-            <a:r>
-              <a:rPr lang="en-US" sz="1800" dirty="0" smtClean="0">
-                <a:solidFill>
-                  <a:schemeClr val="bg1"/>
-                </a:solidFill>
-                <a:cs typeface="Arial" pitchFamily="34" charset="0"/>
-                <a:sym typeface="Arial" pitchFamily="34" charset="0"/>
-              </a:rPr>
-              <a:t>Q7</a:t>
-            </a:r>
-            <a:endParaRPr lang="en-US" sz="1800" dirty="0">
-              <a:solidFill>
-                <a:schemeClr val="bg1"/>
-              </a:solidFill>
-              <a:cs typeface="Arial" pitchFamily="34" charset="0"/>
-              <a:sym typeface="Arial" pitchFamily="34" charset="0"/>
-            </a:endParaRPr>
+              <a:t>CheckingAccount</a:t>
+            </a:r>
+            <a:r>
+              <a:rPr lang="en-US" sz="2000" b="1" dirty="0" smtClean="0">
+                <a:solidFill>
+                  <a:schemeClr val="accent3"/>
+                </a:solidFill>
+                <a:latin typeface="Lucida Sans Typewriter" pitchFamily="49" charset="0"/>
+              </a:rPr>
+              <a:t> ca = …;</a:t>
+            </a:r>
+          </a:p>
+          <a:p>
+            <a:pPr lvl="1">
+              <a:defRPr/>
+            </a:pPr>
+            <a:r>
+              <a:rPr lang="en-US" sz="2000" b="1" dirty="0" err="1" smtClean="0">
+                <a:solidFill>
+                  <a:schemeClr val="accent3"/>
+                </a:solidFill>
+                <a:latin typeface="Lucida Sans Typewriter" pitchFamily="49" charset="0"/>
+              </a:rPr>
+              <a:t>sa.transfer</a:t>
+            </a:r>
+            <a:r>
+              <a:rPr lang="en-US" sz="2000" b="1" dirty="0" smtClean="0">
+                <a:solidFill>
+                  <a:schemeClr val="accent3"/>
+                </a:solidFill>
+                <a:latin typeface="Lucida Sans Typewriter" pitchFamily="49" charset="0"/>
+              </a:rPr>
+              <a:t>(100, ca);</a:t>
+            </a:r>
+            <a:endParaRPr lang="en-US" sz="2000" dirty="0"/>
           </a:p>
         </p:txBody>
       </p:sp>
@@ -9298,6 +9015,398 @@
       </p:grpSpPr>
       <p:sp>
         <p:nvSpPr>
+          <p:cNvPr id="3" name="Title 2"/>
+          <p:cNvSpPr>
+            <a:spLocks noGrp="1"/>
+          </p:cNvSpPr>
+          <p:nvPr>
+            <p:ph type="title"/>
+          </p:nvPr>
+        </p:nvSpPr>
+        <p:spPr/>
+        <p:txBody>
+          <a:bodyPr/>
+          <a:lstStyle/>
+          <a:p>
+            <a:pPr>
+              <a:defRPr/>
+            </a:pPr>
+            <a:r>
+              <a:rPr lang="en-US" dirty="0" smtClean="0"/>
+              <a:t>Access Modifiers</a:t>
+            </a:r>
+            <a:endParaRPr lang="en-US" dirty="0"/>
+          </a:p>
+        </p:txBody>
+      </p:sp>
+      <p:sp>
+        <p:nvSpPr>
+          <p:cNvPr id="2" name="Content Placeholder 1"/>
+          <p:cNvSpPr>
+            <a:spLocks noGrp="1"/>
+          </p:cNvSpPr>
+          <p:nvPr>
+            <p:ph idx="1"/>
+          </p:nvPr>
+        </p:nvSpPr>
+        <p:spPr/>
+        <p:txBody>
+          <a:bodyPr>
+            <a:normAutofit fontScale="85000" lnSpcReduction="20000"/>
+          </a:bodyPr>
+          <a:lstStyle/>
+          <a:p>
+            <a:pPr lvl="1">
+              <a:defRPr/>
+            </a:pPr>
+            <a:r>
+              <a:rPr lang="en-US" b="1" dirty="0" smtClean="0">
+                <a:solidFill>
+                  <a:schemeClr val="accent3"/>
+                </a:solidFill>
+                <a:latin typeface="Lucida Sans Typewriter" pitchFamily="49" charset="0"/>
+              </a:rPr>
+              <a:t>public</a:t>
+            </a:r>
+            <a:r>
+              <a:rPr lang="en-US" dirty="0" smtClean="0"/>
+              <a:t>—any code can see it</a:t>
+            </a:r>
+          </a:p>
+          <a:p>
+            <a:pPr lvl="1">
+              <a:defRPr/>
+            </a:pPr>
+            <a:r>
+              <a:rPr lang="en-US" b="1" dirty="0" smtClean="0">
+                <a:solidFill>
+                  <a:schemeClr val="accent3"/>
+                </a:solidFill>
+                <a:latin typeface="Lucida Sans Typewriter" pitchFamily="49" charset="0"/>
+              </a:rPr>
+              <a:t>protected</a:t>
+            </a:r>
+            <a:r>
+              <a:rPr lang="en-US" dirty="0" smtClean="0"/>
+              <a:t>— package and subclasses can see it</a:t>
+            </a:r>
+          </a:p>
+          <a:p>
+            <a:pPr lvl="1">
+              <a:defRPr/>
+            </a:pPr>
+            <a:r>
+              <a:rPr lang="en-US" b="1" dirty="0" smtClean="0">
+                <a:solidFill>
+                  <a:schemeClr val="accent3"/>
+                </a:solidFill>
+                <a:latin typeface="Lucida Sans Typewriter" pitchFamily="49" charset="0"/>
+              </a:rPr>
+              <a:t>default</a:t>
+            </a:r>
+            <a:r>
+              <a:rPr lang="en-US" dirty="0" smtClean="0"/>
+              <a:t>—anything in the package can see it</a:t>
+            </a:r>
+            <a:endParaRPr lang="en-US" b="1" dirty="0" smtClean="0">
+              <a:solidFill>
+                <a:schemeClr val="accent3"/>
+              </a:solidFill>
+              <a:latin typeface="Lucida Sans Typewriter" pitchFamily="49" charset="0"/>
+            </a:endParaRPr>
+          </a:p>
+          <a:p>
+            <a:pPr lvl="1">
+              <a:defRPr/>
+            </a:pPr>
+            <a:r>
+              <a:rPr lang="en-US" b="1" dirty="0" smtClean="0">
+                <a:solidFill>
+                  <a:schemeClr val="accent3"/>
+                </a:solidFill>
+                <a:latin typeface="Lucida Sans Typewriter" pitchFamily="49" charset="0"/>
+              </a:rPr>
+              <a:t>private</a:t>
+            </a:r>
+            <a:r>
+              <a:rPr lang="en-US" dirty="0" smtClean="0"/>
+              <a:t>—only the class itself can see it</a:t>
+            </a:r>
+          </a:p>
+          <a:p>
+            <a:pPr lvl="1">
+              <a:defRPr/>
+            </a:pPr>
+            <a:endParaRPr lang="en-US" dirty="0" smtClean="0"/>
+          </a:p>
+          <a:p>
+            <a:pPr>
+              <a:defRPr/>
+            </a:pPr>
+            <a:r>
+              <a:rPr lang="en-US" dirty="0" smtClean="0"/>
+              <a:t>Notes:</a:t>
+            </a:r>
+          </a:p>
+          <a:p>
+            <a:pPr lvl="1">
+              <a:defRPr/>
+            </a:pPr>
+            <a:r>
+              <a:rPr lang="en-US" b="1" dirty="0" smtClean="0"/>
+              <a:t>default</a:t>
+            </a:r>
+            <a:r>
+              <a:rPr lang="en-US" dirty="0" smtClean="0"/>
+              <a:t> (i.e., no modifier)—only code </a:t>
+            </a:r>
+            <a:br>
+              <a:rPr lang="en-US" dirty="0" smtClean="0"/>
+            </a:br>
+            <a:r>
+              <a:rPr lang="en-US" dirty="0" smtClean="0"/>
+              <a:t>in the same </a:t>
+            </a:r>
+            <a:r>
+              <a:rPr lang="en-US" b="1" dirty="0" smtClean="0">
+                <a:solidFill>
+                  <a:schemeClr val="accent3"/>
+                </a:solidFill>
+              </a:rPr>
+              <a:t>package</a:t>
+            </a:r>
+            <a:r>
+              <a:rPr lang="en-US" dirty="0" smtClean="0"/>
+              <a:t> can see it</a:t>
+            </a:r>
+          </a:p>
+          <a:p>
+            <a:pPr lvl="2">
+              <a:defRPr/>
+            </a:pPr>
+            <a:r>
+              <a:rPr lang="en-US" dirty="0" smtClean="0"/>
+              <a:t>good choice for classes</a:t>
+            </a:r>
+          </a:p>
+          <a:p>
+            <a:pPr lvl="1">
+              <a:defRPr/>
+            </a:pPr>
+            <a:r>
+              <a:rPr lang="en-US" b="1" dirty="0" smtClean="0">
+                <a:solidFill>
+                  <a:schemeClr val="accent3"/>
+                </a:solidFill>
+                <a:latin typeface="Lucida Sans Typewriter" pitchFamily="49" charset="0"/>
+              </a:rPr>
+              <a:t>protected</a:t>
+            </a:r>
+            <a:r>
+              <a:rPr lang="en-US" dirty="0" smtClean="0"/>
+              <a:t>—like default, but </a:t>
+            </a:r>
+            <a:br>
+              <a:rPr lang="en-US" dirty="0" smtClean="0"/>
+            </a:br>
+            <a:r>
+              <a:rPr lang="en-US" dirty="0" smtClean="0"/>
+              <a:t>subclasses also have access</a:t>
+            </a:r>
+          </a:p>
+          <a:p>
+            <a:pPr lvl="2">
+              <a:defRPr/>
+            </a:pPr>
+            <a:r>
+              <a:rPr lang="en-US" dirty="0" smtClean="0"/>
+              <a:t>sometimes useful for helper methods</a:t>
+            </a:r>
+            <a:endParaRPr lang="en-US" dirty="0"/>
+          </a:p>
+        </p:txBody>
+      </p:sp>
+      <p:sp>
+        <p:nvSpPr>
+          <p:cNvPr id="5" name="Right Brace 4"/>
+          <p:cNvSpPr/>
+          <p:nvPr/>
+        </p:nvSpPr>
+        <p:spPr>
+          <a:xfrm>
+            <a:off x="6553200" y="3505200"/>
+            <a:ext cx="533400" cy="2501900"/>
+          </a:xfrm>
+          <a:prstGeom prst="rightBrace">
+            <a:avLst/>
+          </a:prstGeom>
+        </p:spPr>
+        <p:style>
+          <a:lnRef idx="1">
+            <a:schemeClr val="accent2"/>
+          </a:lnRef>
+          <a:fillRef idx="0">
+            <a:schemeClr val="accent2"/>
+          </a:fillRef>
+          <a:effectRef idx="0">
+            <a:schemeClr val="accent2"/>
+          </a:effectRef>
+          <a:fontRef idx="minor">
+            <a:schemeClr val="tx1"/>
+          </a:fontRef>
+        </p:style>
+        <p:txBody>
+          <a:bodyPr anchor="ctr"/>
+          <a:lstStyle/>
+          <a:p>
+            <a:pPr algn="ctr">
+              <a:defRPr/>
+            </a:pPr>
+            <a:endParaRPr lang="en-US"/>
+          </a:p>
+        </p:txBody>
+      </p:sp>
+      <p:sp>
+        <p:nvSpPr>
+          <p:cNvPr id="6" name="Rounded Rectangle 5"/>
+          <p:cNvSpPr/>
+          <p:nvPr/>
+        </p:nvSpPr>
+        <p:spPr>
+          <a:xfrm>
+            <a:off x="7162800" y="3733800"/>
+            <a:ext cx="1371600" cy="2057400"/>
+          </a:xfrm>
+          <a:prstGeom prst="roundRect">
+            <a:avLst/>
+          </a:prstGeom>
+        </p:spPr>
+        <p:style>
+          <a:lnRef idx="1">
+            <a:schemeClr val="accent2"/>
+          </a:lnRef>
+          <a:fillRef idx="3">
+            <a:schemeClr val="accent2"/>
+          </a:fillRef>
+          <a:effectRef idx="2">
+            <a:schemeClr val="accent2"/>
+          </a:effectRef>
+          <a:fontRef idx="minor">
+            <a:schemeClr val="lt1"/>
+          </a:fontRef>
+        </p:style>
+        <p:txBody>
+          <a:bodyPr anchor="ctr"/>
+          <a:lstStyle/>
+          <a:p>
+            <a:pPr algn="ctr">
+              <a:defRPr/>
+            </a:pPr>
+            <a:r>
+              <a:rPr lang="en-US" sz="2800" dirty="0"/>
+              <a:t>Bad for fields!</a:t>
+            </a:r>
+          </a:p>
+        </p:txBody>
+      </p:sp>
+      <p:sp>
+        <p:nvSpPr>
+          <p:cNvPr id="8" name="Rectangle 9"/>
+          <p:cNvSpPr>
+            <a:spLocks/>
+          </p:cNvSpPr>
+          <p:nvPr/>
+        </p:nvSpPr>
+        <p:spPr bwMode="auto">
+          <a:xfrm>
+            <a:off x="8432800" y="6334564"/>
+            <a:ext cx="558800" cy="419100"/>
+          </a:xfrm>
+          <a:prstGeom prst="rect">
+            <a:avLst/>
+          </a:prstGeom>
+          <a:ln>
+            <a:headEnd/>
+            <a:tailEnd/>
+          </a:ln>
+        </p:spPr>
+        <p:style>
+          <a:lnRef idx="2">
+            <a:schemeClr val="accent3">
+              <a:shade val="50000"/>
+            </a:schemeClr>
+          </a:lnRef>
+          <a:fillRef idx="1">
+            <a:schemeClr val="accent3"/>
+          </a:fillRef>
+          <a:effectRef idx="0">
+            <a:schemeClr val="accent3"/>
+          </a:effectRef>
+          <a:fontRef idx="minor">
+            <a:schemeClr val="lt1"/>
+          </a:fontRef>
+        </p:style>
+        <p:txBody>
+          <a:bodyPr lIns="0" tIns="0" rIns="0" bIns="0" anchor="ctr"/>
+          <a:lstStyle/>
+          <a:p>
+            <a:pPr algn="ctr">
+              <a:defRPr/>
+            </a:pPr>
+            <a:r>
+              <a:rPr lang="en-US" sz="1800" dirty="0" smtClean="0">
+                <a:solidFill>
+                  <a:schemeClr val="bg1"/>
+                </a:solidFill>
+                <a:cs typeface="Arial" pitchFamily="34" charset="0"/>
+                <a:sym typeface="Arial" pitchFamily="34" charset="0"/>
+              </a:rPr>
+              <a:t>Q7</a:t>
+            </a:r>
+            <a:endParaRPr lang="en-US" sz="1800" dirty="0">
+              <a:solidFill>
+                <a:schemeClr val="bg1"/>
+              </a:solidFill>
+              <a:cs typeface="Arial" pitchFamily="34" charset="0"/>
+              <a:sym typeface="Arial" pitchFamily="34" charset="0"/>
+            </a:endParaRPr>
+          </a:p>
+        </p:txBody>
+      </p:sp>
+    </p:spTree>
+  </p:cSld>
+  <p:clrMapOvr>
+    <a:masterClrMapping/>
+  </p:clrMapOvr>
+  <p:timing>
+    <p:tnLst>
+      <p:par>
+        <p:cTn id="1" dur="indefinite" restart="never" nodeType="tmRoot"/>
+      </p:par>
+    </p:tnLst>
+  </p:timing>
+</p:sld>
+</file>
+
+<file path=ppt/slides/slide17.xml><?xml version="1.0" encoding="utf-8"?>
+<p:sld xmlns:a="http://schemas.openxmlformats.org/drawingml/2006/main" xmlns:r="http://schemas.openxmlformats.org/officeDocument/2006/relationships" xmlns:p="http://schemas.openxmlformats.org/presentationml/2006/main">
+  <p:cSld>
+    <p:spTree>
+      <p:nvGrpSpPr>
+        <p:cNvPr id="1" name=""/>
+        <p:cNvGrpSpPr/>
+        <p:nvPr/>
+      </p:nvGrpSpPr>
+      <p:grpSpPr>
+        <a:xfrm>
+          <a:off x="0" y="0"/>
+          <a:ext cx="0" cy="0"/>
+          <a:chOff x="0" y="0"/>
+          <a:chExt cx="0" cy="0"/>
+        </a:xfrm>
+      </p:grpSpPr>
+      <p:sp>
+        <p:nvSpPr>
           <p:cNvPr id="2" name="Title 1"/>
           <p:cNvSpPr>
             <a:spLocks noGrp="1"/>
@@ -9391,10 +9500,17 @@
   <p:clrMapOvr>
     <a:masterClrMapping/>
   </p:clrMapOvr>
+  <p:timing>
+    <p:tnLst>
+      <p:par>
+        <p:cTn id="1" dur="indefinite" restart="never" nodeType="tmRoot"/>
+      </p:par>
+    </p:tnLst>
+  </p:timing>
 </p:sld>
 </file>
 
-<file path=ppt/slides/slide17.xml><?xml version="1.0" encoding="utf-8"?>
+<file path=ppt/slides/slide18.xml><?xml version="1.0" encoding="utf-8"?>
 <p:sld xmlns:a="http://schemas.openxmlformats.org/drawingml/2006/main" xmlns:r="http://schemas.openxmlformats.org/officeDocument/2006/relationships" xmlns:p="http://schemas.openxmlformats.org/presentationml/2006/main">
   <p:cSld>
     <p:spTree>
@@ -9797,7 +9913,7 @@
 </p:sld>
 </file>
 
-<file path=ppt/slides/slide18.xml><?xml version="1.0" encoding="utf-8"?>
+<file path=ppt/slides/slide19.xml><?xml version="1.0" encoding="utf-8"?>
 <p:sld xmlns:a="http://schemas.openxmlformats.org/drawingml/2006/main" xmlns:r="http://schemas.openxmlformats.org/officeDocument/2006/relationships" xmlns:p="http://schemas.openxmlformats.org/presentationml/2006/main">
   <p:cSld>
     <p:spTree>
@@ -9875,166 +9991,6 @@
 </p:sld>
 </file>
 
-<file path=ppt/slides/slide19.xml><?xml version="1.0" encoding="utf-8"?>
-<p:sld xmlns:a="http://schemas.openxmlformats.org/drawingml/2006/main" xmlns:r="http://schemas.openxmlformats.org/officeDocument/2006/relationships" xmlns:p="http://schemas.openxmlformats.org/presentationml/2006/main">
-  <p:cSld>
-    <p:spTree>
-      <p:nvGrpSpPr>
-        <p:cNvPr id="1" name=""/>
-        <p:cNvGrpSpPr/>
-        <p:nvPr/>
-      </p:nvGrpSpPr>
-      <p:grpSpPr>
-        <a:xfrm>
-          <a:off x="0" y="0"/>
-          <a:ext cx="0" cy="0"/>
-          <a:chOff x="0" y="0"/>
-          <a:chExt cx="0" cy="0"/>
-        </a:xfrm>
-      </p:grpSpPr>
-      <p:sp>
-        <p:nvSpPr>
-          <p:cNvPr id="4" name="Title 3"/>
-          <p:cNvSpPr>
-            <a:spLocks noGrp="1"/>
-          </p:cNvSpPr>
-          <p:nvPr>
-            <p:ph type="title"/>
-          </p:nvPr>
-        </p:nvSpPr>
-        <p:spPr/>
-        <p:txBody>
-          <a:bodyPr/>
-          <a:lstStyle/>
-          <a:p>
-            <a:pPr>
-              <a:defRPr/>
-            </a:pPr>
-            <a:r>
-              <a:rPr lang="en-US" dirty="0" smtClean="0"/>
-              <a:t>Work Time</a:t>
-            </a:r>
-            <a:endParaRPr lang="en-US" dirty="0"/>
-          </a:p>
-        </p:txBody>
-      </p:sp>
-      <p:sp>
-        <p:nvSpPr>
-          <p:cNvPr id="24579" name="Text Placeholder 4"/>
-          <p:cNvSpPr>
-            <a:spLocks noGrp="1"/>
-          </p:cNvSpPr>
-          <p:nvPr>
-            <p:ph type="body" idx="1"/>
-          </p:nvPr>
-        </p:nvSpPr>
-        <p:spPr>
-          <a:xfrm>
-            <a:off x="722313" y="1828801"/>
-            <a:ext cx="7772400" cy="2578100"/>
-          </a:xfrm>
-        </p:spPr>
-        <p:txBody>
-          <a:bodyPr>
-            <a:normAutofit lnSpcReduction="10000"/>
-          </a:bodyPr>
-          <a:lstStyle/>
-          <a:p>
-            <a:r>
-              <a:rPr lang="en-US" dirty="0" smtClean="0"/>
-              <a:t>Chess</a:t>
-            </a:r>
-          </a:p>
-          <a:p>
-            <a:endParaRPr lang="en-US" dirty="0" smtClean="0"/>
-          </a:p>
-          <a:p>
-            <a:r>
-              <a:rPr lang="en-US" dirty="0" err="1" smtClean="0"/>
-              <a:t>ByoGUI</a:t>
-            </a:r>
-            <a:endParaRPr lang="en-US" dirty="0" smtClean="0"/>
-          </a:p>
-          <a:p>
-            <a:endParaRPr lang="en-US" dirty="0"/>
-          </a:p>
-          <a:p>
-            <a:r>
-              <a:rPr lang="en-US" dirty="0" smtClean="0"/>
-              <a:t>It's a solo project, but feel free to talk with others as you do it.</a:t>
-            </a:r>
-          </a:p>
-          <a:p>
-            <a:endParaRPr lang="en-US" dirty="0"/>
-          </a:p>
-          <a:p>
-            <a:r>
-              <a:rPr lang="en-US" dirty="0" smtClean="0"/>
-              <a:t>And to ask instructor/assistants for help</a:t>
-            </a:r>
-          </a:p>
-        </p:txBody>
-      </p:sp>
-      <p:sp>
-        <p:nvSpPr>
-          <p:cNvPr id="5" name="TextBox 4"/>
-          <p:cNvSpPr txBox="1"/>
-          <p:nvPr/>
-        </p:nvSpPr>
-        <p:spPr>
-          <a:xfrm>
-            <a:off x="7772400" y="6324600"/>
-            <a:ext cx="800219" cy="369332"/>
-          </a:xfrm>
-          <a:prstGeom prst="rect">
-            <a:avLst/>
-          </a:prstGeom>
-        </p:spPr>
-        <p:style>
-          <a:lnRef idx="2">
-            <a:schemeClr val="accent3">
-              <a:shade val="50000"/>
-            </a:schemeClr>
-          </a:lnRef>
-          <a:fillRef idx="1">
-            <a:schemeClr val="accent3"/>
-          </a:fillRef>
-          <a:effectRef idx="0">
-            <a:schemeClr val="accent3"/>
-          </a:effectRef>
-          <a:fontRef idx="minor">
-            <a:schemeClr val="lt1"/>
-          </a:fontRef>
-        </p:style>
-        <p:txBody>
-          <a:bodyPr wrap="none" rtlCol="0">
-            <a:spAutoFit/>
-          </a:bodyPr>
-          <a:lstStyle/>
-          <a:p>
-            <a:r>
-              <a:rPr lang="en-US" dirty="0" smtClean="0"/>
-              <a:t>Q8-Q9</a:t>
-            </a:r>
-            <a:endParaRPr lang="en-US" dirty="0"/>
-          </a:p>
-        </p:txBody>
-      </p:sp>
-    </p:spTree>
-  </p:cSld>
-  <p:clrMapOvr>
-    <a:masterClrMapping/>
-  </p:clrMapOvr>
-  <p:timing>
-    <p:tnLst>
-      <p:par>
-        <p:cTn id="1" dur="indefinite" restart="never" nodeType="tmRoot"/>
-      </p:par>
-    </p:tnLst>
-  </p:timing>
-</p:sld>
-</file>
-
 <file path=ppt/slides/slide2.xml><?xml version="1.0" encoding="utf-8"?>
 <p:sld xmlns:a="http://schemas.openxmlformats.org/drawingml/2006/main" xmlns:r="http://schemas.openxmlformats.org/officeDocument/2006/relationships" xmlns:p="http://schemas.openxmlformats.org/presentationml/2006/main">
   <p:cSld>
@@ -10301,6 +10257,170 @@
 </file>
 
 <file path=ppt/slides/slide20.xml><?xml version="1.0" encoding="utf-8"?>
+<p:sld xmlns:a="http://schemas.openxmlformats.org/drawingml/2006/main" xmlns:r="http://schemas.openxmlformats.org/officeDocument/2006/relationships" xmlns:p="http://schemas.openxmlformats.org/presentationml/2006/main">
+  <p:cSld>
+    <p:spTree>
+      <p:nvGrpSpPr>
+        <p:cNvPr id="1" name=""/>
+        <p:cNvGrpSpPr/>
+        <p:nvPr/>
+      </p:nvGrpSpPr>
+      <p:grpSpPr>
+        <a:xfrm>
+          <a:off x="0" y="0"/>
+          <a:ext cx="0" cy="0"/>
+          <a:chOff x="0" y="0"/>
+          <a:chExt cx="0" cy="0"/>
+        </a:xfrm>
+      </p:grpSpPr>
+      <p:sp>
+        <p:nvSpPr>
+          <p:cNvPr id="4" name="Title 3"/>
+          <p:cNvSpPr>
+            <a:spLocks noGrp="1"/>
+          </p:cNvSpPr>
+          <p:nvPr>
+            <p:ph type="title"/>
+          </p:nvPr>
+        </p:nvSpPr>
+        <p:spPr/>
+        <p:txBody>
+          <a:bodyPr/>
+          <a:lstStyle/>
+          <a:p>
+            <a:pPr>
+              <a:defRPr/>
+            </a:pPr>
+            <a:r>
+              <a:rPr lang="en-US" dirty="0" smtClean="0"/>
+              <a:t>Work Time</a:t>
+            </a:r>
+            <a:endParaRPr lang="en-US" dirty="0"/>
+          </a:p>
+        </p:txBody>
+      </p:sp>
+      <p:sp>
+        <p:nvSpPr>
+          <p:cNvPr id="24579" name="Text Placeholder 4"/>
+          <p:cNvSpPr>
+            <a:spLocks noGrp="1"/>
+          </p:cNvSpPr>
+          <p:nvPr>
+            <p:ph type="body" idx="1"/>
+          </p:nvPr>
+        </p:nvSpPr>
+        <p:spPr>
+          <a:xfrm>
+            <a:off x="722313" y="1828801"/>
+            <a:ext cx="7772400" cy="2578100"/>
+          </a:xfrm>
+        </p:spPr>
+        <p:txBody>
+          <a:bodyPr>
+            <a:normAutofit lnSpcReduction="10000"/>
+          </a:bodyPr>
+          <a:lstStyle/>
+          <a:p>
+            <a:r>
+              <a:rPr lang="en-US" dirty="0" smtClean="0"/>
+              <a:t>Chess</a:t>
+            </a:r>
+          </a:p>
+          <a:p>
+            <a:endParaRPr lang="en-US" dirty="0" smtClean="0"/>
+          </a:p>
+          <a:p>
+            <a:r>
+              <a:rPr lang="en-US" strike="sngStrike" dirty="0" err="1" smtClean="0"/>
+              <a:t>ByoGUI</a:t>
+            </a:r>
+            <a:endParaRPr lang="en-US" strike="sngStrike" dirty="0" smtClean="0"/>
+          </a:p>
+          <a:p>
+            <a:endParaRPr lang="en-US" strike="sngStrike" dirty="0" smtClean="0"/>
+          </a:p>
+          <a:p>
+            <a:r>
+              <a:rPr lang="en-US" strike="sngStrike" dirty="0" smtClean="0"/>
+              <a:t>It's </a:t>
+            </a:r>
+            <a:r>
+              <a:rPr lang="en-US" strike="sngStrike" dirty="0" smtClean="0"/>
+              <a:t>a solo project, but feel free to talk with others as you do it.</a:t>
+            </a:r>
+          </a:p>
+          <a:p>
+            <a:endParaRPr lang="en-US" dirty="0"/>
+          </a:p>
+          <a:p>
+            <a:r>
+              <a:rPr lang="en-US" dirty="0" smtClean="0"/>
+              <a:t>And to ask instructor/assistants for help</a:t>
+            </a:r>
+          </a:p>
+        </p:txBody>
+      </p:sp>
+      <p:sp>
+        <p:nvSpPr>
+          <p:cNvPr id="5" name="TextBox 4"/>
+          <p:cNvSpPr txBox="1"/>
+          <p:nvPr/>
+        </p:nvSpPr>
+        <p:spPr>
+          <a:xfrm>
+            <a:off x="7772400" y="6324600"/>
+            <a:ext cx="800219" cy="369332"/>
+          </a:xfrm>
+          <a:prstGeom prst="rect">
+            <a:avLst/>
+          </a:prstGeom>
+        </p:spPr>
+        <p:style>
+          <a:lnRef idx="2">
+            <a:schemeClr val="accent3">
+              <a:shade val="50000"/>
+            </a:schemeClr>
+          </a:lnRef>
+          <a:fillRef idx="1">
+            <a:schemeClr val="accent3"/>
+          </a:fillRef>
+          <a:effectRef idx="0">
+            <a:schemeClr val="accent3"/>
+          </a:effectRef>
+          <a:fontRef idx="minor">
+            <a:schemeClr val="lt1"/>
+          </a:fontRef>
+        </p:style>
+        <p:txBody>
+          <a:bodyPr wrap="none" rtlCol="0">
+            <a:spAutoFit/>
+          </a:bodyPr>
+          <a:lstStyle/>
+          <a:p>
+            <a:r>
+              <a:rPr lang="en-US" dirty="0" smtClean="0"/>
+              <a:t>Q8-Q9</a:t>
+            </a:r>
+            <a:endParaRPr lang="en-US" dirty="0"/>
+          </a:p>
+        </p:txBody>
+      </p:sp>
+    </p:spTree>
+  </p:cSld>
+  <p:clrMapOvr>
+    <a:masterClrMapping/>
+  </p:clrMapOvr>
+  <p:timing>
+    <p:tnLst>
+      <p:par>
+        <p:cTn id="1" dur="indefinite" restart="never" nodeType="tmRoot"/>
+      </p:par>
+    </p:tnLst>
+  </p:timing>
+</p:sld>
+</file>
+
+<file path=ppt/slides/slide21.xml><?xml version="1.0" encoding="utf-8"?>
 <p:sld xmlns:a="http://schemas.openxmlformats.org/drawingml/2006/main" xmlns:r="http://schemas.openxmlformats.org/officeDocument/2006/relationships" xmlns:p="http://schemas.openxmlformats.org/presentationml/2006/main">
   <p:cSld>
     <p:spTree>
@@ -10447,6 +10567,13 @@
   <p:clrMapOvr>
     <a:masterClrMapping/>
   </p:clrMapOvr>
+  <p:timing>
+    <p:tnLst>
+      <p:par>
+        <p:cTn id="1" dur="indefinite" restart="never" nodeType="tmRoot"/>
+      </p:par>
+    </p:tnLst>
+  </p:timing>
 </p:sld>
 </file>
 
@@ -11605,6 +11732,47 @@
           <a:chExt cx="0" cy="0"/>
         </a:xfrm>
       </p:grpSpPr>
+      <p:pic>
+        <p:nvPicPr>
+          <p:cNvPr id="1028" name="Picture 4" descr="PlantUML diagram"/>
+          <p:cNvPicPr>
+            <a:picLocks noChangeAspect="1" noChangeArrowheads="1"/>
+          </p:cNvPicPr>
+          <p:nvPr/>
+        </p:nvPicPr>
+        <p:blipFill>
+          <a:blip r:embed="rId3">
+            <a:extLst>
+              <a:ext uri="{28A0092B-C50C-407E-A947-70E740481C1C}">
+                <a14:useLocalDpi xmlns:a14="http://schemas.microsoft.com/office/drawing/2010/main" val="0"/>
+              </a:ext>
+            </a:extLst>
+          </a:blip>
+          <a:srcRect/>
+          <a:stretch>
+            <a:fillRect/>
+          </a:stretch>
+        </p:blipFill>
+        <p:spPr bwMode="auto">
+          <a:xfrm>
+            <a:off x="5257800" y="1727008"/>
+            <a:ext cx="3352800" cy="4272346"/>
+          </a:xfrm>
+          <a:prstGeom prst="rect">
+            <a:avLst/>
+          </a:prstGeom>
+          <a:noFill/>
+          <a:extLst>
+            <a:ext uri="{909E8E84-426E-40DD-AFC4-6F175D3DCCD1}">
+              <a14:hiddenFill xmlns:a14="http://schemas.microsoft.com/office/drawing/2010/main">
+                <a:solidFill>
+                  <a:srgbClr val="FFFFFF"/>
+                </a:solidFill>
+              </a14:hiddenFill>
+            </a:ext>
+          </a:extLst>
+        </p:spPr>
+      </p:pic>
       <p:sp>
         <p:nvSpPr>
           <p:cNvPr id="2" name="Title 1"/>
@@ -11653,6 +11821,40 @@
             <a:r>
               <a:rPr lang="en-US" dirty="0" err="1" smtClean="0"/>
               <a:t>SavingsAccount</a:t>
+            </a:r>
+            <a:endParaRPr lang="en-US" dirty="0" smtClean="0"/>
+          </a:p>
+          <a:p>
+            <a:endParaRPr lang="en-US" dirty="0"/>
+          </a:p>
+          <a:p>
+            <a:r>
+              <a:rPr lang="en-US" dirty="0" err="1" smtClean="0">
+                <a:hlinkClick r:id="rId4"/>
+              </a:rPr>
+              <a:t>Plantuml</a:t>
+            </a:r>
+            <a:r>
+              <a:rPr lang="en-US" dirty="0" smtClean="0">
+                <a:hlinkClick r:id="rId4"/>
+              </a:rPr>
+              <a:t> source</a:t>
+            </a:r>
+            <a:endParaRPr lang="en-US" dirty="0" smtClean="0"/>
+          </a:p>
+          <a:p>
+            <a:pPr lvl="1"/>
+            <a:r>
+              <a:rPr lang="en-US" dirty="0" err="1"/>
+              <a:t>SavingsAccount</a:t>
+            </a:r>
+            <a:r>
+              <a:rPr lang="en-US" dirty="0"/>
+              <a:t> -up-|&gt; </a:t>
+            </a:r>
+            <a:r>
+              <a:rPr lang="en-US" dirty="0" err="1"/>
+              <a:t>BankAccount</a:t>
             </a:r>
             <a:endParaRPr lang="en-US" dirty="0"/>
           </a:p>

</xml_diff>

<commit_message>
updated all slides and HWs
</commit_message>
<xml_diff>
--- a/ClassMaterials/Inheritance/Slides/Inheritance.pptx
+++ b/ClassMaterials/Inheritance/Slides/Inheritance.pptx
@@ -2,38 +2,40 @@
 <file path=ppt/presentation.xml><?xml version="1.0" encoding="utf-8"?>
 <p:presentation xmlns:a="http://schemas.openxmlformats.org/drawingml/2006/main" xmlns:r="http://schemas.openxmlformats.org/officeDocument/2006/relationships" xmlns:p="http://schemas.openxmlformats.org/presentationml/2006/main" saveSubsetFonts="1">
   <p:sldMasterIdLst>
-    <p:sldMasterId id="2147484251" r:id="rId1"/>
+    <p:sldMasterId id="2147484251" r:id="rId4"/>
   </p:sldMasterIdLst>
   <p:notesMasterIdLst>
-    <p:notesMasterId r:id="rId25"/>
+    <p:notesMasterId r:id="rId30"/>
   </p:notesMasterIdLst>
   <p:handoutMasterIdLst>
-    <p:handoutMasterId r:id="rId26"/>
+    <p:handoutMasterId r:id="rId31"/>
   </p:handoutMasterIdLst>
   <p:sldIdLst>
-    <p:sldId id="256" r:id="rId2"/>
-    <p:sldId id="368" r:id="rId3"/>
-    <p:sldId id="369" r:id="rId4"/>
-    <p:sldId id="392" r:id="rId5"/>
-    <p:sldId id="371" r:id="rId6"/>
-    <p:sldId id="393" r:id="rId7"/>
-    <p:sldId id="394" r:id="rId8"/>
-    <p:sldId id="395" r:id="rId9"/>
-    <p:sldId id="372" r:id="rId10"/>
-    <p:sldId id="396" r:id="rId11"/>
-    <p:sldId id="397" r:id="rId12"/>
-    <p:sldId id="376" r:id="rId13"/>
-    <p:sldId id="398" r:id="rId14"/>
-    <p:sldId id="399" r:id="rId15"/>
-    <p:sldId id="401" r:id="rId16"/>
-    <p:sldId id="402" r:id="rId17"/>
-    <p:sldId id="403" r:id="rId18"/>
-    <p:sldId id="404" r:id="rId19"/>
-    <p:sldId id="389" r:id="rId20"/>
-    <p:sldId id="379" r:id="rId21"/>
-    <p:sldId id="388" r:id="rId22"/>
-    <p:sldId id="381" r:id="rId23"/>
-    <p:sldId id="390" r:id="rId24"/>
+    <p:sldId id="256" r:id="rId5"/>
+    <p:sldId id="368" r:id="rId6"/>
+    <p:sldId id="369" r:id="rId7"/>
+    <p:sldId id="370" r:id="rId8"/>
+    <p:sldId id="371" r:id="rId9"/>
+    <p:sldId id="386" r:id="rId10"/>
+    <p:sldId id="393" r:id="rId11"/>
+    <p:sldId id="373" r:id="rId12"/>
+    <p:sldId id="372" r:id="rId13"/>
+    <p:sldId id="374" r:id="rId14"/>
+    <p:sldId id="375" r:id="rId15"/>
+    <p:sldId id="376" r:id="rId16"/>
+    <p:sldId id="387" r:id="rId17"/>
+    <p:sldId id="391" r:id="rId18"/>
+    <p:sldId id="394" r:id="rId19"/>
+    <p:sldId id="377" r:id="rId20"/>
+    <p:sldId id="392" r:id="rId21"/>
+    <p:sldId id="378" r:id="rId22"/>
+    <p:sldId id="380" r:id="rId23"/>
+    <p:sldId id="389" r:id="rId24"/>
+    <p:sldId id="379" r:id="rId25"/>
+    <p:sldId id="388" r:id="rId26"/>
+    <p:sldId id="381" r:id="rId27"/>
+    <p:sldId id="390" r:id="rId28"/>
+    <p:sldId id="395" r:id="rId29"/>
   </p:sldIdLst>
   <p:sldSz cx="9144000" cy="6858000" type="screen4x3"/>
   <p:notesSz cx="7010400" cy="9296400"/>
@@ -181,6 +183,43 @@
 </p:presentation>
 </file>
 
+<file path=ppt/revisionInfo.xml><?xml version="1.0" encoding="utf-8"?>
+<p1510:revInfo xmlns:a="http://schemas.openxmlformats.org/drawingml/2006/main" xmlns:r="http://schemas.openxmlformats.org/officeDocument/2006/relationships" xmlns:p1510="http://schemas.microsoft.com/office/powerpoint/2015/10/main">
+  <p1510:revLst>
+    <p1510:client id="{06F8DD94-CAFF-48A1-A9C3-868B0C5AA276}" v="2" dt="2021-10-12T13:32:43.738"/>
+  </p1510:revLst>
+</p1510:revInfo>
+</file>
+
+<file path=ppt/changesInfos/changesInfo1.xml><?xml version="1.0" encoding="utf-8"?>
+<pc:chgInfo xmlns:a="http://schemas.openxmlformats.org/drawingml/2006/main" xmlns:r="http://schemas.openxmlformats.org/officeDocument/2006/relationships" xmlns:ac="http://schemas.microsoft.com/office/drawing/2013/main/command" xmlns:pc="http://schemas.microsoft.com/office/powerpoint/2013/main/command">
+  <pc:docChgLst>
+    <pc:chgData name="Summerville, Macartan" userId="S::summermt@rose-hulman.edu::7b2a0604-6c98-4445-9309-9fb015585c0d" providerId="AD" clId="Web-{06F8DD94-CAFF-48A1-A9C3-868B0C5AA276}"/>
+    <pc:docChg chg="modSld">
+      <pc:chgData name="Summerville, Macartan" userId="S::summermt@rose-hulman.edu::7b2a0604-6c98-4445-9309-9fb015585c0d" providerId="AD" clId="Web-{06F8DD94-CAFF-48A1-A9C3-868B0C5AA276}" dt="2021-10-12T13:32:43.738" v="1" actId="1076"/>
+      <pc:docMkLst>
+        <pc:docMk/>
+      </pc:docMkLst>
+      <pc:sldChg chg="modSp">
+        <pc:chgData name="Summerville, Macartan" userId="S::summermt@rose-hulman.edu::7b2a0604-6c98-4445-9309-9fb015585c0d" providerId="AD" clId="Web-{06F8DD94-CAFF-48A1-A9C3-868B0C5AA276}" dt="2021-10-12T13:32:43.738" v="1" actId="1076"/>
+        <pc:sldMkLst>
+          <pc:docMk/>
+          <pc:sldMk cId="2922646918" sldId="391"/>
+        </pc:sldMkLst>
+        <pc:picChg chg="mod">
+          <ac:chgData name="Summerville, Macartan" userId="S::summermt@rose-hulman.edu::7b2a0604-6c98-4445-9309-9fb015585c0d" providerId="AD" clId="Web-{06F8DD94-CAFF-48A1-A9C3-868B0C5AA276}" dt="2021-10-12T13:32:43.738" v="1" actId="1076"/>
+          <ac:picMkLst>
+            <pc:docMk/>
+            <pc:sldMk cId="2922646918" sldId="391"/>
+            <ac:picMk id="5" creationId="{6CBCA8B7-839A-6B48-9A15-D29E72AB46FA}"/>
+          </ac:picMkLst>
+        </pc:picChg>
+      </pc:sldChg>
+    </pc:docChg>
+  </pc:docChgLst>
+</pc:chgInfo>
+</file>
+
 <file path=ppt/handoutMasters/handoutMaster1.xml><?xml version="1.0" encoding="utf-8"?>
 <p:handoutMaster xmlns:a="http://schemas.openxmlformats.org/drawingml/2006/main" xmlns:r="http://schemas.openxmlformats.org/officeDocument/2006/relationships" xmlns:p="http://schemas.openxmlformats.org/presentationml/2006/main">
   <p:cSld>
@@ -298,7 +337,7 @@
               <a:pPr>
                 <a:defRPr/>
               </a:pPr>
-              <a:t>3/1/22</a:t>
+              <a:t>11/22/2022</a:t>
             </a:fld>
             <a:endParaRPr lang="en-US"/>
           </a:p>
@@ -533,7 +572,7 @@
               <a:pPr>
                 <a:defRPr/>
               </a:pPr>
-              <a:t>3/1/22</a:t>
+              <a:t>11/22/2022</a:t>
             </a:fld>
             <a:endParaRPr lang="en-US"/>
           </a:p>
@@ -940,23 +979,23 @@
               </a:spcBef>
             </a:pPr>
             <a:r>
-              <a:rPr lang="en-US" dirty="0"/>
+              <a:rPr lang="en-US"/>
               <a:t>Bring hard copy of </a:t>
             </a:r>
             <a:r>
-              <a:rPr lang="en-US" dirty="0" err="1"/>
+              <a:rPr lang="en-US" err="1"/>
               <a:t>CheckingAccount</a:t>
             </a:r>
             <a:r>
-              <a:rPr lang="en-US" dirty="0"/>
+              <a:rPr lang="en-US"/>
               <a:t>, </a:t>
             </a:r>
             <a:r>
-              <a:rPr lang="en-US" dirty="0" err="1"/>
+              <a:rPr lang="en-US" err="1"/>
               <a:t>ChessPiece</a:t>
             </a:r>
             <a:r>
-              <a:rPr lang="en-US" dirty="0"/>
+              <a:rPr lang="en-US"/>
               <a:t>, King, Queen, etc.</a:t>
             </a:r>
           </a:p>
@@ -967,22 +1006,22 @@
               </a:spcBef>
             </a:pPr>
             <a:r>
-              <a:rPr lang="en-US" dirty="0"/>
+              <a:rPr lang="en-US"/>
               <a:t>Bring photocopy of Big</a:t>
             </a:r>
             <a:r>
-              <a:rPr lang="en-US" baseline="0" dirty="0"/>
+              <a:rPr lang="en-US" baseline="0"/>
               <a:t> Java, </a:t>
             </a:r>
             <a:r>
-              <a:rPr lang="en-US" dirty="0"/>
+              <a:rPr lang="en-US"/>
               <a:t>Figure 3,</a:t>
             </a:r>
             <a:r>
-              <a:rPr lang="en-US" baseline="0" dirty="0"/>
+              <a:rPr lang="en-US" baseline="0"/>
               <a:t> page 422</a:t>
             </a:r>
-            <a:endParaRPr lang="en-US" dirty="0"/>
+            <a:endParaRPr lang="en-US"/>
           </a:p>
         </p:txBody>
       </p:sp>
@@ -1355,24 +1394,24 @@
               <a:defRPr/>
             </a:pPr>
             <a:r>
-              <a:rPr lang="en-US" dirty="0"/>
+              <a:rPr lang="en-US"/>
               <a:t>Discuss super method calls.</a:t>
             </a:r>
           </a:p>
           <a:p>
-            <a:endParaRPr lang="en-US" dirty="0"/>
-          </a:p>
-          <a:p>
-            <a:r>
-              <a:rPr lang="en-US" dirty="0"/>
+            <a:endParaRPr lang="en-US"/>
+          </a:p>
+          <a:p>
+            <a:r>
+              <a:rPr lang="en-US"/>
               <a:t>Add </a:t>
             </a:r>
             <a:r>
-              <a:rPr lang="en-US" dirty="0" err="1"/>
+              <a:rPr lang="en-US" err="1"/>
               <a:t>CheckingAccount</a:t>
             </a:r>
             <a:r>
-              <a:rPr lang="en-US" dirty="0"/>
+              <a:rPr lang="en-US"/>
               <a:t>(double) constructor</a:t>
             </a:r>
           </a:p>
@@ -1649,7 +1688,7 @@
             <a:fld id="{AEF60CBC-2A70-49D3-9866-05F00BCCB9E5}" type="slidenum">
               <a:rPr lang="en-US" smtClean="0"/>
               <a:pPr/>
-              <a:t>15</a:t>
+              <a:t>16</a:t>
             </a:fld>
             <a:endParaRPr lang="en-US"/>
           </a:p>
@@ -1774,7 +1813,7 @@
             <a:fld id="{AEF60CBC-2A70-49D3-9866-05F00BCCB9E5}" type="slidenum">
               <a:rPr lang="en-US" smtClean="0"/>
               <a:pPr/>
-              <a:t>16</a:t>
+              <a:t>17</a:t>
             </a:fld>
             <a:endParaRPr lang="en-US"/>
           </a:p>
@@ -1885,7 +1924,7 @@
             <a:fld id="{AE88C4F2-B63F-49B5-8554-101017854A6D}" type="slidenum">
               <a:rPr lang="en-US" smtClean="0"/>
               <a:pPr/>
-              <a:t>17</a:t>
+              <a:t>18</a:t>
             </a:fld>
             <a:endParaRPr lang="en-US"/>
           </a:p>
@@ -1985,7 +2024,7 @@
             <a:fld id="{D52993E5-32C8-4EC2-BBC6-DB69025B6125}" type="slidenum">
               <a:rPr lang="en-US" smtClean="0"/>
               <a:pPr/>
-              <a:t>18</a:t>
+              <a:t>19</a:t>
             </a:fld>
             <a:endParaRPr lang="en-US"/>
           </a:p>
@@ -2049,62 +2088,62 @@
           <a:lstStyle/>
           <a:p>
             <a:r>
-              <a:rPr lang="en-US" baseline="0" dirty="0"/>
+              <a:rPr lang="en-US" baseline="0"/>
               <a:t>Walk through the Chess example in Inheritance project. Start by showing the King and </a:t>
             </a:r>
             <a:r>
-              <a:rPr lang="en-US" baseline="0" dirty="0" err="1"/>
+              <a:rPr lang="en-US" baseline="0" err="1"/>
               <a:t>ChessPiece</a:t>
             </a:r>
             <a:r>
-              <a:rPr lang="en-US" baseline="0" dirty="0"/>
+              <a:rPr lang="en-US" baseline="0"/>
               <a:t> interface. Implement the queen, and note to the students how we end up copying a lot of code from the King into the Queen, there has to be a better way…</a:t>
             </a:r>
           </a:p>
           <a:p>
-            <a:endParaRPr lang="en-US" baseline="0" dirty="0"/>
-          </a:p>
-          <a:p>
-            <a:r>
-              <a:rPr lang="en-US" baseline="0" dirty="0"/>
+            <a:endParaRPr lang="en-US" baseline="0"/>
+          </a:p>
+          <a:p>
+            <a:r>
+              <a:rPr lang="en-US" baseline="0"/>
               <a:t>It works well to just make the </a:t>
             </a:r>
             <a:r>
-              <a:rPr lang="en-US" baseline="0" dirty="0" err="1"/>
+              <a:rPr lang="en-US" baseline="0" err="1"/>
               <a:t>ChessPiece</a:t>
             </a:r>
             <a:r>
-              <a:rPr lang="en-US" baseline="0" dirty="0"/>
+              <a:rPr lang="en-US" baseline="0"/>
               <a:t> a class first and put in a </a:t>
             </a:r>
             <a:r>
-              <a:rPr lang="en-US" baseline="0" dirty="0" err="1"/>
+              <a:rPr lang="en-US" baseline="0" err="1"/>
               <a:t>System.err.println</a:t>
             </a:r>
             <a:r>
-              <a:rPr lang="en-US" baseline="0" dirty="0"/>
+              <a:rPr lang="en-US" baseline="0"/>
               <a:t>(“Implement this method!”) then show them if we forget to implement a method (Queen’s </a:t>
             </a:r>
             <a:r>
-              <a:rPr lang="en-US" baseline="0" dirty="0" err="1"/>
+              <a:rPr lang="en-US" baseline="0" err="1"/>
               <a:t>checkMove</a:t>
             </a:r>
             <a:r>
-              <a:rPr lang="en-US" baseline="0" dirty="0"/>
+              <a:rPr lang="en-US" baseline="0"/>
               <a:t>) we see that message at runtime.</a:t>
             </a:r>
           </a:p>
           <a:p>
-            <a:endParaRPr lang="en-US" baseline="0" dirty="0"/>
-          </a:p>
-          <a:p>
-            <a:r>
-              <a:rPr lang="en-US" sz="1400" baseline="0" dirty="0"/>
+            <a:endParaRPr lang="en-US" baseline="0"/>
+          </a:p>
+          <a:p>
+            <a:r>
+              <a:rPr lang="en-US" sz="1400" baseline="0"/>
               <a:t>At this point, they should see the justification for an abstract class, show that on next slide</a:t>
             </a:r>
           </a:p>
           <a:p>
-            <a:endParaRPr lang="en-US" dirty="0"/>
+            <a:endParaRPr lang="en-US"/>
           </a:p>
         </p:txBody>
       </p:sp>
@@ -2131,7 +2170,7 @@
               <a:pPr>
                 <a:defRPr/>
               </a:pPr>
-              <a:t>19</a:t>
+              <a:t>20</a:t>
             </a:fld>
             <a:endParaRPr lang="en-US"/>
           </a:p>
@@ -2197,49 +2236,49 @@
           <a:lstStyle/>
           <a:p>
             <a:r>
-              <a:rPr lang="en-US" dirty="0"/>
+              <a:rPr lang="en-US"/>
               <a:t>The main reason for using Abstract classes is to force programmers to create</a:t>
             </a:r>
             <a:r>
-              <a:rPr lang="en-US" baseline="0" dirty="0"/>
+              <a:rPr lang="en-US" baseline="0"/>
               <a:t> subclasses. Declaring certain methods abstract prevents you from coming up with useless default methods that others might inherit by accident.</a:t>
             </a:r>
           </a:p>
           <a:p>
-            <a:endParaRPr lang="en-US" baseline="0" dirty="0"/>
-          </a:p>
-          <a:p>
-            <a:r>
-              <a:rPr lang="en-US" baseline="0" dirty="0"/>
+            <a:endParaRPr lang="en-US" baseline="0"/>
+          </a:p>
+          <a:p>
+            <a:r>
+              <a:rPr lang="en-US" baseline="0"/>
               <a:t>This also allows code reuse when only a few methods of an interface differ in implementation. </a:t>
             </a:r>
           </a:p>
           <a:p>
-            <a:endParaRPr lang="en-US" baseline="0" dirty="0"/>
-          </a:p>
-          <a:p>
-            <a:r>
-              <a:rPr lang="en-US" sz="1200" baseline="0" dirty="0"/>
+            <a:endParaRPr lang="en-US" baseline="0"/>
+          </a:p>
+          <a:p>
+            <a:r>
+              <a:rPr lang="en-US" sz="1200" baseline="0"/>
               <a:t>Make the </a:t>
             </a:r>
             <a:r>
-              <a:rPr lang="en-US" sz="1200" baseline="0" dirty="0" err="1"/>
+              <a:rPr lang="en-US" sz="1200" baseline="0" err="1"/>
               <a:t>ChessPiece</a:t>
             </a:r>
             <a:r>
-              <a:rPr lang="en-US" sz="1200" baseline="0" dirty="0"/>
+              <a:rPr lang="en-US" sz="1200" baseline="0"/>
               <a:t> abstract, and pull the items that don’t change into the new abstract class, and leave the other methods abstract (see solution code). Walk students through this refactor for King/Queen, then have them implement the other pieces. Remind them that the Pawn is actually the hardest, and to do </a:t>
             </a:r>
             <a:r>
-              <a:rPr lang="en-US" baseline="0" dirty="0"/>
+              <a:rPr lang="en-US" baseline="0"/>
               <a:t>that LAST. </a:t>
             </a:r>
           </a:p>
           <a:p>
-            <a:endParaRPr lang="en-US" dirty="0"/>
-          </a:p>
-          <a:p>
-            <a:endParaRPr lang="en-US" baseline="0" dirty="0"/>
+            <a:endParaRPr lang="en-US"/>
+          </a:p>
+          <a:p>
+            <a:endParaRPr lang="en-US" baseline="0"/>
           </a:p>
         </p:txBody>
       </p:sp>
@@ -2266,7 +2305,7 @@
               <a:pPr>
                 <a:defRPr/>
               </a:pPr>
-              <a:t>20</a:t>
+              <a:t>21</a:t>
             </a:fld>
             <a:endParaRPr lang="en-US"/>
           </a:p>
@@ -2430,7 +2469,7 @@
           <a:lstStyle/>
           <a:p>
             <a:r>
-              <a:rPr lang="en-US" sz="1200" kern="1200" dirty="0">
+              <a:rPr lang="en-US" sz="1200" kern="1200">
                 <a:solidFill>
                   <a:schemeClr val="tx1"/>
                 </a:solidFill>
@@ -2441,7 +2480,7 @@
               <a:t>Emphasize</a:t>
             </a:r>
             <a:r>
-              <a:rPr lang="en-US" sz="1200" kern="1200" baseline="0" dirty="0">
+              <a:rPr lang="en-US" sz="1200" kern="1200" baseline="0">
                 <a:solidFill>
                   <a:schemeClr val="tx1"/>
                 </a:solidFill>
@@ -2452,7 +2491,7 @@
               <a:t> doing Pawn last it requires several things (</a:t>
             </a:r>
             <a:r>
-              <a:rPr lang="en-US" sz="1200" kern="1200" baseline="0" dirty="0" err="1">
+              <a:rPr lang="en-US" sz="1200" kern="1200" baseline="0" err="1">
                 <a:solidFill>
                   <a:schemeClr val="tx1"/>
                 </a:solidFill>
@@ -2463,7 +2502,7 @@
               <a:t>hasMoved</a:t>
             </a:r>
             <a:r>
-              <a:rPr lang="en-US" sz="1200" kern="1200" baseline="0" dirty="0">
+              <a:rPr lang="en-US" sz="1200" kern="1200" baseline="0">
                 <a:solidFill>
                   <a:schemeClr val="tx1"/>
                 </a:solidFill>
@@ -2474,7 +2513,7 @@
               <a:t> field) and needs to override the </a:t>
             </a:r>
             <a:r>
-              <a:rPr lang="en-US" sz="1200" kern="1200" baseline="0" dirty="0" err="1">
+              <a:rPr lang="en-US" sz="1200" kern="1200" baseline="0" err="1">
                 <a:solidFill>
                   <a:schemeClr val="tx1"/>
                 </a:solidFill>
@@ -2485,7 +2524,7 @@
               <a:t>checkAttack</a:t>
             </a:r>
             <a:r>
-              <a:rPr lang="en-US" sz="1200" kern="1200" baseline="0" dirty="0">
+              <a:rPr lang="en-US" sz="1200" kern="1200" baseline="0">
                 <a:solidFill>
                   <a:schemeClr val="tx1"/>
                 </a:solidFill>
@@ -2495,7 +2534,7 @@
               </a:rPr>
               <a:t> method which is not obvious without looking at more code than they usually have to look at for the rest of the classes.</a:t>
             </a:r>
-            <a:endParaRPr lang="en-US" sz="1200" kern="1200" dirty="0">
+            <a:endParaRPr lang="en-US" sz="1200" kern="1200">
               <a:solidFill>
                 <a:schemeClr val="tx1"/>
               </a:solidFill>
@@ -2505,7 +2544,7 @@
             </a:endParaRPr>
           </a:p>
           <a:p>
-            <a:endParaRPr lang="en-US" sz="1200" kern="1200" dirty="0">
+            <a:endParaRPr lang="en-US" sz="1200" kern="1200">
               <a:solidFill>
                 <a:schemeClr val="tx1"/>
               </a:solidFill>
@@ -2516,7 +2555,7 @@
           </a:p>
           <a:p>
             <a:r>
-              <a:rPr lang="en-US" sz="1200" kern="1200" dirty="0">
+              <a:rPr lang="en-US" sz="1200" kern="1200">
                 <a:solidFill>
                   <a:schemeClr val="tx1"/>
                 </a:solidFill>
@@ -2529,7 +2568,7 @@
           </a:p>
           <a:p>
             <a:r>
-              <a:rPr lang="en-US" sz="1200" b="1" kern="1200" dirty="0">
+              <a:rPr lang="en-US" sz="1200" b="1" kern="1200">
                 <a:solidFill>
                   <a:schemeClr val="tx1"/>
                 </a:solidFill>
@@ -2540,7 +2579,7 @@
               <a:t>public </a:t>
             </a:r>
             <a:r>
-              <a:rPr lang="en-US" sz="1200" b="1" kern="1200" dirty="0" err="1">
+              <a:rPr lang="en-US" sz="1200" b="1" kern="1200" err="1">
                 <a:solidFill>
                   <a:schemeClr val="tx1"/>
                 </a:solidFill>
@@ -2551,7 +2590,7 @@
               <a:t>boolean</a:t>
             </a:r>
             <a:r>
-              <a:rPr lang="en-US" sz="1200" b="1" kern="1200" dirty="0">
+              <a:rPr lang="en-US" sz="1200" b="1" kern="1200">
                 <a:solidFill>
                   <a:schemeClr val="tx1"/>
                 </a:solidFill>
@@ -2562,7 +2601,7 @@
               <a:t> </a:t>
             </a:r>
             <a:r>
-              <a:rPr lang="en-US" sz="1200" b="1" kern="1200" dirty="0" err="1">
+              <a:rPr lang="en-US" sz="1200" b="1" kern="1200" err="1">
                 <a:solidFill>
                   <a:schemeClr val="tx1"/>
                 </a:solidFill>
@@ -2573,7 +2612,7 @@
               <a:t>checkAttack</a:t>
             </a:r>
             <a:r>
-              <a:rPr lang="en-US" sz="1200" b="1" kern="1200" dirty="0">
+              <a:rPr lang="en-US" sz="1200" b="1" kern="1200">
                 <a:solidFill>
                   <a:schemeClr val="tx1"/>
                 </a:solidFill>
@@ -2584,7 +2623,7 @@
               <a:t>(</a:t>
             </a:r>
             <a:r>
-              <a:rPr lang="en-US" sz="1200" b="1" kern="1200" dirty="0" err="1">
+              <a:rPr lang="en-US" sz="1200" b="1" kern="1200" err="1">
                 <a:solidFill>
                   <a:schemeClr val="tx1"/>
                 </a:solidFill>
@@ -2595,7 +2634,7 @@
               <a:t>int</a:t>
             </a:r>
             <a:r>
-              <a:rPr lang="en-US" sz="1200" b="1" kern="1200" dirty="0">
+              <a:rPr lang="en-US" sz="1200" b="1" kern="1200">
                 <a:solidFill>
                   <a:schemeClr val="tx1"/>
                 </a:solidFill>
@@ -2606,7 +2645,7 @@
               <a:t> dx, </a:t>
             </a:r>
             <a:r>
-              <a:rPr lang="en-US" sz="1200" b="1" kern="1200" dirty="0" err="1">
+              <a:rPr lang="en-US" sz="1200" b="1" kern="1200" err="1">
                 <a:solidFill>
                   <a:schemeClr val="tx1"/>
                 </a:solidFill>
@@ -2617,7 +2656,7 @@
               <a:t>int</a:t>
             </a:r>
             <a:r>
-              <a:rPr lang="en-US" sz="1200" b="1" kern="1200" dirty="0">
+              <a:rPr lang="en-US" sz="1200" b="1" kern="1200">
                 <a:solidFill>
                   <a:schemeClr val="tx1"/>
                 </a:solidFill>
@@ -2628,7 +2667,7 @@
               <a:t> </a:t>
             </a:r>
             <a:r>
-              <a:rPr lang="en-US" sz="1200" b="1" kern="1200" dirty="0" err="1">
+              <a:rPr lang="en-US" sz="1200" b="1" kern="1200" err="1">
                 <a:solidFill>
                   <a:schemeClr val="tx1"/>
                 </a:solidFill>
@@ -2639,7 +2678,7 @@
               <a:t>dy</a:t>
             </a:r>
             <a:r>
-              <a:rPr lang="en-US" sz="1200" b="1" kern="1200" dirty="0">
+              <a:rPr lang="en-US" sz="1200" b="1" kern="1200">
                 <a:solidFill>
                   <a:schemeClr val="tx1"/>
                 </a:solidFill>
@@ -2650,7 +2689,7 @@
               <a:t>, </a:t>
             </a:r>
             <a:r>
-              <a:rPr lang="en-US" sz="1200" b="1" kern="1200" dirty="0" err="1">
+              <a:rPr lang="en-US" sz="1200" b="1" kern="1200" err="1">
                 <a:solidFill>
                   <a:schemeClr val="tx1"/>
                 </a:solidFill>
@@ -2661,7 +2700,7 @@
               <a:t>ChessPiece</a:t>
             </a:r>
             <a:r>
-              <a:rPr lang="en-US" sz="1200" b="1" kern="1200" dirty="0">
+              <a:rPr lang="en-US" sz="1200" b="1" kern="1200">
                 <a:solidFill>
                   <a:schemeClr val="tx1"/>
                 </a:solidFill>
@@ -2674,7 +2713,7 @@
           </a:p>
           <a:p>
             <a:r>
-              <a:rPr lang="en-US" sz="1200" b="1" kern="1200" dirty="0">
+              <a:rPr lang="en-US" sz="1200" b="1" kern="1200">
                 <a:solidFill>
                   <a:schemeClr val="tx1"/>
                 </a:solidFill>
@@ -2685,7 +2724,7 @@
               <a:t>if (</a:t>
             </a:r>
             <a:r>
-              <a:rPr lang="en-US" sz="1200" b="1" kern="1200" dirty="0" err="1">
+              <a:rPr lang="en-US" sz="1200" b="1" kern="1200" err="1">
                 <a:solidFill>
                   <a:schemeClr val="tx1"/>
                 </a:solidFill>
@@ -2696,7 +2735,7 @@
               <a:t>this.isWhite</a:t>
             </a:r>
             <a:r>
-              <a:rPr lang="en-US" sz="1200" b="1" kern="1200" dirty="0">
+              <a:rPr lang="en-US" sz="1200" b="1" kern="1200">
                 <a:solidFill>
                   <a:schemeClr val="tx1"/>
                 </a:solidFill>
@@ -2707,7 +2746,7 @@
               <a:t>() == </a:t>
             </a:r>
             <a:r>
-              <a:rPr lang="en-US" sz="1200" b="1" kern="1200" dirty="0" err="1">
+              <a:rPr lang="en-US" sz="1200" b="1" kern="1200" err="1">
                 <a:solidFill>
                   <a:schemeClr val="tx1"/>
                 </a:solidFill>
@@ -2718,7 +2757,7 @@
               <a:t>piece.isWhite</a:t>
             </a:r>
             <a:r>
-              <a:rPr lang="en-US" sz="1200" b="1" kern="1200" dirty="0">
+              <a:rPr lang="en-US" sz="1200" b="1" kern="1200">
                 <a:solidFill>
                   <a:schemeClr val="tx1"/>
                 </a:solidFill>
@@ -2731,7 +2770,7 @@
           </a:p>
           <a:p>
             <a:r>
-              <a:rPr lang="en-US" sz="1200" b="1" kern="1200" dirty="0">
+              <a:rPr lang="en-US" sz="1200" b="1" kern="1200">
                 <a:solidFill>
                   <a:schemeClr val="tx1"/>
                 </a:solidFill>
@@ -2744,7 +2783,7 @@
           </a:p>
           <a:p>
             <a:r>
-              <a:rPr lang="en-US" sz="1200" kern="1200" dirty="0">
+              <a:rPr lang="en-US" sz="1200" kern="1200">
                 <a:solidFill>
                   <a:schemeClr val="tx1"/>
                 </a:solidFill>
@@ -2757,7 +2796,7 @@
           </a:p>
           <a:p>
             <a:r>
-              <a:rPr lang="en-US" sz="1200" b="1" kern="1200" dirty="0">
+              <a:rPr lang="en-US" sz="1200" b="1" kern="1200">
                 <a:solidFill>
                   <a:schemeClr val="tx1"/>
                 </a:solidFill>
@@ -2768,7 +2807,7 @@
               <a:t>if (!</a:t>
             </a:r>
             <a:r>
-              <a:rPr lang="en-US" sz="1200" b="1" kern="1200" dirty="0" err="1">
+              <a:rPr lang="en-US" sz="1200" b="1" kern="1200" err="1">
                 <a:solidFill>
                   <a:schemeClr val="tx1"/>
                 </a:solidFill>
@@ -2779,7 +2818,7 @@
               <a:t>movedCorrectDirection</a:t>
             </a:r>
             <a:r>
-              <a:rPr lang="en-US" sz="1200" b="1" kern="1200" dirty="0">
+              <a:rPr lang="en-US" sz="1200" b="1" kern="1200">
                 <a:solidFill>
                   <a:schemeClr val="tx1"/>
                 </a:solidFill>
@@ -2790,7 +2829,7 @@
               <a:t>(</a:t>
             </a:r>
             <a:r>
-              <a:rPr lang="en-US" sz="1200" b="1" kern="1200" dirty="0" err="1">
+              <a:rPr lang="en-US" sz="1200" b="1" kern="1200" err="1">
                 <a:solidFill>
                   <a:schemeClr val="tx1"/>
                 </a:solidFill>
@@ -2801,7 +2840,7 @@
               <a:t>dy</a:t>
             </a:r>
             <a:r>
-              <a:rPr lang="en-US" sz="1200" b="1" kern="1200" dirty="0">
+              <a:rPr lang="en-US" sz="1200" b="1" kern="1200">
                 <a:solidFill>
                   <a:schemeClr val="tx1"/>
                 </a:solidFill>
@@ -2814,7 +2853,7 @@
           </a:p>
           <a:p>
             <a:r>
-              <a:rPr lang="en-US" sz="1200" b="1" kern="1200" dirty="0">
+              <a:rPr lang="en-US" sz="1200" b="1" kern="1200">
                 <a:solidFill>
                   <a:schemeClr val="tx1"/>
                 </a:solidFill>
@@ -2827,7 +2866,7 @@
           </a:p>
           <a:p>
             <a:r>
-              <a:rPr lang="en-US" sz="1200" kern="1200" dirty="0">
+              <a:rPr lang="en-US" sz="1200" kern="1200">
                 <a:solidFill>
                   <a:schemeClr val="tx1"/>
                 </a:solidFill>
@@ -2840,7 +2879,7 @@
           </a:p>
           <a:p>
             <a:r>
-              <a:rPr lang="en-US" sz="1200" kern="1200" dirty="0">
+              <a:rPr lang="en-US" sz="1200" kern="1200">
                 <a:solidFill>
                   <a:schemeClr val="tx1"/>
                 </a:solidFill>
@@ -2851,7 +2890,7 @@
               <a:t>dx = </a:t>
             </a:r>
             <a:r>
-              <a:rPr lang="en-US" sz="1200" kern="1200" dirty="0" err="1">
+              <a:rPr lang="en-US" sz="1200" kern="1200" err="1">
                 <a:solidFill>
                   <a:schemeClr val="tx1"/>
                 </a:solidFill>
@@ -2862,7 +2901,7 @@
               <a:t>Math.abs</a:t>
             </a:r>
             <a:r>
-              <a:rPr lang="en-US" sz="1200" kern="1200" dirty="0">
+              <a:rPr lang="en-US" sz="1200" kern="1200">
                 <a:solidFill>
                   <a:schemeClr val="tx1"/>
                 </a:solidFill>
@@ -2875,7 +2914,7 @@
           </a:p>
           <a:p>
             <a:r>
-              <a:rPr lang="en-US" sz="1200" kern="1200" dirty="0" err="1">
+              <a:rPr lang="en-US" sz="1200" kern="1200" err="1">
                 <a:solidFill>
                   <a:schemeClr val="tx1"/>
                 </a:solidFill>
@@ -2886,7 +2925,7 @@
               <a:t>dy</a:t>
             </a:r>
             <a:r>
-              <a:rPr lang="en-US" sz="1200" kern="1200" dirty="0">
+              <a:rPr lang="en-US" sz="1200" kern="1200">
                 <a:solidFill>
                   <a:schemeClr val="tx1"/>
                 </a:solidFill>
@@ -2897,7 +2936,7 @@
               <a:t> = </a:t>
             </a:r>
             <a:r>
-              <a:rPr lang="en-US" sz="1200" kern="1200" dirty="0" err="1">
+              <a:rPr lang="en-US" sz="1200" kern="1200" err="1">
                 <a:solidFill>
                   <a:schemeClr val="tx1"/>
                 </a:solidFill>
@@ -2908,7 +2947,7 @@
               <a:t>Math.abs</a:t>
             </a:r>
             <a:r>
-              <a:rPr lang="en-US" sz="1200" kern="1200" dirty="0">
+              <a:rPr lang="en-US" sz="1200" kern="1200">
                 <a:solidFill>
                   <a:schemeClr val="tx1"/>
                 </a:solidFill>
@@ -2919,7 +2958,7 @@
               <a:t>(</a:t>
             </a:r>
             <a:r>
-              <a:rPr lang="en-US" sz="1200" kern="1200" dirty="0" err="1">
+              <a:rPr lang="en-US" sz="1200" kern="1200" err="1">
                 <a:solidFill>
                   <a:schemeClr val="tx1"/>
                 </a:solidFill>
@@ -2930,7 +2969,7 @@
               <a:t>dy</a:t>
             </a:r>
             <a:r>
-              <a:rPr lang="en-US" sz="1200" kern="1200" dirty="0">
+              <a:rPr lang="en-US" sz="1200" kern="1200">
                 <a:solidFill>
                   <a:schemeClr val="tx1"/>
                 </a:solidFill>
@@ -2943,7 +2982,7 @@
           </a:p>
           <a:p>
             <a:r>
-              <a:rPr lang="en-US" sz="1200" b="1" kern="1200" dirty="0">
+              <a:rPr lang="en-US" sz="1200" b="1" kern="1200">
                 <a:solidFill>
                   <a:schemeClr val="tx1"/>
                 </a:solidFill>
@@ -2954,7 +2993,7 @@
               <a:t>return dx == 1 &amp;&amp; </a:t>
             </a:r>
             <a:r>
-              <a:rPr lang="en-US" sz="1200" b="1" kern="1200" dirty="0" err="1">
+              <a:rPr lang="en-US" sz="1200" b="1" kern="1200" err="1">
                 <a:solidFill>
                   <a:schemeClr val="tx1"/>
                 </a:solidFill>
@@ -2965,7 +3004,7 @@
               <a:t>dy</a:t>
             </a:r>
             <a:r>
-              <a:rPr lang="en-US" sz="1200" b="1" kern="1200" dirty="0">
+              <a:rPr lang="en-US" sz="1200" b="1" kern="1200">
                 <a:solidFill>
                   <a:schemeClr val="tx1"/>
                 </a:solidFill>
@@ -2978,7 +3017,7 @@
           </a:p>
           <a:p>
             <a:r>
-              <a:rPr lang="en-US" sz="1200" kern="1200" dirty="0">
+              <a:rPr lang="en-US" sz="1200" kern="1200">
                 <a:solidFill>
                   <a:schemeClr val="tx1"/>
                 </a:solidFill>
@@ -2988,7 +3027,7 @@
               </a:rPr>
               <a:t>}</a:t>
             </a:r>
-            <a:endParaRPr lang="en-US" dirty="0"/>
+            <a:endParaRPr lang="en-US"/>
           </a:p>
         </p:txBody>
       </p:sp>
@@ -3015,7 +3054,7 @@
               <a:pPr>
                 <a:defRPr/>
               </a:pPr>
-              <a:t>21</a:t>
+              <a:t>22</a:t>
             </a:fld>
             <a:endParaRPr lang="en-US"/>
           </a:p>
@@ -3080,7 +3119,7 @@
           </a:bodyPr>
           <a:lstStyle/>
           <a:p>
-            <a:endParaRPr lang="en-US" dirty="0"/>
+            <a:endParaRPr lang="en-US"/>
           </a:p>
         </p:txBody>
       </p:sp>
@@ -3107,7 +3146,7 @@
               <a:pPr>
                 <a:defRPr/>
               </a:pPr>
-              <a:t>22</a:t>
+              <a:t>23</a:t>
             </a:fld>
             <a:endParaRPr lang="en-US"/>
           </a:p>
@@ -3396,23 +3435,23 @@
           <a:lstStyle/>
           <a:p>
             <a:r>
-              <a:rPr lang="en-US" dirty="0"/>
+              <a:rPr lang="en-US"/>
               <a:t>[Show code example here, just looking at code for </a:t>
             </a:r>
             <a:r>
-              <a:rPr lang="en-US" dirty="0" err="1"/>
+              <a:rPr lang="en-US" err="1"/>
               <a:t>BankAccount</a:t>
             </a:r>
             <a:r>
-              <a:rPr lang="en-US" dirty="0"/>
+              <a:rPr lang="en-US"/>
               <a:t> and </a:t>
             </a:r>
             <a:r>
-              <a:rPr lang="en-US" dirty="0" err="1"/>
+              <a:rPr lang="en-US" err="1"/>
               <a:t>SavingsAccount</a:t>
             </a:r>
             <a:r>
-              <a:rPr lang="en-US" dirty="0"/>
+              <a:rPr lang="en-US"/>
               <a:t> (not writing it live)]</a:t>
             </a:r>
           </a:p>
@@ -4565,110 +4604,110 @@
           <a:lstStyle/>
           <a:p>
             <a:r>
-              <a:rPr lang="en-US" dirty="0"/>
+              <a:rPr lang="en-US"/>
               <a:t>Advanced code sometimes has deep inheritance hierarchies</a:t>
             </a:r>
           </a:p>
           <a:p>
             <a:r>
-              <a:rPr lang="en-US" dirty="0"/>
+              <a:rPr lang="en-US"/>
               <a:t>Trace through a few paths asking students what might be inherited and what might be added at each level (See</a:t>
             </a:r>
             <a:r>
-              <a:rPr lang="en-US" baseline="0" dirty="0"/>
+              <a:rPr lang="en-US" baseline="0"/>
               <a:t> Figure 1 - 3, pages 422 - 3</a:t>
             </a:r>
             <a:r>
-              <a:rPr lang="en-US" dirty="0"/>
+              <a:rPr lang="en-US"/>
               <a:t>)</a:t>
             </a:r>
           </a:p>
           <a:p>
-            <a:endParaRPr lang="en-US" dirty="0"/>
-          </a:p>
-          <a:p>
-            <a:r>
-              <a:rPr lang="en-US" dirty="0"/>
+            <a:endParaRPr lang="en-US"/>
+          </a:p>
+          <a:p>
+            <a:r>
+              <a:rPr lang="en-US"/>
               <a:t>Every </a:t>
             </a:r>
             <a:r>
-              <a:rPr lang="en-US" dirty="0" err="1"/>
+              <a:rPr lang="en-US" err="1"/>
               <a:t>JComponent</a:t>
             </a:r>
             <a:r>
-              <a:rPr lang="en-US" dirty="0"/>
+              <a:rPr lang="en-US"/>
               <a:t> has a width and a height, so the</a:t>
             </a:r>
             <a:r>
-              <a:rPr lang="en-US" baseline="0" dirty="0"/>
+              <a:rPr lang="en-US" baseline="0"/>
               <a:t> </a:t>
             </a:r>
             <a:r>
-              <a:rPr lang="en-US" baseline="0" dirty="0" err="1"/>
+              <a:rPr lang="en-US" baseline="0" err="1"/>
               <a:t>JComponent</a:t>
             </a:r>
             <a:r>
-              <a:rPr lang="en-US" baseline="0" dirty="0"/>
+              <a:rPr lang="en-US" baseline="0"/>
               <a:t> class has a </a:t>
             </a:r>
             <a:r>
-              <a:rPr lang="en-US" baseline="0" dirty="0" err="1"/>
+              <a:rPr lang="en-US" baseline="0" err="1"/>
               <a:t>getWidth</a:t>
             </a:r>
             <a:r>
-              <a:rPr lang="en-US" baseline="0" dirty="0"/>
+              <a:rPr lang="en-US" baseline="0"/>
               <a:t>() and a </a:t>
             </a:r>
             <a:r>
-              <a:rPr lang="en-US" baseline="0" dirty="0" err="1"/>
+              <a:rPr lang="en-US" baseline="0" err="1"/>
               <a:t>getHeight</a:t>
             </a:r>
             <a:r>
-              <a:rPr lang="en-US" baseline="0" dirty="0"/>
+              <a:rPr lang="en-US" baseline="0"/>
               <a:t>() method.</a:t>
             </a:r>
           </a:p>
           <a:p>
-            <a:endParaRPr lang="en-US" baseline="0" dirty="0"/>
-          </a:p>
-          <a:p>
-            <a:r>
-              <a:rPr lang="en-US" baseline="0" dirty="0"/>
+            <a:endParaRPr lang="en-US" baseline="0"/>
+          </a:p>
+          <a:p>
+            <a:r>
+              <a:rPr lang="en-US" baseline="0"/>
               <a:t>Every </a:t>
             </a:r>
             <a:r>
-              <a:rPr lang="en-US" baseline="0" dirty="0" err="1"/>
+              <a:rPr lang="en-US" baseline="0" err="1"/>
               <a:t>JButton</a:t>
             </a:r>
             <a:r>
-              <a:rPr lang="en-US" baseline="0" dirty="0"/>
+              <a:rPr lang="en-US" baseline="0"/>
               <a:t> can have text or an icon on it, so the </a:t>
             </a:r>
             <a:r>
-              <a:rPr lang="en-US" baseline="0" dirty="0" err="1"/>
+              <a:rPr lang="en-US" baseline="0" err="1"/>
               <a:t>AbstractButton</a:t>
             </a:r>
             <a:r>
-              <a:rPr lang="en-US" baseline="0" dirty="0"/>
+              <a:rPr lang="en-US" baseline="0"/>
               <a:t> class has a </a:t>
             </a:r>
             <a:r>
-              <a:rPr lang="en-US" baseline="0" dirty="0" err="1"/>
+              <a:rPr lang="en-US" baseline="0" err="1"/>
               <a:t>setText</a:t>
             </a:r>
             <a:r>
-              <a:rPr lang="en-US" baseline="0" dirty="0"/>
+              <a:rPr lang="en-US" baseline="0"/>
               <a:t>() and a </a:t>
             </a:r>
             <a:r>
-              <a:rPr lang="en-US" baseline="0" dirty="0" err="1"/>
+              <a:rPr lang="en-US" baseline="0" err="1"/>
               <a:t>setIcon</a:t>
             </a:r>
             <a:r>
-              <a:rPr lang="en-US" baseline="0" dirty="0"/>
+              <a:rPr lang="en-US" baseline="0"/>
               <a:t>() method.</a:t>
             </a:r>
-            <a:endParaRPr lang="en-US" dirty="0"/>
+            <a:endParaRPr lang="en-US"/>
           </a:p>
         </p:txBody>
       </p:sp>
@@ -4896,9 +4935,9 @@
               <a:pPr>
                 <a:defRPr/>
               </a:pPr>
-              <a:t>Tuesday, March 1, 2022</a:t>
+              <a:t>Tuesday, November 22, 2022</a:t>
             </a:fld>
-            <a:endParaRPr lang="en-US" dirty="0"/>
+            <a:endParaRPr lang="en-US"/>
           </a:p>
         </p:txBody>
       </p:sp>
@@ -4949,7 +4988,7 @@
               </a:pPr>
               <a:t>‹#›</a:t>
             </a:fld>
-            <a:endParaRPr lang="en-US" dirty="0"/>
+            <a:endParaRPr lang="en-US"/>
           </a:p>
         </p:txBody>
       </p:sp>
@@ -5079,9 +5118,9 @@
               <a:pPr>
                 <a:defRPr/>
               </a:pPr>
-              <a:t>Tuesday, March 1, 2022</a:t>
+              <a:t>Tuesday, November 22, 2022</a:t>
             </a:fld>
-            <a:endParaRPr lang="en-US" dirty="0"/>
+            <a:endParaRPr lang="en-US"/>
           </a:p>
         </p:txBody>
       </p:sp>
@@ -5272,9 +5311,9 @@
               <a:pPr>
                 <a:defRPr/>
               </a:pPr>
-              <a:t>Tuesday, March 1, 2022</a:t>
+              <a:t>Tuesday, November 22, 2022</a:t>
             </a:fld>
-            <a:endParaRPr lang="en-US" dirty="0"/>
+            <a:endParaRPr lang="en-US"/>
           </a:p>
         </p:txBody>
       </p:sp>
@@ -5455,9 +5494,9 @@
               <a:pPr>
                 <a:defRPr/>
               </a:pPr>
-              <a:t>Tuesday, March 1, 2022</a:t>
+              <a:t>Tuesday, November 22, 2022</a:t>
             </a:fld>
-            <a:endParaRPr lang="en-US" dirty="0"/>
+            <a:endParaRPr lang="en-US"/>
           </a:p>
         </p:txBody>
       </p:sp>
@@ -5715,7 +5754,7 @@
               <a:pPr>
                 <a:defRPr/>
               </a:pPr>
-              <a:t>Tuesday, March 1, 2022</a:t>
+              <a:t>Tuesday, November 22, 2022</a:t>
             </a:fld>
             <a:endParaRPr lang="en-US"/>
           </a:p>
@@ -6015,7 +6054,7 @@
               <a:pPr>
                 <a:defRPr/>
               </a:pPr>
-              <a:t>Tuesday, March 1, 2022</a:t>
+              <a:t>Tuesday, November 22, 2022</a:t>
             </a:fld>
             <a:endParaRPr lang="en-US"/>
           </a:p>
@@ -6449,7 +6488,7 @@
               <a:pPr>
                 <a:defRPr/>
               </a:pPr>
-              <a:t>Tuesday, March 1, 2022</a:t>
+              <a:t>Tuesday, November 22, 2022</a:t>
             </a:fld>
             <a:endParaRPr lang="en-US"/>
           </a:p>
@@ -6581,7 +6620,7 @@
               <a:pPr>
                 <a:defRPr/>
               </a:pPr>
-              <a:t>Tuesday, March 1, 2022</a:t>
+              <a:t>Tuesday, November 22, 2022</a:t>
             </a:fld>
             <a:endParaRPr lang="en-US"/>
           </a:p>
@@ -6691,9 +6730,9 @@
               <a:pPr>
                 <a:defRPr/>
               </a:pPr>
-              <a:t>Tuesday, March 1, 2022</a:t>
+              <a:t>Tuesday, November 22, 2022</a:t>
             </a:fld>
-            <a:endParaRPr lang="en-US" dirty="0"/>
+            <a:endParaRPr lang="en-US"/>
           </a:p>
         </p:txBody>
       </p:sp>
@@ -6981,7 +7020,7 @@
               <a:pPr>
                 <a:defRPr/>
               </a:pPr>
-              <a:t>Tuesday, March 1, 2022</a:t>
+              <a:t>Tuesday, November 22, 2022</a:t>
             </a:fld>
             <a:endParaRPr lang="en-US"/>
           </a:p>
@@ -7248,7 +7287,7 @@
               <a:pPr>
                 <a:defRPr/>
               </a:pPr>
-              <a:t>Tuesday, March 1, 2022</a:t>
+              <a:t>Tuesday, November 22, 2022</a:t>
             </a:fld>
             <a:endParaRPr lang="en-US"/>
           </a:p>
@@ -7474,9 +7513,9 @@
               <a:pPr>
                 <a:defRPr/>
               </a:pPr>
-              <a:t>Tuesday, March 1, 2022</a:t>
+              <a:t>Tuesday, November 22, 2022</a:t>
             </a:fld>
-            <a:endParaRPr lang="en-US" dirty="0"/>
+            <a:endParaRPr lang="en-US"/>
           </a:p>
         </p:txBody>
       </p:sp>
@@ -7883,7 +7922,6 @@
               <a:rPr lang="en-US"/>
               <a:t>CSSE 220</a:t>
             </a:r>
-            <a:endParaRPr lang="en-US" dirty="0"/>
           </a:p>
         </p:txBody>
       </p:sp>
@@ -7919,7 +7957,7 @@
           <p:cNvPr id="5" name="Rectangle 4">
             <a:extLst>
               <a:ext uri="{FF2B5EF4-FFF2-40B4-BE49-F238E27FC236}">
-                <a16:creationId xmlns:a16="http://schemas.microsoft.com/office/drawing/2014/main" id="{8C943F6A-D22C-8C41-A224-BD57A5FC8A41}"/>
+                <a16:creationId xmlns:a16="http://schemas.microsoft.com/office/drawing/2014/main" id="{74C4FB13-A9C6-AE49-93D9-007B088B724C}"/>
               </a:ext>
             </a:extLst>
           </p:cNvPr>
@@ -8007,6 +8045,107 @@
           </a:p>
         </p:txBody>
       </p:sp>
+      <p:sp>
+        <p:nvSpPr>
+          <p:cNvPr id="3" name="TextBox 2">
+            <a:extLst>
+              <a:ext uri="{FF2B5EF4-FFF2-40B4-BE49-F238E27FC236}">
+                <a16:creationId xmlns:a16="http://schemas.microsoft.com/office/drawing/2014/main" id="{D3965D5B-A23C-9F83-09AB-957BB83593D3}"/>
+              </a:ext>
+            </a:extLst>
+          </p:cNvPr>
+          <p:cNvSpPr txBox="1"/>
+          <p:nvPr/>
+        </p:nvSpPr>
+        <p:spPr>
+          <a:xfrm>
+            <a:off x="3048001" y="-20697"/>
+            <a:ext cx="5903496" cy="1046440"/>
+          </a:xfrm>
+          <a:prstGeom prst="rect">
+            <a:avLst/>
+          </a:prstGeom>
+          <a:noFill/>
+          <a:ln w="12700" cap="flat">
+            <a:noFill/>
+            <a:miter lim="400000"/>
+          </a:ln>
+          <a:effectLst/>
+        </p:spPr>
+        <p:style>
+          <a:lnRef idx="0">
+            <a:scrgbClr r="0" g="0" b="0"/>
+          </a:lnRef>
+          <a:fillRef idx="0">
+            <a:scrgbClr r="0" g="0" b="0"/>
+          </a:fillRef>
+          <a:effectRef idx="0">
+            <a:scrgbClr r="0" g="0" b="0"/>
+          </a:effectRef>
+          <a:fontRef idx="none"/>
+        </p:style>
+        <p:txBody>
+          <a:bodyPr wrap="square">
+            <a:spAutoFit/>
+          </a:bodyPr>
+          <a:lstStyle/>
+          <a:p>
+            <a:r>
+              <a:rPr lang="en-US" dirty="0">
+                <a:highlight>
+                  <a:srgbClr val="FFFF00"/>
+                </a:highlight>
+              </a:rPr>
+              <a:t>Today’s Attendance password</a:t>
+            </a:r>
+          </a:p>
+          <a:p>
+            <a:r>
+              <a:rPr lang="en-US" sz="4400">
+                <a:highlight>
+                  <a:srgbClr val="FFFF00"/>
+                </a:highlight>
+              </a:rPr>
+              <a:t>_________</a:t>
+            </a:r>
+            <a:endParaRPr lang="en-US" sz="4400" dirty="0">
+              <a:highlight>
+                <a:srgbClr val="FFFF00"/>
+              </a:highlight>
+            </a:endParaRPr>
+          </a:p>
+        </p:txBody>
+      </p:sp>
+      <p:pic>
+        <p:nvPicPr>
+          <p:cNvPr id="4" name="Picture 3">
+            <a:extLst>
+              <a:ext uri="{FF2B5EF4-FFF2-40B4-BE49-F238E27FC236}">
+                <a16:creationId xmlns:a16="http://schemas.microsoft.com/office/drawing/2014/main" id="{D3D101E2-BF4D-9EF4-470F-47C893647DC3}"/>
+              </a:ext>
+            </a:extLst>
+          </p:cNvPr>
+          <p:cNvPicPr>
+            <a:picLocks noChangeAspect="1"/>
+          </p:cNvPicPr>
+          <p:nvPr/>
+        </p:nvPicPr>
+        <p:blipFill>
+          <a:blip r:embed="rId3"/>
+          <a:stretch>
+            <a:fillRect/>
+          </a:stretch>
+        </p:blipFill>
+        <p:spPr>
+          <a:xfrm>
+            <a:off x="5937409" y="1015626"/>
+            <a:ext cx="2816626" cy="2439173"/>
+          </a:xfrm>
+          <a:prstGeom prst="rect">
+            <a:avLst/>
+          </a:prstGeom>
+        </p:spPr>
+      </p:pic>
     </p:spTree>
   </p:cSld>
   <p:clrMapOvr>
@@ -8613,6 +8752,38 @@
         </p:nvSpPr>
         <p:spPr/>
         <p:txBody>
+          <a:bodyPr>
+            <a:normAutofit fontScale="90000"/>
+          </a:bodyPr>
+          <a:lstStyle/>
+          <a:p>
+            <a:pPr>
+              <a:defRPr/>
+            </a:pPr>
+            <a:r>
+              <a:rPr lang="en-US"/>
+              <a:t>How Subclass calls Superclass Methods</a:t>
+            </a:r>
+          </a:p>
+        </p:txBody>
+      </p:sp>
+      <p:sp>
+        <p:nvSpPr>
+          <p:cNvPr id="2" name="Content Placeholder 1"/>
+          <p:cNvSpPr>
+            <a:spLocks noGrp="1"/>
+          </p:cNvSpPr>
+          <p:nvPr>
+            <p:ph idx="1"/>
+          </p:nvPr>
+        </p:nvSpPr>
+        <p:spPr>
+          <a:xfrm>
+            <a:off x="250371" y="1567543"/>
+            <a:ext cx="8327571" cy="4525963"/>
+          </a:xfrm>
+        </p:spPr>
+        <p:txBody>
           <a:bodyPr/>
           <a:lstStyle/>
           <a:p>
@@ -8621,40 +8792,86 @@
             </a:pPr>
             <a:r>
               <a:rPr lang="en-US" dirty="0"/>
-              <a:t>Super Calls</a:t>
-            </a:r>
-          </a:p>
-        </p:txBody>
-      </p:sp>
-      <p:sp>
-        <p:nvSpPr>
-          <p:cNvPr id="2" name="Content Placeholder 1"/>
-          <p:cNvSpPr>
-            <a:spLocks noGrp="1"/>
-          </p:cNvSpPr>
-          <p:nvPr>
-            <p:ph idx="1"/>
-          </p:nvPr>
-        </p:nvSpPr>
-        <p:spPr/>
-        <p:txBody>
-          <a:bodyPr/>
-          <a:lstStyle/>
+              <a:t>Calling a superclass </a:t>
+            </a:r>
+            <a:r>
+              <a:rPr lang="en-US" b="1" dirty="0">
+                <a:solidFill>
+                  <a:schemeClr val="accent3"/>
+                </a:solidFill>
+              </a:rPr>
+              <a:t>method </a:t>
+            </a:r>
+            <a:r>
+              <a:rPr lang="en-US" dirty="0"/>
+              <a:t>from the subclass:</a:t>
+            </a:r>
+          </a:p>
+          <a:p>
+            <a:pPr marL="457200" lvl="1" indent="0">
+              <a:buNone/>
+              <a:defRPr/>
+            </a:pPr>
+            <a:r>
+              <a:rPr lang="en-US" b="1" dirty="0" err="1">
+                <a:solidFill>
+                  <a:schemeClr val="accent3"/>
+                </a:solidFill>
+                <a:latin typeface="Courier New" panose="02070309020205020404" pitchFamily="49" charset="0"/>
+                <a:cs typeface="Courier New" panose="02070309020205020404" pitchFamily="49" charset="0"/>
+              </a:rPr>
+              <a:t>super.methodName</a:t>
+            </a:r>
+            <a:r>
+              <a:rPr lang="en-US" b="1" dirty="0">
+                <a:solidFill>
+                  <a:schemeClr val="accent3"/>
+                </a:solidFill>
+                <a:latin typeface="Courier New" panose="02070309020205020404" pitchFamily="49" charset="0"/>
+                <a:cs typeface="Courier New" panose="02070309020205020404" pitchFamily="49" charset="0"/>
+              </a:rPr>
+              <a:t>(</a:t>
+            </a:r>
+            <a:r>
+              <a:rPr lang="en-US" b="1" dirty="0" err="1">
+                <a:solidFill>
+                  <a:schemeClr val="accent3"/>
+                </a:solidFill>
+                <a:latin typeface="Courier New" panose="02070309020205020404" pitchFamily="49" charset="0"/>
+                <a:cs typeface="Courier New" panose="02070309020205020404" pitchFamily="49" charset="0"/>
+              </a:rPr>
+              <a:t>args</a:t>
+            </a:r>
+            <a:r>
+              <a:rPr lang="en-US" b="1" dirty="0">
+                <a:solidFill>
+                  <a:schemeClr val="accent3"/>
+                </a:solidFill>
+                <a:latin typeface="Courier New" panose="02070309020205020404" pitchFamily="49" charset="0"/>
+                <a:cs typeface="Courier New" panose="02070309020205020404" pitchFamily="49" charset="0"/>
+              </a:rPr>
+              <a:t>);</a:t>
+            </a:r>
+          </a:p>
           <a:p>
             <a:pPr>
               <a:defRPr/>
             </a:pPr>
+            <a:endParaRPr lang="en-US" dirty="0"/>
+          </a:p>
+          <a:p>
+            <a:pPr>
+              <a:defRPr/>
+            </a:pPr>
+            <a:endParaRPr lang="en-US" dirty="0"/>
+          </a:p>
+          <a:p>
+            <a:pPr>
+              <a:defRPr/>
+            </a:pPr>
             <a:r>
               <a:rPr lang="en-US" dirty="0"/>
-              <a:t>Calling </a:t>
-            </a:r>
-            <a:r>
-              <a:rPr lang="en-US" dirty="0" err="1"/>
-              <a:t>superclass</a:t>
-            </a:r>
-            <a:r>
-              <a:rPr lang="en-US" dirty="0"/>
-              <a:t> </a:t>
+              <a:t>Calling superclass </a:t>
             </a:r>
             <a:r>
               <a:rPr lang="en-US" b="1" dirty="0">
@@ -8662,7 +8879,7 @@
                   <a:schemeClr val="accent3"/>
                 </a:solidFill>
               </a:rPr>
-              <a:t>method</a:t>
+              <a:t>constructor</a:t>
             </a:r>
             <a:r>
               <a:rPr lang="en-US" dirty="0"/>
@@ -8670,115 +8887,37 @@
             </a:r>
           </a:p>
           <a:p>
-            <a:pPr lvl="1">
-              <a:defRPr/>
-            </a:pPr>
+            <a:pPr marL="457200" lvl="1" indent="0">
+              <a:buNone/>
+              <a:defRPr/>
+            </a:pPr>
+            <a:r>
+              <a:rPr lang="en-US" b="1" dirty="0">
+                <a:solidFill>
+                  <a:schemeClr val="accent3"/>
+                </a:solidFill>
+                <a:latin typeface="Courier New" panose="02070309020205020404" pitchFamily="49" charset="0"/>
+                <a:cs typeface="Courier New" panose="02070309020205020404" pitchFamily="49" charset="0"/>
+              </a:rPr>
+              <a:t>super(</a:t>
+            </a:r>
             <a:r>
               <a:rPr lang="en-US" b="1" dirty="0" err="1">
                 <a:solidFill>
                   <a:schemeClr val="accent3"/>
                 </a:solidFill>
-                <a:latin typeface="Lucida Sans Typewriter" pitchFamily="49" charset="0"/>
-              </a:rPr>
-              <a:t>super.methodName</a:t>
+                <a:latin typeface="Courier New" panose="02070309020205020404" pitchFamily="49" charset="0"/>
+                <a:cs typeface="Courier New" panose="02070309020205020404" pitchFamily="49" charset="0"/>
+              </a:rPr>
+              <a:t>args</a:t>
             </a:r>
             <a:r>
               <a:rPr lang="en-US" b="1" dirty="0">
                 <a:solidFill>
                   <a:schemeClr val="accent3"/>
                 </a:solidFill>
-                <a:latin typeface="Lucida Sans Typewriter" pitchFamily="49" charset="0"/>
-              </a:rPr>
-              <a:t>(</a:t>
-            </a:r>
-            <a:r>
-              <a:rPr lang="en-US" b="1" dirty="0" err="1">
-                <a:solidFill>
-                  <a:schemeClr val="accent3"/>
-                </a:solidFill>
-                <a:latin typeface="Lucida Sans Typewriter" pitchFamily="49" charset="0"/>
-              </a:rPr>
-              <a:t>args</a:t>
-            </a:r>
-            <a:r>
-              <a:rPr lang="en-US" b="1" dirty="0">
-                <a:solidFill>
-                  <a:schemeClr val="accent3"/>
-                </a:solidFill>
-                <a:latin typeface="Lucida Sans Typewriter" pitchFamily="49" charset="0"/>
-              </a:rPr>
-              <a:t>);</a:t>
-            </a:r>
-          </a:p>
-          <a:p>
-            <a:pPr>
-              <a:defRPr/>
-            </a:pPr>
-            <a:endParaRPr lang="en-US" dirty="0"/>
-          </a:p>
-          <a:p>
-            <a:pPr>
-              <a:defRPr/>
-            </a:pPr>
-            <a:endParaRPr lang="en-US" dirty="0"/>
-          </a:p>
-          <a:p>
-            <a:pPr>
-              <a:defRPr/>
-            </a:pPr>
-            <a:r>
-              <a:rPr lang="en-US" dirty="0"/>
-              <a:t>Calling </a:t>
-            </a:r>
-            <a:r>
-              <a:rPr lang="en-US" dirty="0" err="1"/>
-              <a:t>superclass</a:t>
-            </a:r>
-            <a:r>
-              <a:rPr lang="en-US" dirty="0"/>
-              <a:t> </a:t>
-            </a:r>
-            <a:r>
-              <a:rPr lang="en-US" b="1" dirty="0">
-                <a:solidFill>
-                  <a:schemeClr val="accent3"/>
-                </a:solidFill>
-              </a:rPr>
-              <a:t>constructor</a:t>
-            </a:r>
-            <a:r>
-              <a:rPr lang="en-US" dirty="0"/>
-              <a:t>:</a:t>
-            </a:r>
-          </a:p>
-          <a:p>
-            <a:pPr lvl="1">
-              <a:defRPr/>
-            </a:pPr>
-            <a:r>
-              <a:rPr lang="en-US" b="1" dirty="0">
-                <a:solidFill>
-                  <a:schemeClr val="accent3"/>
-                </a:solidFill>
-                <a:latin typeface="Lucida Sans Typewriter" pitchFamily="49" charset="0"/>
-              </a:rPr>
-              <a:t>super(</a:t>
-            </a:r>
-            <a:r>
-              <a:rPr lang="en-US" b="1" dirty="0" err="1">
-                <a:solidFill>
-                  <a:schemeClr val="accent3"/>
-                </a:solidFill>
-                <a:latin typeface="Lucida Sans Typewriter" pitchFamily="49" charset="0"/>
-              </a:rPr>
-              <a:t>args</a:t>
-            </a:r>
-            <a:r>
-              <a:rPr lang="en-US" b="1" dirty="0">
-                <a:solidFill>
-                  <a:schemeClr val="accent3"/>
-                </a:solidFill>
-                <a:latin typeface="Lucida Sans Typewriter" pitchFamily="49" charset="0"/>
+                <a:latin typeface="Courier New" panose="02070309020205020404" pitchFamily="49" charset="0"/>
+                <a:cs typeface="Courier New" panose="02070309020205020404" pitchFamily="49" charset="0"/>
               </a:rPr>
               <a:t>);</a:t>
             </a:r>
@@ -8793,8 +8932,8 @@
         </p:nvSpPr>
         <p:spPr>
           <a:xfrm>
-            <a:off x="5546811" y="5337614"/>
-            <a:ext cx="3200400" cy="1206500"/>
+            <a:off x="4669971" y="5076357"/>
+            <a:ext cx="3903068" cy="1206500"/>
           </a:xfrm>
           <a:prstGeom prst="borderCallout2">
             <a:avLst>
@@ -8802,8 +8941,8 @@
               <a:gd name="adj2" fmla="val -1170"/>
               <a:gd name="adj3" fmla="val -21758"/>
               <a:gd name="adj4" fmla="val -18637"/>
-              <a:gd name="adj5" fmla="val -55778"/>
-              <a:gd name="adj6" fmla="val -51994"/>
+              <a:gd name="adj5" fmla="val -34124"/>
+              <a:gd name="adj6" fmla="val -33879"/>
             </a:avLst>
           </a:prstGeom>
         </p:spPr>
@@ -8832,7 +8971,7 @@
             </a:pPr>
             <a:r>
               <a:rPr lang="en-US" sz="2400" dirty="0"/>
-              <a:t>Must be the first line of the subclass constructor</a:t>
+              <a:t>Must appear as the first line of the subclass constructor</a:t>
             </a:r>
           </a:p>
         </p:txBody>
@@ -8882,7 +9021,7 @@
               <a:defRPr/>
             </a:pPr>
             <a:r>
-              <a:rPr lang="en-US" sz="1800" dirty="0">
+              <a:rPr lang="en-US" sz="1800">
                 <a:solidFill>
                   <a:schemeClr val="bg1"/>
                 </a:solidFill>
@@ -9072,7 +9211,7 @@
     </p:spTree>
     <p:extLst>
       <p:ext uri="{BB962C8B-B14F-4D97-AF65-F5344CB8AC3E}">
-        <p14:creationId xmlns:p14="http://schemas.microsoft.com/office/powerpoint/2010/main" val="2133976266"/>
+        <p14:creationId xmlns:p14="http://schemas.microsoft.com/office/powerpoint/2010/main" val="4000348338"/>
       </p:ext>
     </p:extLst>
   </p:cSld>
@@ -9193,7 +9332,7 @@
     </p:spTree>
     <p:extLst>
       <p:ext uri="{BB962C8B-B14F-4D97-AF65-F5344CB8AC3E}">
-        <p14:creationId xmlns:p14="http://schemas.microsoft.com/office/powerpoint/2010/main" val="3771829790"/>
+        <p14:creationId xmlns:p14="http://schemas.microsoft.com/office/powerpoint/2010/main" val="2922646918"/>
       </p:ext>
     </p:extLst>
   </p:cSld>
@@ -9222,6 +9361,102 @@
       </p:grpSpPr>
       <p:sp>
         <p:nvSpPr>
+          <p:cNvPr id="2" name="Title 1"/>
+          <p:cNvSpPr>
+            <a:spLocks noGrp="1"/>
+          </p:cNvSpPr>
+          <p:nvPr>
+            <p:ph type="title"/>
+          </p:nvPr>
+        </p:nvSpPr>
+        <p:spPr/>
+        <p:txBody>
+          <a:bodyPr/>
+          <a:lstStyle/>
+          <a:p>
+            <a:r>
+              <a:rPr lang="en-US" dirty="0"/>
+              <a:t>In Eclipse – </a:t>
+            </a:r>
+            <a:r>
+              <a:rPr lang="en-US" i="1" dirty="0"/>
+              <a:t>new</a:t>
+            </a:r>
+            <a:r>
+              <a:rPr lang="en-US" dirty="0"/>
+              <a:t> a Java Class</a:t>
+            </a:r>
+          </a:p>
+        </p:txBody>
+      </p:sp>
+      <p:pic>
+        <p:nvPicPr>
+          <p:cNvPr id="6" name="Picture 5" descr="Graphical user interface, application&#10;&#10;Description automatically generated">
+            <a:extLst>
+              <a:ext uri="{FF2B5EF4-FFF2-40B4-BE49-F238E27FC236}">
+                <a16:creationId xmlns:a16="http://schemas.microsoft.com/office/drawing/2014/main" id="{8B5C524B-D78B-309F-5E7A-0670BD1C2E52}"/>
+              </a:ext>
+            </a:extLst>
+          </p:cNvPr>
+          <p:cNvPicPr>
+            <a:picLocks noChangeAspect="1"/>
+          </p:cNvPicPr>
+          <p:nvPr/>
+        </p:nvPicPr>
+        <p:blipFill>
+          <a:blip r:embed="rId2">
+            <a:extLst>
+              <a:ext uri="{28A0092B-C50C-407E-A947-70E740481C1C}">
+                <a14:useLocalDpi xmlns:a14="http://schemas.microsoft.com/office/drawing/2010/main" val="0"/>
+              </a:ext>
+            </a:extLst>
+          </a:blip>
+          <a:stretch>
+            <a:fillRect/>
+          </a:stretch>
+        </p:blipFill>
+        <p:spPr>
+          <a:xfrm>
+            <a:off x="1825367" y="1208313"/>
+            <a:ext cx="5356952" cy="5464629"/>
+          </a:xfrm>
+          <a:prstGeom prst="rect">
+            <a:avLst/>
+          </a:prstGeom>
+        </p:spPr>
+      </p:pic>
+    </p:spTree>
+    <p:extLst>
+      <p:ext uri="{BB962C8B-B14F-4D97-AF65-F5344CB8AC3E}">
+        <p14:creationId xmlns:p14="http://schemas.microsoft.com/office/powerpoint/2010/main" val="3235904320"/>
+      </p:ext>
+    </p:extLst>
+  </p:cSld>
+  <p:clrMapOvr>
+    <a:masterClrMapping/>
+  </p:clrMapOvr>
+</p:sld>
+</file>
+
+<file path=ppt/slides/slide16.xml><?xml version="1.0" encoding="utf-8"?>
+<p:sld xmlns:a="http://schemas.openxmlformats.org/drawingml/2006/main" xmlns:r="http://schemas.openxmlformats.org/officeDocument/2006/relationships" xmlns:p="http://schemas.openxmlformats.org/presentationml/2006/main">
+  <p:cSld>
+    <p:spTree>
+      <p:nvGrpSpPr>
+        <p:cNvPr id="1" name=""/>
+        <p:cNvGrpSpPr/>
+        <p:nvPr/>
+      </p:nvGrpSpPr>
+      <p:grpSpPr>
+        <a:xfrm>
+          <a:off x="0" y="0"/>
+          <a:ext cx="0" cy="0"/>
+          <a:chOff x="0" y="0"/>
+          <a:chExt cx="0" cy="0"/>
+        </a:xfrm>
+      </p:grpSpPr>
+      <p:sp>
+        <p:nvSpPr>
           <p:cNvPr id="3" name="Title 2"/>
           <p:cNvSpPr>
             <a:spLocks noGrp="1"/>
@@ -9372,12 +9607,16 @@
               <a:t>ba.deposit</a:t>
             </a:r>
             <a:r>
-              <a:rPr lang="en-US" sz="2400" dirty="0">
+              <a:rPr lang="en-US" sz="2400">
                 <a:latin typeface="Courier New" panose="02070309020205020404" pitchFamily="49" charset="0"/>
                 <a:cs typeface="Courier New" panose="02070309020205020404" pitchFamily="49" charset="0"/>
               </a:rPr>
-              <a:t>(100);</a:t>
-            </a:r>
+              <a:t>(100.0);</a:t>
+            </a:r>
+            <a:endParaRPr lang="en-US" sz="2400" dirty="0">
+              <a:latin typeface="Courier New" panose="02070309020205020404" pitchFamily="49" charset="0"/>
+              <a:cs typeface="Courier New" panose="02070309020205020404" pitchFamily="49" charset="0"/>
+            </a:endParaRPr>
           </a:p>
           <a:p>
             <a:pPr lvl="1">
@@ -9513,7 +9752,7 @@
 </p:sld>
 </file>
 
-<file path=ppt/slides/slide16.xml><?xml version="1.0" encoding="utf-8"?>
+<file path=ppt/slides/slide17.xml><?xml version="1.0" encoding="utf-8"?>
 <p:sld xmlns:a="http://schemas.openxmlformats.org/drawingml/2006/main" xmlns:r="http://schemas.openxmlformats.org/officeDocument/2006/relationships" xmlns:p="http://schemas.openxmlformats.org/presentationml/2006/main">
   <p:cSld>
     <p:spTree>
@@ -9792,7 +10031,7 @@
 </p:sld>
 </file>
 
-<file path=ppt/slides/slide17.xml><?xml version="1.0" encoding="utf-8"?>
+<file path=ppt/slides/slide18.xml><?xml version="1.0" encoding="utf-8"?>
 <p:sld xmlns:a="http://schemas.openxmlformats.org/drawingml/2006/main" xmlns:r="http://schemas.openxmlformats.org/officeDocument/2006/relationships" xmlns:p="http://schemas.openxmlformats.org/presentationml/2006/main">
   <p:cSld>
     <p:spTree>
@@ -10121,7 +10360,7 @@
 </p:sld>
 </file>
 
-<file path=ppt/slides/slide18.xml><?xml version="1.0" encoding="utf-8"?>
+<file path=ppt/slides/slide19.xml><?xml version="1.0" encoding="utf-8"?>
 <p:sld xmlns:a="http://schemas.openxmlformats.org/drawingml/2006/main" xmlns:r="http://schemas.openxmlformats.org/officeDocument/2006/relationships" xmlns:p="http://schemas.openxmlformats.org/presentationml/2006/main">
   <p:cSld>
     <p:spTree>
@@ -10516,120 +10755,6 @@
 </p:sld>
 </file>
 
-<file path=ppt/slides/slide19.xml><?xml version="1.0" encoding="utf-8"?>
-<p:sld xmlns:a="http://schemas.openxmlformats.org/drawingml/2006/main" xmlns:r="http://schemas.openxmlformats.org/officeDocument/2006/relationships" xmlns:p="http://schemas.openxmlformats.org/presentationml/2006/main">
-  <p:cSld>
-    <p:spTree>
-      <p:nvGrpSpPr>
-        <p:cNvPr id="1" name=""/>
-        <p:cNvGrpSpPr/>
-        <p:nvPr/>
-      </p:nvGrpSpPr>
-      <p:grpSpPr>
-        <a:xfrm>
-          <a:off x="0" y="0"/>
-          <a:ext cx="0" cy="0"/>
-          <a:chOff x="0" y="0"/>
-          <a:chExt cx="0" cy="0"/>
-        </a:xfrm>
-      </p:grpSpPr>
-      <p:sp>
-        <p:nvSpPr>
-          <p:cNvPr id="2" name="Title 1"/>
-          <p:cNvSpPr>
-            <a:spLocks noGrp="1"/>
-          </p:cNvSpPr>
-          <p:nvPr>
-            <p:ph type="title"/>
-          </p:nvPr>
-        </p:nvSpPr>
-        <p:spPr/>
-        <p:txBody>
-          <a:bodyPr/>
-          <a:lstStyle/>
-          <a:p>
-            <a:r>
-              <a:rPr lang="en-US" dirty="0"/>
-              <a:t>Live coding</a:t>
-            </a:r>
-          </a:p>
-        </p:txBody>
-      </p:sp>
-      <p:sp>
-        <p:nvSpPr>
-          <p:cNvPr id="3" name="Content Placeholder 2"/>
-          <p:cNvSpPr>
-            <a:spLocks noGrp="1"/>
-          </p:cNvSpPr>
-          <p:nvPr>
-            <p:ph idx="1"/>
-          </p:nvPr>
-        </p:nvSpPr>
-        <p:spPr/>
-        <p:txBody>
-          <a:bodyPr/>
-          <a:lstStyle/>
-          <a:p>
-            <a:r>
-              <a:rPr lang="en-US" dirty="0"/>
-              <a:t>Let’s look at </a:t>
-            </a:r>
-            <a:r>
-              <a:rPr lang="en-US" dirty="0" err="1"/>
-              <a:t>chessPieces</a:t>
-            </a:r>
-            <a:r>
-              <a:rPr lang="en-US" dirty="0"/>
-              <a:t>/</a:t>
-            </a:r>
-            <a:r>
-              <a:rPr lang="en-US" dirty="0" err="1"/>
-              <a:t>chessSupport</a:t>
-            </a:r>
-            <a:endParaRPr lang="en-US" dirty="0"/>
-          </a:p>
-          <a:p>
-            <a:pPr lvl="1"/>
-            <a:r>
-              <a:rPr lang="en-US" dirty="0"/>
-              <a:t>Let’s Look at King and </a:t>
-            </a:r>
-            <a:r>
-              <a:rPr lang="en-US" dirty="0" err="1"/>
-              <a:t>ChessPiece</a:t>
-            </a:r>
-            <a:endParaRPr lang="en-US" dirty="0"/>
-          </a:p>
-          <a:p>
-            <a:pPr lvl="1"/>
-            <a:r>
-              <a:rPr lang="en-US" dirty="0" err="1"/>
-              <a:t>StandardBoardProvider</a:t>
-            </a:r>
-            <a:r>
-              <a:rPr lang="en-US" dirty="0"/>
-              <a:t> (uncomment King lines)</a:t>
-            </a:r>
-          </a:p>
-          <a:p>
-            <a:pPr lvl="1"/>
-            <a:endParaRPr lang="en-US" dirty="0"/>
-          </a:p>
-        </p:txBody>
-      </p:sp>
-    </p:spTree>
-    <p:extLst>
-      <p:ext uri="{BB962C8B-B14F-4D97-AF65-F5344CB8AC3E}">
-        <p14:creationId xmlns:p14="http://schemas.microsoft.com/office/powerpoint/2010/main" val="2864090242"/>
-      </p:ext>
-    </p:extLst>
-  </p:cSld>
-  <p:clrMapOvr>
-    <a:masterClrMapping/>
-  </p:clrMapOvr>
-</p:sld>
-</file>
-
 <file path=ppt/slides/slide2.xml><?xml version="1.0" encoding="utf-8"?>
 <p:sld xmlns:a="http://schemas.openxmlformats.org/drawingml/2006/main" xmlns:r="http://schemas.openxmlformats.org/officeDocument/2006/relationships" xmlns:p="http://schemas.openxmlformats.org/presentationml/2006/main">
   <p:cSld>
@@ -10666,7 +10791,7 @@
               <a:defRPr/>
             </a:pPr>
             <a:r>
-              <a:rPr lang="en-US" dirty="0">
+              <a:rPr lang="en-US">
                 <a:solidFill>
                   <a:schemeClr val="accent3"/>
                 </a:solidFill>
@@ -10693,7 +10818,9 @@
           </a:xfrm>
         </p:spPr>
         <p:txBody>
-          <a:bodyPr/>
+          <a:bodyPr>
+            <a:normAutofit fontScale="92500" lnSpcReduction="10000"/>
+          </a:bodyPr>
           <a:lstStyle/>
           <a:p>
             <a:pPr>
@@ -10713,7 +10840,7 @@
             </a:r>
             <a:r>
               <a:rPr lang="en-US" sz="2400" dirty="0"/>
-              <a:t>of the concept represented by another </a:t>
+              <a:t>of the concept represented by another already existing class</a:t>
             </a:r>
           </a:p>
           <a:p>
@@ -10728,7 +10855,7 @@
             </a:pPr>
             <a:r>
               <a:rPr lang="en-US" sz="2400" dirty="0"/>
-              <a:t>Can “borrow” from an existing class, changing just what we need</a:t>
+              <a:t>New class can “inherit” from an existing class, and new class can be changed to add new/different functional specific to the new class</a:t>
             </a:r>
           </a:p>
           <a:p>
@@ -10855,7 +10982,7 @@
               <a:defRPr/>
             </a:pPr>
             <a:r>
-              <a:rPr lang="en-US" sz="1800" dirty="0">
+              <a:rPr lang="en-US" sz="1800">
                 <a:solidFill>
                   <a:schemeClr val="bg1"/>
                 </a:solidFill>
@@ -10894,7 +11021,7 @@
       </p:grpSpPr>
       <p:sp>
         <p:nvSpPr>
-          <p:cNvPr id="3" name="Title 2"/>
+          <p:cNvPr id="2" name="Title 1"/>
           <p:cNvSpPr>
             <a:spLocks noGrp="1"/>
           </p:cNvSpPr>
@@ -10907,11 +11034,125 @@
           <a:bodyPr/>
           <a:lstStyle/>
           <a:p>
+            <a:r>
+              <a:rPr lang="en-US"/>
+              <a:t>Live coding</a:t>
+            </a:r>
+          </a:p>
+        </p:txBody>
+      </p:sp>
+      <p:sp>
+        <p:nvSpPr>
+          <p:cNvPr id="3" name="Content Placeholder 2"/>
+          <p:cNvSpPr>
+            <a:spLocks noGrp="1"/>
+          </p:cNvSpPr>
+          <p:nvPr>
+            <p:ph idx="1"/>
+          </p:nvPr>
+        </p:nvSpPr>
+        <p:spPr/>
+        <p:txBody>
+          <a:bodyPr/>
+          <a:lstStyle/>
+          <a:p>
+            <a:r>
+              <a:rPr lang="en-US"/>
+              <a:t>Let’s look at </a:t>
+            </a:r>
+            <a:r>
+              <a:rPr lang="en-US" err="1"/>
+              <a:t>chessPieces</a:t>
+            </a:r>
+            <a:r>
+              <a:rPr lang="en-US"/>
+              <a:t>/</a:t>
+            </a:r>
+            <a:r>
+              <a:rPr lang="en-US" err="1"/>
+              <a:t>chessSupport</a:t>
+            </a:r>
+            <a:endParaRPr lang="en-US"/>
+          </a:p>
+          <a:p>
+            <a:pPr lvl="1"/>
+            <a:r>
+              <a:rPr lang="en-US"/>
+              <a:t>Let’s Look at King and </a:t>
+            </a:r>
+            <a:r>
+              <a:rPr lang="en-US" err="1"/>
+              <a:t>ChessPiece</a:t>
+            </a:r>
+            <a:endParaRPr lang="en-US"/>
+          </a:p>
+          <a:p>
+            <a:pPr lvl="1"/>
+            <a:r>
+              <a:rPr lang="en-US" err="1"/>
+              <a:t>StandardBoardProvider</a:t>
+            </a:r>
+            <a:r>
+              <a:rPr lang="en-US"/>
+              <a:t> (uncomment King lines)</a:t>
+            </a:r>
+          </a:p>
+          <a:p>
+            <a:pPr lvl="1"/>
+            <a:endParaRPr lang="en-US"/>
+          </a:p>
+        </p:txBody>
+      </p:sp>
+    </p:spTree>
+    <p:extLst>
+      <p:ext uri="{BB962C8B-B14F-4D97-AF65-F5344CB8AC3E}">
+        <p14:creationId xmlns:p14="http://schemas.microsoft.com/office/powerpoint/2010/main" val="2864090242"/>
+      </p:ext>
+    </p:extLst>
+  </p:cSld>
+  <p:clrMapOvr>
+    <a:masterClrMapping/>
+  </p:clrMapOvr>
+</p:sld>
+</file>
+
+<file path=ppt/slides/slide21.xml><?xml version="1.0" encoding="utf-8"?>
+<p:sld xmlns:a="http://schemas.openxmlformats.org/drawingml/2006/main" xmlns:r="http://schemas.openxmlformats.org/officeDocument/2006/relationships" xmlns:p="http://schemas.openxmlformats.org/presentationml/2006/main">
+  <p:cSld>
+    <p:spTree>
+      <p:nvGrpSpPr>
+        <p:cNvPr id="1" name=""/>
+        <p:cNvGrpSpPr/>
+        <p:nvPr/>
+      </p:nvGrpSpPr>
+      <p:grpSpPr>
+        <a:xfrm>
+          <a:off x="0" y="0"/>
+          <a:ext cx="0" cy="0"/>
+          <a:chOff x="0" y="0"/>
+          <a:chExt cx="0" cy="0"/>
+        </a:xfrm>
+      </p:grpSpPr>
+      <p:sp>
+        <p:nvSpPr>
+          <p:cNvPr id="3" name="Title 2"/>
+          <p:cNvSpPr>
+            <a:spLocks noGrp="1"/>
+          </p:cNvSpPr>
+          <p:nvPr>
+            <p:ph type="title"/>
+          </p:nvPr>
+        </p:nvSpPr>
+        <p:spPr/>
+        <p:txBody>
+          <a:bodyPr/>
+          <a:lstStyle/>
+          <a:p>
             <a:pPr>
               <a:defRPr/>
             </a:pPr>
             <a:r>
-              <a:rPr lang="en-US" dirty="0">
+              <a:rPr lang="en-US">
                 <a:solidFill>
                   <a:schemeClr val="accent3"/>
                 </a:solidFill>
@@ -10919,7 +11160,7 @@
               <a:t>Abstract</a:t>
             </a:r>
             <a:r>
-              <a:rPr lang="en-US" dirty="0"/>
+              <a:rPr lang="en-US"/>
               <a:t> Classes</a:t>
             </a:r>
           </a:p>
@@ -10946,15 +11187,15 @@
               <a:defRPr/>
             </a:pPr>
             <a:r>
-              <a:rPr lang="en-US" dirty="0"/>
+              <a:rPr lang="en-US"/>
               <a:t>Hybrid of </a:t>
             </a:r>
             <a:r>
-              <a:rPr lang="en-US" dirty="0" err="1"/>
+              <a:rPr lang="en-US" err="1"/>
               <a:t>superclasses</a:t>
             </a:r>
             <a:r>
-              <a:rPr lang="en-US" dirty="0"/>
+              <a:rPr lang="en-US"/>
               <a:t> and interfaces</a:t>
             </a:r>
           </a:p>
@@ -10963,15 +11204,15 @@
               <a:defRPr/>
             </a:pPr>
             <a:r>
-              <a:rPr lang="en-US" dirty="0"/>
+              <a:rPr lang="en-US"/>
               <a:t>Like regular </a:t>
             </a:r>
             <a:r>
-              <a:rPr lang="en-US" dirty="0" err="1"/>
+              <a:rPr lang="en-US" err="1"/>
               <a:t>superclasses</a:t>
             </a:r>
             <a:r>
-              <a:rPr lang="en-US" dirty="0"/>
+              <a:rPr lang="en-US"/>
               <a:t>:</a:t>
             </a:r>
           </a:p>
@@ -10980,7 +11221,7 @@
               <a:defRPr/>
             </a:pPr>
             <a:r>
-              <a:rPr lang="en-US" dirty="0"/>
+              <a:rPr lang="en-US"/>
               <a:t>Provide implementation of some methods</a:t>
             </a:r>
           </a:p>
@@ -10989,7 +11230,7 @@
               <a:defRPr/>
             </a:pPr>
             <a:r>
-              <a:rPr lang="en-US" dirty="0"/>
+              <a:rPr lang="en-US"/>
               <a:t>Like interfaces</a:t>
             </a:r>
           </a:p>
@@ -10998,7 +11239,7 @@
               <a:defRPr/>
             </a:pPr>
             <a:r>
-              <a:rPr lang="en-US" dirty="0"/>
+              <a:rPr lang="en-US"/>
               <a:t>Just provide signatures and docs of other methods</a:t>
             </a:r>
           </a:p>
@@ -11007,7 +11248,7 @@
               <a:defRPr/>
             </a:pPr>
             <a:r>
-              <a:rPr lang="en-US" dirty="0"/>
+              <a:rPr lang="en-US"/>
               <a:t>Can’t be instantiated</a:t>
             </a:r>
           </a:p>
@@ -11016,7 +11257,7 @@
               <a:defRPr/>
             </a:pPr>
             <a:r>
-              <a:rPr lang="en-US" dirty="0"/>
+              <a:rPr lang="en-US"/>
               <a:t>Example:</a:t>
             </a:r>
           </a:p>
@@ -11025,13 +11266,13 @@
               <a:defRPr/>
             </a:pPr>
             <a:r>
-              <a:rPr lang="en-US" b="1" dirty="0">
+              <a:rPr lang="en-US" b="1">
                 <a:latin typeface="Lucida Sans Typewriter" pitchFamily="49" charset="0"/>
               </a:rPr>
               <a:t>public </a:t>
             </a:r>
             <a:r>
-              <a:rPr lang="en-US" b="1" dirty="0">
+              <a:rPr lang="en-US" b="1">
                 <a:solidFill>
                   <a:schemeClr val="accent3"/>
                 </a:solidFill>
@@ -11040,47 +11281,47 @@
               <a:t>abstract</a:t>
             </a:r>
             <a:r>
-              <a:rPr lang="en-US" b="1" dirty="0">
+              <a:rPr lang="en-US" b="1">
                 <a:latin typeface="Lucida Sans Typewriter" pitchFamily="49" charset="0"/>
               </a:rPr>
               <a:t> class </a:t>
             </a:r>
             <a:r>
-              <a:rPr lang="en-US" b="1" dirty="0" err="1">
+              <a:rPr lang="en-US" b="1" err="1">
                 <a:latin typeface="Lucida Sans Typewriter" pitchFamily="49" charset="0"/>
               </a:rPr>
               <a:t>BankAccount</a:t>
             </a:r>
             <a:r>
-              <a:rPr lang="en-US" b="1" dirty="0">
+              <a:rPr lang="en-US" b="1">
                 <a:latin typeface="Lucida Sans Typewriter" pitchFamily="49" charset="0"/>
               </a:rPr>
               <a:t> {</a:t>
             </a:r>
             <a:br>
-              <a:rPr lang="en-US" b="1" dirty="0">
+              <a:rPr lang="en-US" b="1">
                 <a:latin typeface="Lucida Sans Typewriter" pitchFamily="49" charset="0"/>
               </a:rPr>
             </a:br>
             <a:r>
-              <a:rPr lang="en-US" b="1" dirty="0">
+              <a:rPr lang="en-US" b="1">
                 <a:latin typeface="Lucida Sans Typewriter" pitchFamily="49" charset="0"/>
               </a:rPr>
               <a:t>    /** documentation here */</a:t>
             </a:r>
             <a:br>
-              <a:rPr lang="en-US" b="1" dirty="0">
+              <a:rPr lang="en-US" b="1">
                 <a:latin typeface="Lucida Sans Typewriter" pitchFamily="49" charset="0"/>
               </a:rPr>
             </a:br>
             <a:r>
-              <a:rPr lang="en-US" b="1" dirty="0">
+              <a:rPr lang="en-US" b="1">
                 <a:latin typeface="Lucida Sans Typewriter" pitchFamily="49" charset="0"/>
               </a:rPr>
               <a:t>    public </a:t>
             </a:r>
             <a:r>
-              <a:rPr lang="en-US" b="1" dirty="0">
+              <a:rPr lang="en-US" b="1">
                 <a:solidFill>
                   <a:schemeClr val="accent3"/>
                 </a:solidFill>
@@ -11089,25 +11330,25 @@
               <a:t>abstract</a:t>
             </a:r>
             <a:r>
-              <a:rPr lang="en-US" b="1" dirty="0">
+              <a:rPr lang="en-US" b="1">
                 <a:latin typeface="Lucida Sans Typewriter" pitchFamily="49" charset="0"/>
               </a:rPr>
               <a:t> void </a:t>
             </a:r>
             <a:r>
-              <a:rPr lang="en-US" b="1" dirty="0" err="1">
+              <a:rPr lang="en-US" b="1" err="1">
                 <a:latin typeface="Lucida Sans Typewriter" pitchFamily="49" charset="0"/>
               </a:rPr>
               <a:t>deductFees</a:t>
             </a:r>
             <a:r>
-              <a:rPr lang="en-US" b="1" dirty="0">
+              <a:rPr lang="en-US" b="1">
                 <a:latin typeface="Lucida Sans Typewriter" pitchFamily="49" charset="0"/>
               </a:rPr>
               <a:t>()</a:t>
             </a:r>
             <a:r>
-              <a:rPr lang="en-US" b="1" dirty="0">
+              <a:rPr lang="en-US" b="1">
                 <a:solidFill>
                   <a:schemeClr val="accent3"/>
                 </a:solidFill>
@@ -11116,23 +11357,23 @@
               <a:t>;</a:t>
             </a:r>
             <a:br>
-              <a:rPr lang="en-US" b="1" dirty="0">
+              <a:rPr lang="en-US" b="1">
                 <a:latin typeface="Lucida Sans Typewriter" pitchFamily="49" charset="0"/>
               </a:rPr>
             </a:br>
             <a:r>
-              <a:rPr lang="en-US" b="1" dirty="0">
+              <a:rPr lang="en-US" b="1">
                 <a:latin typeface="Lucida Sans Typewriter" pitchFamily="49" charset="0"/>
               </a:rPr>
               <a:t>    …</a:t>
             </a:r>
             <a:br>
-              <a:rPr lang="en-US" b="1" dirty="0">
+              <a:rPr lang="en-US" b="1">
                 <a:latin typeface="Lucida Sans Typewriter" pitchFamily="49" charset="0"/>
               </a:rPr>
             </a:br>
             <a:r>
-              <a:rPr lang="en-US" b="1" dirty="0">
+              <a:rPr lang="en-US" b="1">
                 <a:latin typeface="Lucida Sans Typewriter" pitchFamily="49" charset="0"/>
               </a:rPr>
               <a:t>}</a:t>
@@ -11186,7 +11427,7 @@
               <a:defRPr/>
             </a:pPr>
             <a:r>
-              <a:rPr lang="en-US" dirty="0"/>
+              <a:rPr lang="en-US"/>
               <a:t>Elided methods as before</a:t>
             </a:r>
           </a:p>
@@ -11233,15 +11474,15 @@
               <a:defRPr/>
             </a:pPr>
             <a:r>
-              <a:rPr lang="en-US" sz="2200" dirty="0"/>
+              <a:rPr lang="en-US" sz="2200"/>
               <a:t>Also look at the code in the shapes package, especially </a:t>
             </a:r>
             <a:r>
-              <a:rPr lang="en-US" sz="2200" dirty="0" err="1"/>
+              <a:rPr lang="en-US" sz="2200" err="1"/>
               <a:t>ShapesDemo</a:t>
             </a:r>
             <a:r>
-              <a:rPr lang="en-US" sz="2200" dirty="0"/>
+              <a:rPr lang="en-US" sz="2200"/>
               <a:t>  (during or after class)</a:t>
             </a:r>
           </a:p>
@@ -11255,7 +11496,7 @@
 </p:sld>
 </file>
 
-<file path=ppt/slides/slide21.xml><?xml version="1.0" encoding="utf-8"?>
+<file path=ppt/slides/slide22.xml><?xml version="1.0" encoding="utf-8"?>
 <p:sld xmlns:a="http://schemas.openxmlformats.org/drawingml/2006/main" xmlns:r="http://schemas.openxmlformats.org/officeDocument/2006/relationships" xmlns:p="http://schemas.openxmlformats.org/presentationml/2006/main">
   <p:cSld>
     <p:spTree>
@@ -11326,7 +11567,7 @@
 </p:sld>
 </file>
 
-<file path=ppt/slides/slide22.xml><?xml version="1.0" encoding="utf-8"?>
+<file path=ppt/slides/slide23.xml><?xml version="1.0" encoding="utf-8"?>
 <p:sld xmlns:a="http://schemas.openxmlformats.org/drawingml/2006/main" xmlns:r="http://schemas.openxmlformats.org/officeDocument/2006/relationships" xmlns:p="http://schemas.openxmlformats.org/presentationml/2006/main">
   <p:cSld>
     <p:spTree>
@@ -11362,7 +11603,7 @@
               <a:defRPr/>
             </a:pPr>
             <a:r>
-              <a:rPr lang="en-US" dirty="0"/>
+              <a:rPr lang="en-US"/>
               <a:t>Work Time</a:t>
             </a:r>
           </a:p>
@@ -11386,40 +11627,24 @@
         </p:spPr>
         <p:txBody>
           <a:bodyPr>
-            <a:normAutofit lnSpcReduction="10000"/>
+            <a:normAutofit/>
           </a:bodyPr>
           <a:lstStyle/>
           <a:p>
             <a:r>
-              <a:rPr lang="en-US" dirty="0"/>
+              <a:rPr lang="en-US"/>
               <a:t>Chess</a:t>
             </a:r>
           </a:p>
           <a:p>
-            <a:endParaRPr lang="en-US" dirty="0"/>
-          </a:p>
-          <a:p>
-            <a:r>
-              <a:rPr lang="en-US" strike="sngStrike" dirty="0" err="1"/>
-              <a:t>ByoGUI</a:t>
-            </a:r>
-            <a:endParaRPr lang="en-US" strike="sngStrike" dirty="0"/>
-          </a:p>
-          <a:p>
-            <a:endParaRPr lang="en-US" strike="sngStrike" dirty="0"/>
-          </a:p>
-          <a:p>
-            <a:r>
-              <a:rPr lang="en-US" strike="sngStrike" dirty="0"/>
-              <a:t>It's a solo project, but feel free to talk with others as you do it.</a:t>
-            </a:r>
-          </a:p>
-          <a:p>
-            <a:endParaRPr lang="en-US" dirty="0"/>
-          </a:p>
-          <a:p>
-            <a:r>
-              <a:rPr lang="en-US" dirty="0"/>
+            <a:endParaRPr lang="en-US"/>
+          </a:p>
+          <a:p>
+            <a:endParaRPr lang="en-US"/>
+          </a:p>
+          <a:p>
+            <a:r>
+              <a:rPr lang="en-US"/>
               <a:t>And to ask instructor/assistants for help</a:t>
             </a:r>
           </a:p>
@@ -11463,7 +11688,7 @@
           <a:lstStyle/>
           <a:p>
             <a:r>
-              <a:rPr lang="en-US" dirty="0"/>
+              <a:rPr lang="en-US"/>
               <a:t>Q8-Q9</a:t>
             </a:r>
           </a:p>
@@ -11477,7 +11702,7 @@
 </p:sld>
 </file>
 
-<file path=ppt/slides/slide23.xml><?xml version="1.0" encoding="utf-8"?>
+<file path=ppt/slides/slide24.xml><?xml version="1.0" encoding="utf-8"?>
 <p:sld xmlns:a="http://schemas.openxmlformats.org/drawingml/2006/main" xmlns:r="http://schemas.openxmlformats.org/officeDocument/2006/relationships" xmlns:p="http://schemas.openxmlformats.org/presentationml/2006/main">
   <p:cSld>
     <p:spTree>
@@ -11520,8 +11745,17 @@
             </a:br>
             <a:r>
               <a:rPr lang="en-US" dirty="0"/>
-              <a:t>Review from yesterday</a:t>
-            </a:r>
+              <a:t>Review of </a:t>
+            </a:r>
+            <a:r>
+              <a:rPr lang="en-US" dirty="0" err="1"/>
+              <a:t>BettingMain</a:t>
+            </a:r>
+            <a:r>
+              <a:rPr lang="en-US"/>
+              <a:t> Interface</a:t>
+            </a:r>
+            <a:endParaRPr lang="en-US" dirty="0"/>
           </a:p>
         </p:txBody>
       </p:sp>
@@ -11626,6 +11860,97 @@
 </p:sld>
 </file>
 
+<file path=ppt/slides/slide25.xml><?xml version="1.0" encoding="utf-8"?>
+<p:sld xmlns:a="http://schemas.openxmlformats.org/drawingml/2006/main" xmlns:r="http://schemas.openxmlformats.org/officeDocument/2006/relationships" xmlns:p="http://schemas.openxmlformats.org/presentationml/2006/main">
+  <p:cSld>
+    <p:spTree>
+      <p:nvGrpSpPr>
+        <p:cNvPr id="1" name=""/>
+        <p:cNvGrpSpPr/>
+        <p:nvPr/>
+      </p:nvGrpSpPr>
+      <p:grpSpPr>
+        <a:xfrm>
+          <a:off x="0" y="0"/>
+          <a:ext cx="0" cy="0"/>
+          <a:chOff x="0" y="0"/>
+          <a:chExt cx="0" cy="0"/>
+        </a:xfrm>
+      </p:grpSpPr>
+      <p:sp>
+        <p:nvSpPr>
+          <p:cNvPr id="2" name="Title 1">
+            <a:extLst>
+              <a:ext uri="{FF2B5EF4-FFF2-40B4-BE49-F238E27FC236}">
+                <a16:creationId xmlns:a16="http://schemas.microsoft.com/office/drawing/2014/main" id="{53F8F61E-D89C-6D05-2B95-F50C507C882C}"/>
+              </a:ext>
+            </a:extLst>
+          </p:cNvPr>
+          <p:cNvSpPr>
+            <a:spLocks noGrp="1"/>
+          </p:cNvSpPr>
+          <p:nvPr>
+            <p:ph type="title"/>
+          </p:nvPr>
+        </p:nvSpPr>
+        <p:spPr/>
+        <p:txBody>
+          <a:bodyPr/>
+          <a:lstStyle/>
+          <a:p>
+            <a:r>
+              <a:rPr lang="en-US" dirty="0"/>
+              <a:t>Complete Final Project Survey</a:t>
+            </a:r>
+          </a:p>
+        </p:txBody>
+      </p:sp>
+      <p:sp>
+        <p:nvSpPr>
+          <p:cNvPr id="3" name="Content Placeholder 2">
+            <a:extLst>
+              <a:ext uri="{FF2B5EF4-FFF2-40B4-BE49-F238E27FC236}">
+                <a16:creationId xmlns:a16="http://schemas.microsoft.com/office/drawing/2014/main" id="{13118C44-F8C6-A392-096E-A234E0C6ED1F}"/>
+              </a:ext>
+            </a:extLst>
+          </p:cNvPr>
+          <p:cNvSpPr>
+            <a:spLocks noGrp="1"/>
+          </p:cNvSpPr>
+          <p:nvPr>
+            <p:ph idx="1"/>
+          </p:nvPr>
+        </p:nvSpPr>
+        <p:spPr/>
+        <p:txBody>
+          <a:bodyPr/>
+          <a:lstStyle/>
+          <a:p>
+            <a:r>
+              <a:rPr lang="en-US" dirty="0"/>
+              <a:t>Posted </a:t>
+            </a:r>
+            <a:r>
+              <a:rPr lang="en-US"/>
+              <a:t>or will be posted soon…</a:t>
+            </a:r>
+            <a:endParaRPr lang="en-US" dirty="0"/>
+          </a:p>
+        </p:txBody>
+      </p:sp>
+    </p:spTree>
+    <p:extLst>
+      <p:ext uri="{BB962C8B-B14F-4D97-AF65-F5344CB8AC3E}">
+        <p14:creationId xmlns:p14="http://schemas.microsoft.com/office/powerpoint/2010/main" val="2353471821"/>
+      </p:ext>
+    </p:extLst>
+  </p:cSld>
+  <p:clrMapOvr>
+    <a:masterClrMapping/>
+  </p:clrMapOvr>
+</p:sld>
+</file>
+
 <file path=ppt/slides/slide3.xml><?xml version="1.0" encoding="utf-8"?>
 <p:sld xmlns:a="http://schemas.openxmlformats.org/drawingml/2006/main" xmlns:r="http://schemas.openxmlformats.org/officeDocument/2006/relationships" xmlns:p="http://schemas.openxmlformats.org/presentationml/2006/main">
   <p:cSld>
@@ -11662,7 +11987,7 @@
               <a:defRPr/>
             </a:pPr>
             <a:r>
-              <a:rPr lang="en-US" dirty="0"/>
+              <a:rPr lang="en-US"/>
               <a:t>Examples</a:t>
             </a:r>
           </a:p>
@@ -11681,7 +12006,7 @@
         <p:spPr/>
         <p:txBody>
           <a:bodyPr>
-            <a:normAutofit lnSpcReduction="10000"/>
+            <a:normAutofit fontScale="92500" lnSpcReduction="20000"/>
           </a:bodyPr>
           <a:lstStyle/>
           <a:p>
@@ -11736,8 +12061,12 @@
               <a:defRPr/>
             </a:pPr>
             <a:r>
+              <a:rPr lang="en-US" dirty="0" err="1"/>
+              <a:t>SavingsAccount</a:t>
+            </a:r>
+            <a:r>
               <a:rPr lang="en-US" dirty="0"/>
-              <a:t>adds interest earning, keeps other traits</a:t>
+              <a:t> adds interest earning, keeps other traits</a:t>
             </a:r>
           </a:p>
           <a:p>
@@ -11766,7 +12095,7 @@
             </a:pPr>
             <a:r>
               <a:rPr lang="en-US" dirty="0"/>
-              <a:t>adds pay information and methods, keeps other traits</a:t>
+              <a:t>Employee adds pay information and methods, keeps other traits</a:t>
             </a:r>
           </a:p>
           <a:p>
@@ -11795,7 +12124,7 @@
             </a:pPr>
             <a:r>
               <a:rPr lang="en-US" dirty="0"/>
-              <a:t>adds information about employees managed, changes the pay mechanism, keeps other traits</a:t>
+              <a:t>Manager adds information about employees managed, changes the pay mechanism, keeps other traits</a:t>
             </a:r>
           </a:p>
         </p:txBody>
@@ -12872,7 +13201,7 @@
               <a:defRPr/>
             </a:pPr>
             <a:r>
-              <a:rPr lang="en-US" dirty="0"/>
+              <a:rPr lang="en-US"/>
               <a:t>Inheritance in UML</a:t>
             </a:r>
           </a:p>
@@ -12918,8 +13247,8 @@
         </p:nvSpPr>
         <p:spPr>
           <a:xfrm>
-            <a:off x="5622870" y="1508620"/>
-            <a:ext cx="2817813" cy="868363"/>
+            <a:off x="5622870" y="1143000"/>
+            <a:ext cx="2817813" cy="1233983"/>
           </a:xfrm>
           <a:prstGeom prst="borderCallout2">
             <a:avLst>
@@ -12956,15 +13285,26 @@
               <a:defRPr/>
             </a:pPr>
             <a:r>
-              <a:rPr lang="en-US" sz="2400" dirty="0"/>
-              <a:t>The “</a:t>
-            </a:r>
-            <a:r>
-              <a:rPr lang="en-US" sz="2400" dirty="0" err="1"/>
+              <a:rPr lang="en-US" sz="2400"/>
+              <a:t>Class </a:t>
+            </a:r>
+            <a:r>
+              <a:rPr lang="en-US" sz="2000">
+                <a:latin typeface="Courier New" panose="02070309020205020404" pitchFamily="49" charset="0"/>
+                <a:cs typeface="Courier New" panose="02070309020205020404" pitchFamily="49" charset="0"/>
+              </a:rPr>
+              <a:t>Object</a:t>
+            </a:r>
+            <a:r>
+              <a:rPr lang="en-US" sz="2400"/>
+              <a:t> is the “</a:t>
+            </a:r>
+            <a:r>
+              <a:rPr lang="en-US" sz="2400" err="1"/>
               <a:t>superest</a:t>
             </a:r>
             <a:r>
-              <a:rPr lang="en-US" sz="2400" dirty="0"/>
+              <a:rPr lang="en-US" sz="2400"/>
               <a:t>” class in Java</a:t>
             </a:r>
           </a:p>
@@ -12978,8 +13318,8 @@
         </p:nvSpPr>
         <p:spPr>
           <a:xfrm>
-            <a:off x="6654800" y="5045460"/>
-            <a:ext cx="2057400" cy="838200"/>
+            <a:off x="6400800" y="5045460"/>
+            <a:ext cx="2311400" cy="838200"/>
           </a:xfrm>
           <a:prstGeom prst="borderCallout2">
             <a:avLst>
@@ -12987,8 +13327,8 @@
               <a:gd name="adj2" fmla="val -8333"/>
               <a:gd name="adj3" fmla="val 18750"/>
               <a:gd name="adj4" fmla="val -16667"/>
-              <a:gd name="adj5" fmla="val -20628"/>
-              <a:gd name="adj6" fmla="val -93367"/>
+              <a:gd name="adj5" fmla="val -33771"/>
+              <a:gd name="adj6" fmla="val -75255"/>
             </a:avLst>
           </a:prstGeom>
         </p:spPr>
@@ -13016,7 +13356,7 @@
               <a:defRPr/>
             </a:pPr>
             <a:r>
-              <a:rPr lang="en-US" sz="2400" dirty="0"/>
+              <a:rPr lang="en-US" sz="2400"/>
               <a:t>Still means “is a”</a:t>
             </a:r>
           </a:p>
@@ -13068,7 +13408,7 @@
               <a:defRPr/>
             </a:pPr>
             <a:r>
-              <a:rPr lang="en-US" sz="2400" dirty="0"/>
+              <a:rPr lang="en-US" sz="2400"/>
               <a:t>Solid line shows inheritance</a:t>
             </a:r>
           </a:p>
@@ -13119,7 +13459,7 @@
               <a:defRPr/>
             </a:pPr>
             <a:r>
-              <a:rPr lang="en-US" sz="1800" dirty="0">
+              <a:rPr lang="en-US" sz="1800">
                 <a:solidFill>
                   <a:schemeClr val="bg1"/>
                 </a:solidFill>
@@ -13341,7 +13681,7 @@
     </p:spTree>
     <p:extLst>
       <p:ext uri="{BB962C8B-B14F-4D97-AF65-F5344CB8AC3E}">
-        <p14:creationId xmlns:p14="http://schemas.microsoft.com/office/powerpoint/2010/main" val="2509123347"/>
+        <p14:creationId xmlns:p14="http://schemas.microsoft.com/office/powerpoint/2010/main" val="3137913058"/>
       </p:ext>
     </p:extLst>
   </p:cSld>
@@ -13354,6 +13694,14 @@
 <file path=ppt/slides/slide7.xml><?xml version="1.0" encoding="utf-8"?>
 <p:sld xmlns:a="http://schemas.openxmlformats.org/drawingml/2006/main" xmlns:r="http://schemas.openxmlformats.org/officeDocument/2006/relationships" xmlns:p="http://schemas.openxmlformats.org/presentationml/2006/main">
   <p:cSld>
+    <p:bg>
+      <p:bgPr>
+        <a:solidFill>
+          <a:schemeClr val="bg1"/>
+        </a:solidFill>
+        <a:effectLst/>
+      </p:bgPr>
+    </p:bg>
     <p:spTree>
       <p:nvGrpSpPr>
         <p:cNvPr id="1" name=""/>
@@ -13368,6 +13716,66 @@
           <a:chExt cx="0" cy="0"/>
         </a:xfrm>
       </p:grpSpPr>
+      <p:sp useBgFill="1">
+        <p:nvSpPr>
+          <p:cNvPr id="10" name="Rectangle 9">
+            <a:extLst>
+              <a:ext uri="{FF2B5EF4-FFF2-40B4-BE49-F238E27FC236}">
+                <a16:creationId xmlns:a16="http://schemas.microsoft.com/office/drawing/2014/main" id="{7316481C-0A49-4796-812B-0D64F063B720}"/>
+              </a:ext>
+              <a:ext uri="{C183D7F6-B498-43B3-948B-1728B52AA6E4}">
+                <adec:decorative xmlns:adec="http://schemas.microsoft.com/office/drawing/2017/decorative" val="1"/>
+              </a:ext>
+            </a:extLst>
+          </p:cNvPr>
+          <p:cNvSpPr>
+            <a:spLocks noGrp="1" noRot="1" noChangeAspect="1" noMove="1" noResize="1" noEditPoints="1" noAdjustHandles="1" noChangeArrowheads="1" noChangeShapeType="1" noTextEdit="1"/>
+          </p:cNvSpPr>
+          <p:nvPr>
+            <p:extLst>
+              <p:ext uri="{386F3935-93C4-4BCD-93E2-E3B085C9AB24}">
+                <p16:designElem xmlns:p16="http://schemas.microsoft.com/office/powerpoint/2015/main" val="1"/>
+              </p:ext>
+            </p:extLst>
+          </p:nvPr>
+        </p:nvSpPr>
+        <p:spPr>
+          <a:xfrm>
+            <a:off x="0" y="0"/>
+            <a:ext cx="9143999" cy="6858000"/>
+          </a:xfrm>
+          <a:prstGeom prst="rect">
+            <a:avLst/>
+          </a:prstGeom>
+          <a:ln>
+            <a:noFill/>
+          </a:ln>
+        </p:spPr>
+        <p:style>
+          <a:lnRef idx="2">
+            <a:schemeClr val="accent1">
+              <a:shade val="50000"/>
+            </a:schemeClr>
+          </a:lnRef>
+          <a:fillRef idx="1">
+            <a:schemeClr val="accent1"/>
+          </a:fillRef>
+          <a:effectRef idx="0">
+            <a:schemeClr val="accent1"/>
+          </a:effectRef>
+          <a:fontRef idx="minor">
+            <a:schemeClr val="lt1"/>
+          </a:fontRef>
+        </p:style>
+        <p:txBody>
+          <a:bodyPr rtlCol="0" anchor="ctr"/>
+          <a:lstStyle/>
+          <a:p>
+            <a:pPr algn="ctr"/>
+            <a:endParaRPr lang="en-US"/>
+          </a:p>
+        </p:txBody>
+      </p:sp>
       <p:sp>
         <p:nvSpPr>
           <p:cNvPr id="2" name="Title 1"/>
@@ -13402,6 +13810,1324 @@
           </a:p>
         </p:txBody>
       </p:sp>
+      <p:sp>
+        <p:nvSpPr>
+          <p:cNvPr id="12" name="Rectangle 11">
+            <a:extLst>
+              <a:ext uri="{FF2B5EF4-FFF2-40B4-BE49-F238E27FC236}">
+                <a16:creationId xmlns:a16="http://schemas.microsoft.com/office/drawing/2014/main" id="{A5271697-90F1-4A23-8EF2-0179F2EAFACB}"/>
+              </a:ext>
+              <a:ext uri="{C183D7F6-B498-43B3-948B-1728B52AA6E4}">
+                <adec:decorative xmlns:adec="http://schemas.microsoft.com/office/drawing/2017/decorative" val="1"/>
+              </a:ext>
+            </a:extLst>
+          </p:cNvPr>
+          <p:cNvSpPr>
+            <a:spLocks noGrp="1" noRot="1" noChangeAspect="1" noMove="1" noResize="1" noEditPoints="1" noAdjustHandles="1" noChangeArrowheads="1" noChangeShapeType="1" noTextEdit="1"/>
+          </p:cNvSpPr>
+          <p:nvPr>
+            <p:extLst>
+              <p:ext uri="{386F3935-93C4-4BCD-93E2-E3B085C9AB24}">
+                <p16:designElem xmlns:p16="http://schemas.microsoft.com/office/powerpoint/2015/main" val="1"/>
+              </p:ext>
+            </p:extLst>
+          </p:nvPr>
+        </p:nvSpPr>
+        <p:spPr>
+          <a:xfrm>
+            <a:off x="0" y="1"/>
+            <a:ext cx="455228" cy="3233984"/>
+          </a:xfrm>
+          <a:prstGeom prst="rect">
+            <a:avLst/>
+          </a:prstGeom>
+          <a:solidFill>
+            <a:schemeClr val="tx1">
+              <a:lumMod val="85000"/>
+              <a:lumOff val="15000"/>
+            </a:schemeClr>
+          </a:solidFill>
+          <a:ln>
+            <a:noFill/>
+          </a:ln>
+        </p:spPr>
+        <p:style>
+          <a:lnRef idx="2">
+            <a:schemeClr val="accent1">
+              <a:shade val="50000"/>
+            </a:schemeClr>
+          </a:lnRef>
+          <a:fillRef idx="1">
+            <a:schemeClr val="accent1"/>
+          </a:fillRef>
+          <a:effectRef idx="0">
+            <a:schemeClr val="accent1"/>
+          </a:effectRef>
+          <a:fontRef idx="minor">
+            <a:schemeClr val="lt1"/>
+          </a:fontRef>
+        </p:style>
+        <p:txBody>
+          <a:bodyPr rtlCol="0" anchor="ctr"/>
+          <a:lstStyle/>
+          <a:p>
+            <a:pPr algn="ctr"/>
+            <a:endParaRPr lang="en-US"/>
+          </a:p>
+        </p:txBody>
+      </p:sp>
+      <p:grpSp>
+        <p:nvGrpSpPr>
+          <p:cNvPr id="14" name="Group 13">
+            <a:extLst>
+              <a:ext uri="{FF2B5EF4-FFF2-40B4-BE49-F238E27FC236}">
+                <a16:creationId xmlns:a16="http://schemas.microsoft.com/office/drawing/2014/main" id="{0924561D-756D-410B-973A-E68C2552C20C}"/>
+              </a:ext>
+              <a:ext uri="{C183D7F6-B498-43B3-948B-1728B52AA6E4}">
+                <adec:decorative xmlns:adec="http://schemas.microsoft.com/office/drawing/2017/decorative" val="1"/>
+              </a:ext>
+            </a:extLst>
+          </p:cNvPr>
+          <p:cNvGrpSpPr>
+            <a:grpSpLocks noGrp="1" noUngrp="1" noRot="1" noChangeAspect="1" noMove="1" noResize="1"/>
+          </p:cNvGrpSpPr>
+          <p:nvPr>
+            <p:extLst>
+              <p:ext uri="{386F3935-93C4-4BCD-93E2-E3B085C9AB24}">
+                <p16:designElem xmlns:p16="http://schemas.microsoft.com/office/powerpoint/2015/main" val="1"/>
+              </p:ext>
+            </p:extLst>
+          </p:nvPr>
+        </p:nvGrpSpPr>
+        <p:grpSpPr>
+          <a:xfrm>
+            <a:off x="891533" y="73152"/>
+            <a:ext cx="884223" cy="232963"/>
+            <a:chOff x="7763256" y="73152"/>
+            <a:chExt cx="1178966" cy="232963"/>
+          </a:xfrm>
+        </p:grpSpPr>
+        <p:sp>
+          <p:nvSpPr>
+            <p:cNvPr id="15" name="Rectangle 64">
+              <a:extLst>
+                <a:ext uri="{FF2B5EF4-FFF2-40B4-BE49-F238E27FC236}">
+                  <a16:creationId xmlns:a16="http://schemas.microsoft.com/office/drawing/2014/main" id="{77AF0971-0074-4E4E-9318-C1990C6FF2B1}"/>
+                </a:ext>
+                <a:ext uri="{C183D7F6-B498-43B3-948B-1728B52AA6E4}">
+                  <adec:decorative xmlns:adec="http://schemas.microsoft.com/office/drawing/2017/decorative" val="1"/>
+                </a:ext>
+              </a:extLst>
+            </p:cNvPr>
+            <p:cNvSpPr/>
+            <p:nvPr>
+              <p:extLst>
+                <p:ext uri="{386F3935-93C4-4BCD-93E2-E3B085C9AB24}">
+                  <p16:designElem xmlns:p16="http://schemas.microsoft.com/office/powerpoint/2015/main" val="1"/>
+                </p:ext>
+              </p:extLst>
+            </p:nvPr>
+          </p:nvSpPr>
+          <p:spPr>
+            <a:xfrm>
+              <a:off x="8263077" y="73152"/>
+              <a:ext cx="54368" cy="59227"/>
+            </a:xfrm>
+            <a:prstGeom prst="ellipse">
+              <a:avLst/>
+            </a:prstGeom>
+            <a:solidFill>
+              <a:schemeClr val="accent1"/>
+            </a:solidFill>
+            <a:ln>
+              <a:noFill/>
+            </a:ln>
+          </p:spPr>
+          <p:style>
+            <a:lnRef idx="2">
+              <a:schemeClr val="accent1">
+                <a:shade val="50000"/>
+              </a:schemeClr>
+            </a:lnRef>
+            <a:fillRef idx="1">
+              <a:schemeClr val="accent1"/>
+            </a:fillRef>
+            <a:effectRef idx="0">
+              <a:schemeClr val="accent1"/>
+            </a:effectRef>
+            <a:fontRef idx="minor">
+              <a:schemeClr val="lt1"/>
+            </a:fontRef>
+          </p:style>
+          <p:txBody>
+            <a:bodyPr rtlCol="0" anchor="ctr"/>
+            <a:lstStyle/>
+            <a:p>
+              <a:pPr algn="ctr"/>
+              <a:endParaRPr lang="en-US"/>
+            </a:p>
+          </p:txBody>
+        </p:sp>
+        <p:sp>
+          <p:nvSpPr>
+            <p:cNvPr id="16" name="Rectangle 66">
+              <a:extLst>
+                <a:ext uri="{FF2B5EF4-FFF2-40B4-BE49-F238E27FC236}">
+                  <a16:creationId xmlns:a16="http://schemas.microsoft.com/office/drawing/2014/main" id="{0849707A-24B1-45E4-8493-5DC15C5782FC}"/>
+                </a:ext>
+                <a:ext uri="{C183D7F6-B498-43B3-948B-1728B52AA6E4}">
+                  <adec:decorative xmlns:adec="http://schemas.microsoft.com/office/drawing/2017/decorative" val="1"/>
+                </a:ext>
+              </a:extLst>
+            </p:cNvPr>
+            <p:cNvSpPr/>
+            <p:nvPr>
+              <p:extLst>
+                <p:ext uri="{386F3935-93C4-4BCD-93E2-E3B085C9AB24}">
+                  <p16:designElem xmlns:p16="http://schemas.microsoft.com/office/powerpoint/2015/main" val="1"/>
+                </p:ext>
+              </p:extLst>
+            </p:nvPr>
+          </p:nvSpPr>
+          <p:spPr>
+            <a:xfrm>
+              <a:off x="8263077" y="246888"/>
+              <a:ext cx="54368" cy="59227"/>
+            </a:xfrm>
+            <a:prstGeom prst="ellipse">
+              <a:avLst/>
+            </a:prstGeom>
+            <a:solidFill>
+              <a:schemeClr val="accent1"/>
+            </a:solidFill>
+            <a:ln>
+              <a:noFill/>
+            </a:ln>
+          </p:spPr>
+          <p:style>
+            <a:lnRef idx="2">
+              <a:schemeClr val="accent1">
+                <a:shade val="50000"/>
+              </a:schemeClr>
+            </a:lnRef>
+            <a:fillRef idx="1">
+              <a:schemeClr val="accent1"/>
+            </a:fillRef>
+            <a:effectRef idx="0">
+              <a:schemeClr val="accent1"/>
+            </a:effectRef>
+            <a:fontRef idx="minor">
+              <a:schemeClr val="lt1"/>
+            </a:fontRef>
+          </p:style>
+          <p:txBody>
+            <a:bodyPr rtlCol="0" anchor="ctr"/>
+            <a:lstStyle/>
+            <a:p>
+              <a:pPr algn="ctr"/>
+              <a:endParaRPr lang="en-US"/>
+            </a:p>
+          </p:txBody>
+        </p:sp>
+        <p:sp>
+          <p:nvSpPr>
+            <p:cNvPr id="17" name="Rectangle 64">
+              <a:extLst>
+                <a:ext uri="{FF2B5EF4-FFF2-40B4-BE49-F238E27FC236}">
+                  <a16:creationId xmlns:a16="http://schemas.microsoft.com/office/drawing/2014/main" id="{E0FFD705-F03C-46B0-ABB9-3C24E09312A5}"/>
+                </a:ext>
+                <a:ext uri="{C183D7F6-B498-43B3-948B-1728B52AA6E4}">
+                  <adec:decorative xmlns:adec="http://schemas.microsoft.com/office/drawing/2017/decorative" val="1"/>
+                </a:ext>
+              </a:extLst>
+            </p:cNvPr>
+            <p:cNvSpPr/>
+            <p:nvPr>
+              <p:extLst>
+                <p:ext uri="{386F3935-93C4-4BCD-93E2-E3B085C9AB24}">
+                  <p16:designElem xmlns:p16="http://schemas.microsoft.com/office/powerpoint/2015/main" val="1"/>
+                </p:ext>
+              </p:extLst>
+            </p:nvPr>
+          </p:nvSpPr>
+          <p:spPr>
+            <a:xfrm>
+              <a:off x="8138122" y="73152"/>
+              <a:ext cx="54368" cy="59227"/>
+            </a:xfrm>
+            <a:prstGeom prst="ellipse">
+              <a:avLst/>
+            </a:prstGeom>
+            <a:solidFill>
+              <a:schemeClr val="accent1"/>
+            </a:solidFill>
+            <a:ln>
+              <a:noFill/>
+            </a:ln>
+          </p:spPr>
+          <p:style>
+            <a:lnRef idx="2">
+              <a:schemeClr val="accent1">
+                <a:shade val="50000"/>
+              </a:schemeClr>
+            </a:lnRef>
+            <a:fillRef idx="1">
+              <a:schemeClr val="accent1"/>
+            </a:fillRef>
+            <a:effectRef idx="0">
+              <a:schemeClr val="accent1"/>
+            </a:effectRef>
+            <a:fontRef idx="minor">
+              <a:schemeClr val="lt1"/>
+            </a:fontRef>
+          </p:style>
+          <p:txBody>
+            <a:bodyPr rtlCol="0" anchor="ctr"/>
+            <a:lstStyle/>
+            <a:p>
+              <a:pPr algn="ctr"/>
+              <a:endParaRPr lang="en-US"/>
+            </a:p>
+          </p:txBody>
+        </p:sp>
+        <p:sp>
+          <p:nvSpPr>
+            <p:cNvPr id="18" name="Rectangle 66">
+              <a:extLst>
+                <a:ext uri="{FF2B5EF4-FFF2-40B4-BE49-F238E27FC236}">
+                  <a16:creationId xmlns:a16="http://schemas.microsoft.com/office/drawing/2014/main" id="{520B12C0-88D0-4F6F-9F29-38E4D1D61022}"/>
+                </a:ext>
+                <a:ext uri="{C183D7F6-B498-43B3-948B-1728B52AA6E4}">
+                  <adec:decorative xmlns:adec="http://schemas.microsoft.com/office/drawing/2017/decorative" val="1"/>
+                </a:ext>
+              </a:extLst>
+            </p:cNvPr>
+            <p:cNvSpPr/>
+            <p:nvPr>
+              <p:extLst>
+                <p:ext uri="{386F3935-93C4-4BCD-93E2-E3B085C9AB24}">
+                  <p16:designElem xmlns:p16="http://schemas.microsoft.com/office/powerpoint/2015/main" val="1"/>
+                </p:ext>
+              </p:extLst>
+            </p:nvPr>
+          </p:nvSpPr>
+          <p:spPr>
+            <a:xfrm>
+              <a:off x="8138122" y="246888"/>
+              <a:ext cx="54368" cy="59227"/>
+            </a:xfrm>
+            <a:prstGeom prst="ellipse">
+              <a:avLst/>
+            </a:prstGeom>
+            <a:solidFill>
+              <a:schemeClr val="accent1"/>
+            </a:solidFill>
+            <a:ln>
+              <a:noFill/>
+            </a:ln>
+          </p:spPr>
+          <p:style>
+            <a:lnRef idx="2">
+              <a:schemeClr val="accent1">
+                <a:shade val="50000"/>
+              </a:schemeClr>
+            </a:lnRef>
+            <a:fillRef idx="1">
+              <a:schemeClr val="accent1"/>
+            </a:fillRef>
+            <a:effectRef idx="0">
+              <a:schemeClr val="accent1"/>
+            </a:effectRef>
+            <a:fontRef idx="minor">
+              <a:schemeClr val="lt1"/>
+            </a:fontRef>
+          </p:style>
+          <p:txBody>
+            <a:bodyPr rtlCol="0" anchor="ctr"/>
+            <a:lstStyle/>
+            <a:p>
+              <a:pPr algn="ctr"/>
+              <a:endParaRPr lang="en-US"/>
+            </a:p>
+          </p:txBody>
+        </p:sp>
+        <p:sp>
+          <p:nvSpPr>
+            <p:cNvPr id="19" name="Rectangle 64">
+              <a:extLst>
+                <a:ext uri="{FF2B5EF4-FFF2-40B4-BE49-F238E27FC236}">
+                  <a16:creationId xmlns:a16="http://schemas.microsoft.com/office/drawing/2014/main" id="{DEDD5A45-3641-4FE7-8375-EECF2DC9D002}"/>
+                </a:ext>
+                <a:ext uri="{C183D7F6-B498-43B3-948B-1728B52AA6E4}">
+                  <adec:decorative xmlns:adec="http://schemas.microsoft.com/office/drawing/2017/decorative" val="1"/>
+                </a:ext>
+              </a:extLst>
+            </p:cNvPr>
+            <p:cNvSpPr/>
+            <p:nvPr>
+              <p:extLst>
+                <p:ext uri="{386F3935-93C4-4BCD-93E2-E3B085C9AB24}">
+                  <p16:designElem xmlns:p16="http://schemas.microsoft.com/office/powerpoint/2015/main" val="1"/>
+                </p:ext>
+              </p:extLst>
+            </p:nvPr>
+          </p:nvSpPr>
+          <p:spPr>
+            <a:xfrm>
+              <a:off x="8013167" y="73152"/>
+              <a:ext cx="54368" cy="59227"/>
+            </a:xfrm>
+            <a:prstGeom prst="ellipse">
+              <a:avLst/>
+            </a:prstGeom>
+            <a:solidFill>
+              <a:schemeClr val="accent1"/>
+            </a:solidFill>
+            <a:ln>
+              <a:noFill/>
+            </a:ln>
+          </p:spPr>
+          <p:style>
+            <a:lnRef idx="2">
+              <a:schemeClr val="accent1">
+                <a:shade val="50000"/>
+              </a:schemeClr>
+            </a:lnRef>
+            <a:fillRef idx="1">
+              <a:schemeClr val="accent1"/>
+            </a:fillRef>
+            <a:effectRef idx="0">
+              <a:schemeClr val="accent1"/>
+            </a:effectRef>
+            <a:fontRef idx="minor">
+              <a:schemeClr val="lt1"/>
+            </a:fontRef>
+          </p:style>
+          <p:txBody>
+            <a:bodyPr rtlCol="0" anchor="ctr"/>
+            <a:lstStyle/>
+            <a:p>
+              <a:pPr algn="ctr"/>
+              <a:endParaRPr lang="en-US"/>
+            </a:p>
+          </p:txBody>
+        </p:sp>
+        <p:sp>
+          <p:nvSpPr>
+            <p:cNvPr id="20" name="Rectangle 66">
+              <a:extLst>
+                <a:ext uri="{FF2B5EF4-FFF2-40B4-BE49-F238E27FC236}">
+                  <a16:creationId xmlns:a16="http://schemas.microsoft.com/office/drawing/2014/main" id="{89BF55CA-60FC-479D-A85E-48626FC13567}"/>
+                </a:ext>
+                <a:ext uri="{C183D7F6-B498-43B3-948B-1728B52AA6E4}">
+                  <adec:decorative xmlns:adec="http://schemas.microsoft.com/office/drawing/2017/decorative" val="1"/>
+                </a:ext>
+              </a:extLst>
+            </p:cNvPr>
+            <p:cNvSpPr/>
+            <p:nvPr>
+              <p:extLst>
+                <p:ext uri="{386F3935-93C4-4BCD-93E2-E3B085C9AB24}">
+                  <p16:designElem xmlns:p16="http://schemas.microsoft.com/office/powerpoint/2015/main" val="1"/>
+                </p:ext>
+              </p:extLst>
+            </p:nvPr>
+          </p:nvSpPr>
+          <p:spPr>
+            <a:xfrm>
+              <a:off x="8013167" y="246888"/>
+              <a:ext cx="54368" cy="59227"/>
+            </a:xfrm>
+            <a:prstGeom prst="ellipse">
+              <a:avLst/>
+            </a:prstGeom>
+            <a:solidFill>
+              <a:schemeClr val="accent1"/>
+            </a:solidFill>
+            <a:ln>
+              <a:noFill/>
+            </a:ln>
+          </p:spPr>
+          <p:style>
+            <a:lnRef idx="2">
+              <a:schemeClr val="accent1">
+                <a:shade val="50000"/>
+              </a:schemeClr>
+            </a:lnRef>
+            <a:fillRef idx="1">
+              <a:schemeClr val="accent1"/>
+            </a:fillRef>
+            <a:effectRef idx="0">
+              <a:schemeClr val="accent1"/>
+            </a:effectRef>
+            <a:fontRef idx="minor">
+              <a:schemeClr val="lt1"/>
+            </a:fontRef>
+          </p:style>
+          <p:txBody>
+            <a:bodyPr rtlCol="0" anchor="ctr"/>
+            <a:lstStyle/>
+            <a:p>
+              <a:pPr algn="ctr"/>
+              <a:endParaRPr lang="en-US"/>
+            </a:p>
+          </p:txBody>
+        </p:sp>
+        <p:sp>
+          <p:nvSpPr>
+            <p:cNvPr id="21" name="Rectangle 64">
+              <a:extLst>
+                <a:ext uri="{FF2B5EF4-FFF2-40B4-BE49-F238E27FC236}">
+                  <a16:creationId xmlns:a16="http://schemas.microsoft.com/office/drawing/2014/main" id="{5AFBE5BF-E87A-408F-BBBD-44C3D04C042A}"/>
+                </a:ext>
+                <a:ext uri="{C183D7F6-B498-43B3-948B-1728B52AA6E4}">
+                  <adec:decorative xmlns:adec="http://schemas.microsoft.com/office/drawing/2017/decorative" val="1"/>
+                </a:ext>
+              </a:extLst>
+            </p:cNvPr>
+            <p:cNvSpPr/>
+            <p:nvPr>
+              <p:extLst>
+                <p:ext uri="{386F3935-93C4-4BCD-93E2-E3B085C9AB24}">
+                  <p16:designElem xmlns:p16="http://schemas.microsoft.com/office/powerpoint/2015/main" val="1"/>
+                </p:ext>
+              </p:extLst>
+            </p:nvPr>
+          </p:nvSpPr>
+          <p:spPr>
+            <a:xfrm>
+              <a:off x="7888211" y="73152"/>
+              <a:ext cx="54368" cy="59227"/>
+            </a:xfrm>
+            <a:prstGeom prst="ellipse">
+              <a:avLst/>
+            </a:prstGeom>
+            <a:solidFill>
+              <a:schemeClr val="accent1"/>
+            </a:solidFill>
+            <a:ln>
+              <a:noFill/>
+            </a:ln>
+          </p:spPr>
+          <p:style>
+            <a:lnRef idx="2">
+              <a:schemeClr val="accent1">
+                <a:shade val="50000"/>
+              </a:schemeClr>
+            </a:lnRef>
+            <a:fillRef idx="1">
+              <a:schemeClr val="accent1"/>
+            </a:fillRef>
+            <a:effectRef idx="0">
+              <a:schemeClr val="accent1"/>
+            </a:effectRef>
+            <a:fontRef idx="minor">
+              <a:schemeClr val="lt1"/>
+            </a:fontRef>
+          </p:style>
+          <p:txBody>
+            <a:bodyPr rtlCol="0" anchor="ctr"/>
+            <a:lstStyle/>
+            <a:p>
+              <a:pPr algn="ctr"/>
+              <a:endParaRPr lang="en-US"/>
+            </a:p>
+          </p:txBody>
+        </p:sp>
+        <p:sp>
+          <p:nvSpPr>
+            <p:cNvPr id="22" name="Rectangle 66">
+              <a:extLst>
+                <a:ext uri="{FF2B5EF4-FFF2-40B4-BE49-F238E27FC236}">
+                  <a16:creationId xmlns:a16="http://schemas.microsoft.com/office/drawing/2014/main" id="{1C27CF92-D148-45C8-88B6-F450B63DF1F2}"/>
+                </a:ext>
+                <a:ext uri="{C183D7F6-B498-43B3-948B-1728B52AA6E4}">
+                  <adec:decorative xmlns:adec="http://schemas.microsoft.com/office/drawing/2017/decorative" val="1"/>
+                </a:ext>
+              </a:extLst>
+            </p:cNvPr>
+            <p:cNvSpPr/>
+            <p:nvPr>
+              <p:extLst>
+                <p:ext uri="{386F3935-93C4-4BCD-93E2-E3B085C9AB24}">
+                  <p16:designElem xmlns:p16="http://schemas.microsoft.com/office/powerpoint/2015/main" val="1"/>
+                </p:ext>
+              </p:extLst>
+            </p:nvPr>
+          </p:nvSpPr>
+          <p:spPr>
+            <a:xfrm>
+              <a:off x="7888211" y="246888"/>
+              <a:ext cx="54368" cy="59227"/>
+            </a:xfrm>
+            <a:prstGeom prst="ellipse">
+              <a:avLst/>
+            </a:prstGeom>
+            <a:solidFill>
+              <a:schemeClr val="accent1"/>
+            </a:solidFill>
+            <a:ln>
+              <a:noFill/>
+            </a:ln>
+          </p:spPr>
+          <p:style>
+            <a:lnRef idx="2">
+              <a:schemeClr val="accent1">
+                <a:shade val="50000"/>
+              </a:schemeClr>
+            </a:lnRef>
+            <a:fillRef idx="1">
+              <a:schemeClr val="accent1"/>
+            </a:fillRef>
+            <a:effectRef idx="0">
+              <a:schemeClr val="accent1"/>
+            </a:effectRef>
+            <a:fontRef idx="minor">
+              <a:schemeClr val="lt1"/>
+            </a:fontRef>
+          </p:style>
+          <p:txBody>
+            <a:bodyPr rtlCol="0" anchor="ctr"/>
+            <a:lstStyle/>
+            <a:p>
+              <a:pPr algn="ctr"/>
+              <a:endParaRPr lang="en-US"/>
+            </a:p>
+          </p:txBody>
+        </p:sp>
+        <p:sp>
+          <p:nvSpPr>
+            <p:cNvPr id="23" name="Rectangle 64">
+              <a:extLst>
+                <a:ext uri="{FF2B5EF4-FFF2-40B4-BE49-F238E27FC236}">
+                  <a16:creationId xmlns:a16="http://schemas.microsoft.com/office/drawing/2014/main" id="{51CA2232-D147-480C-B1EE-665EE6ACC723}"/>
+                </a:ext>
+                <a:ext uri="{C183D7F6-B498-43B3-948B-1728B52AA6E4}">
+                  <adec:decorative xmlns:adec="http://schemas.microsoft.com/office/drawing/2017/decorative" val="1"/>
+                </a:ext>
+              </a:extLst>
+            </p:cNvPr>
+            <p:cNvSpPr/>
+            <p:nvPr>
+              <p:extLst>
+                <p:ext uri="{386F3935-93C4-4BCD-93E2-E3B085C9AB24}">
+                  <p16:designElem xmlns:p16="http://schemas.microsoft.com/office/powerpoint/2015/main" val="1"/>
+                </p:ext>
+              </p:extLst>
+            </p:nvPr>
+          </p:nvSpPr>
+          <p:spPr>
+            <a:xfrm>
+              <a:off x="7763256" y="73152"/>
+              <a:ext cx="54368" cy="59227"/>
+            </a:xfrm>
+            <a:prstGeom prst="ellipse">
+              <a:avLst/>
+            </a:prstGeom>
+            <a:solidFill>
+              <a:schemeClr val="accent1"/>
+            </a:solidFill>
+            <a:ln>
+              <a:noFill/>
+            </a:ln>
+          </p:spPr>
+          <p:style>
+            <a:lnRef idx="2">
+              <a:schemeClr val="accent1">
+                <a:shade val="50000"/>
+              </a:schemeClr>
+            </a:lnRef>
+            <a:fillRef idx="1">
+              <a:schemeClr val="accent1"/>
+            </a:fillRef>
+            <a:effectRef idx="0">
+              <a:schemeClr val="accent1"/>
+            </a:effectRef>
+            <a:fontRef idx="minor">
+              <a:schemeClr val="lt1"/>
+            </a:fontRef>
+          </p:style>
+          <p:txBody>
+            <a:bodyPr rtlCol="0" anchor="ctr"/>
+            <a:lstStyle/>
+            <a:p>
+              <a:pPr algn="ctr"/>
+              <a:endParaRPr lang="en-US"/>
+            </a:p>
+          </p:txBody>
+        </p:sp>
+        <p:sp>
+          <p:nvSpPr>
+            <p:cNvPr id="24" name="Rectangle 66">
+              <a:extLst>
+                <a:ext uri="{FF2B5EF4-FFF2-40B4-BE49-F238E27FC236}">
+                  <a16:creationId xmlns:a16="http://schemas.microsoft.com/office/drawing/2014/main" id="{7E67D92D-1CA9-43CE-8150-DF504F2BF052}"/>
+                </a:ext>
+                <a:ext uri="{C183D7F6-B498-43B3-948B-1728B52AA6E4}">
+                  <adec:decorative xmlns:adec="http://schemas.microsoft.com/office/drawing/2017/decorative" val="1"/>
+                </a:ext>
+              </a:extLst>
+            </p:cNvPr>
+            <p:cNvSpPr/>
+            <p:nvPr>
+              <p:extLst>
+                <p:ext uri="{386F3935-93C4-4BCD-93E2-E3B085C9AB24}">
+                  <p16:designElem xmlns:p16="http://schemas.microsoft.com/office/powerpoint/2015/main" val="1"/>
+                </p:ext>
+              </p:extLst>
+            </p:nvPr>
+          </p:nvSpPr>
+          <p:spPr>
+            <a:xfrm>
+              <a:off x="7763256" y="246888"/>
+              <a:ext cx="54368" cy="59227"/>
+            </a:xfrm>
+            <a:prstGeom prst="ellipse">
+              <a:avLst/>
+            </a:prstGeom>
+            <a:solidFill>
+              <a:schemeClr val="accent1"/>
+            </a:solidFill>
+            <a:ln>
+              <a:noFill/>
+            </a:ln>
+          </p:spPr>
+          <p:style>
+            <a:lnRef idx="2">
+              <a:schemeClr val="accent1">
+                <a:shade val="50000"/>
+              </a:schemeClr>
+            </a:lnRef>
+            <a:fillRef idx="1">
+              <a:schemeClr val="accent1"/>
+            </a:fillRef>
+            <a:effectRef idx="0">
+              <a:schemeClr val="accent1"/>
+            </a:effectRef>
+            <a:fontRef idx="minor">
+              <a:schemeClr val="lt1"/>
+            </a:fontRef>
+          </p:style>
+          <p:txBody>
+            <a:bodyPr rtlCol="0" anchor="ctr"/>
+            <a:lstStyle/>
+            <a:p>
+              <a:pPr algn="ctr"/>
+              <a:endParaRPr lang="en-US"/>
+            </a:p>
+          </p:txBody>
+        </p:sp>
+        <p:sp>
+          <p:nvSpPr>
+            <p:cNvPr id="25" name="Rectangle 64">
+              <a:extLst>
+                <a:ext uri="{FF2B5EF4-FFF2-40B4-BE49-F238E27FC236}">
+                  <a16:creationId xmlns:a16="http://schemas.microsoft.com/office/drawing/2014/main" id="{7B273169-B674-4C50-A14D-A943B9979284}"/>
+                </a:ext>
+                <a:ext uri="{C183D7F6-B498-43B3-948B-1728B52AA6E4}">
+                  <adec:decorative xmlns:adec="http://schemas.microsoft.com/office/drawing/2017/decorative" val="1"/>
+                </a:ext>
+              </a:extLst>
+            </p:cNvPr>
+            <p:cNvSpPr/>
+            <p:nvPr>
+              <p:extLst>
+                <p:ext uri="{386F3935-93C4-4BCD-93E2-E3B085C9AB24}">
+                  <p16:designElem xmlns:p16="http://schemas.microsoft.com/office/powerpoint/2015/main" val="1"/>
+                </p:ext>
+              </p:extLst>
+            </p:nvPr>
+          </p:nvSpPr>
+          <p:spPr>
+            <a:xfrm>
+              <a:off x="8887854" y="73152"/>
+              <a:ext cx="54368" cy="59227"/>
+            </a:xfrm>
+            <a:prstGeom prst="ellipse">
+              <a:avLst/>
+            </a:prstGeom>
+            <a:solidFill>
+              <a:schemeClr val="accent1"/>
+            </a:solidFill>
+            <a:ln>
+              <a:noFill/>
+            </a:ln>
+          </p:spPr>
+          <p:style>
+            <a:lnRef idx="2">
+              <a:schemeClr val="accent1">
+                <a:shade val="50000"/>
+              </a:schemeClr>
+            </a:lnRef>
+            <a:fillRef idx="1">
+              <a:schemeClr val="accent1"/>
+            </a:fillRef>
+            <a:effectRef idx="0">
+              <a:schemeClr val="accent1"/>
+            </a:effectRef>
+            <a:fontRef idx="minor">
+              <a:schemeClr val="lt1"/>
+            </a:fontRef>
+          </p:style>
+          <p:txBody>
+            <a:bodyPr rtlCol="0" anchor="ctr"/>
+            <a:lstStyle/>
+            <a:p>
+              <a:pPr algn="ctr"/>
+              <a:endParaRPr lang="en-US"/>
+            </a:p>
+          </p:txBody>
+        </p:sp>
+        <p:sp>
+          <p:nvSpPr>
+            <p:cNvPr id="26" name="Rectangle 66">
+              <a:extLst>
+                <a:ext uri="{FF2B5EF4-FFF2-40B4-BE49-F238E27FC236}">
+                  <a16:creationId xmlns:a16="http://schemas.microsoft.com/office/drawing/2014/main" id="{DF6183FA-653E-4533-9A0B-D249EC0B1553}"/>
+                </a:ext>
+                <a:ext uri="{C183D7F6-B498-43B3-948B-1728B52AA6E4}">
+                  <adec:decorative xmlns:adec="http://schemas.microsoft.com/office/drawing/2017/decorative" val="1"/>
+                </a:ext>
+              </a:extLst>
+            </p:cNvPr>
+            <p:cNvSpPr/>
+            <p:nvPr>
+              <p:extLst>
+                <p:ext uri="{386F3935-93C4-4BCD-93E2-E3B085C9AB24}">
+                  <p16:designElem xmlns:p16="http://schemas.microsoft.com/office/powerpoint/2015/main" val="1"/>
+                </p:ext>
+              </p:extLst>
+            </p:nvPr>
+          </p:nvSpPr>
+          <p:spPr>
+            <a:xfrm>
+              <a:off x="8887854" y="246888"/>
+              <a:ext cx="54368" cy="59227"/>
+            </a:xfrm>
+            <a:prstGeom prst="ellipse">
+              <a:avLst/>
+            </a:prstGeom>
+            <a:solidFill>
+              <a:schemeClr val="accent1"/>
+            </a:solidFill>
+            <a:ln>
+              <a:noFill/>
+            </a:ln>
+          </p:spPr>
+          <p:style>
+            <a:lnRef idx="2">
+              <a:schemeClr val="accent1">
+                <a:shade val="50000"/>
+              </a:schemeClr>
+            </a:lnRef>
+            <a:fillRef idx="1">
+              <a:schemeClr val="accent1"/>
+            </a:fillRef>
+            <a:effectRef idx="0">
+              <a:schemeClr val="accent1"/>
+            </a:effectRef>
+            <a:fontRef idx="minor">
+              <a:schemeClr val="lt1"/>
+            </a:fontRef>
+          </p:style>
+          <p:txBody>
+            <a:bodyPr rtlCol="0" anchor="ctr"/>
+            <a:lstStyle/>
+            <a:p>
+              <a:pPr algn="ctr"/>
+              <a:endParaRPr lang="en-US"/>
+            </a:p>
+          </p:txBody>
+        </p:sp>
+        <p:sp>
+          <p:nvSpPr>
+            <p:cNvPr id="27" name="Rectangle 64">
+              <a:extLst>
+                <a:ext uri="{FF2B5EF4-FFF2-40B4-BE49-F238E27FC236}">
+                  <a16:creationId xmlns:a16="http://schemas.microsoft.com/office/drawing/2014/main" id="{A82EFE58-AAB0-4925-A176-6FF36BF878A3}"/>
+                </a:ext>
+                <a:ext uri="{C183D7F6-B498-43B3-948B-1728B52AA6E4}">
+                  <adec:decorative xmlns:adec="http://schemas.microsoft.com/office/drawing/2017/decorative" val="1"/>
+                </a:ext>
+              </a:extLst>
+            </p:cNvPr>
+            <p:cNvSpPr/>
+            <p:nvPr>
+              <p:extLst>
+                <p:ext uri="{386F3935-93C4-4BCD-93E2-E3B085C9AB24}">
+                  <p16:designElem xmlns:p16="http://schemas.microsoft.com/office/powerpoint/2015/main" val="1"/>
+                </p:ext>
+              </p:extLst>
+            </p:nvPr>
+          </p:nvSpPr>
+          <p:spPr>
+            <a:xfrm>
+              <a:off x="8762899" y="73152"/>
+              <a:ext cx="54368" cy="59227"/>
+            </a:xfrm>
+            <a:prstGeom prst="ellipse">
+              <a:avLst/>
+            </a:prstGeom>
+            <a:solidFill>
+              <a:schemeClr val="accent1"/>
+            </a:solidFill>
+            <a:ln>
+              <a:noFill/>
+            </a:ln>
+          </p:spPr>
+          <p:style>
+            <a:lnRef idx="2">
+              <a:schemeClr val="accent1">
+                <a:shade val="50000"/>
+              </a:schemeClr>
+            </a:lnRef>
+            <a:fillRef idx="1">
+              <a:schemeClr val="accent1"/>
+            </a:fillRef>
+            <a:effectRef idx="0">
+              <a:schemeClr val="accent1"/>
+            </a:effectRef>
+            <a:fontRef idx="minor">
+              <a:schemeClr val="lt1"/>
+            </a:fontRef>
+          </p:style>
+          <p:txBody>
+            <a:bodyPr rtlCol="0" anchor="ctr"/>
+            <a:lstStyle/>
+            <a:p>
+              <a:pPr algn="ctr"/>
+              <a:endParaRPr lang="en-US"/>
+            </a:p>
+          </p:txBody>
+        </p:sp>
+        <p:sp>
+          <p:nvSpPr>
+            <p:cNvPr id="28" name="Rectangle 66">
+              <a:extLst>
+                <a:ext uri="{FF2B5EF4-FFF2-40B4-BE49-F238E27FC236}">
+                  <a16:creationId xmlns:a16="http://schemas.microsoft.com/office/drawing/2014/main" id="{3122AE75-4DBB-4E14-B0CA-DD1EAD89CE83}"/>
+                </a:ext>
+                <a:ext uri="{C183D7F6-B498-43B3-948B-1728B52AA6E4}">
+                  <adec:decorative xmlns:adec="http://schemas.microsoft.com/office/drawing/2017/decorative" val="1"/>
+                </a:ext>
+              </a:extLst>
+            </p:cNvPr>
+            <p:cNvSpPr/>
+            <p:nvPr>
+              <p:extLst>
+                <p:ext uri="{386F3935-93C4-4BCD-93E2-E3B085C9AB24}">
+                  <p16:designElem xmlns:p16="http://schemas.microsoft.com/office/powerpoint/2015/main" val="1"/>
+                </p:ext>
+              </p:extLst>
+            </p:nvPr>
+          </p:nvSpPr>
+          <p:spPr>
+            <a:xfrm>
+              <a:off x="8762899" y="246888"/>
+              <a:ext cx="54368" cy="59227"/>
+            </a:xfrm>
+            <a:prstGeom prst="ellipse">
+              <a:avLst/>
+            </a:prstGeom>
+            <a:solidFill>
+              <a:schemeClr val="accent1"/>
+            </a:solidFill>
+            <a:ln>
+              <a:noFill/>
+            </a:ln>
+          </p:spPr>
+          <p:style>
+            <a:lnRef idx="2">
+              <a:schemeClr val="accent1">
+                <a:shade val="50000"/>
+              </a:schemeClr>
+            </a:lnRef>
+            <a:fillRef idx="1">
+              <a:schemeClr val="accent1"/>
+            </a:fillRef>
+            <a:effectRef idx="0">
+              <a:schemeClr val="accent1"/>
+            </a:effectRef>
+            <a:fontRef idx="minor">
+              <a:schemeClr val="lt1"/>
+            </a:fontRef>
+          </p:style>
+          <p:txBody>
+            <a:bodyPr rtlCol="0" anchor="ctr"/>
+            <a:lstStyle/>
+            <a:p>
+              <a:pPr algn="ctr"/>
+              <a:endParaRPr lang="en-US"/>
+            </a:p>
+          </p:txBody>
+        </p:sp>
+        <p:sp>
+          <p:nvSpPr>
+            <p:cNvPr id="29" name="Rectangle 64">
+              <a:extLst>
+                <a:ext uri="{FF2B5EF4-FFF2-40B4-BE49-F238E27FC236}">
+                  <a16:creationId xmlns:a16="http://schemas.microsoft.com/office/drawing/2014/main" id="{4ED7E672-90FC-4E8C-9C43-3AAE391C6C23}"/>
+                </a:ext>
+                <a:ext uri="{C183D7F6-B498-43B3-948B-1728B52AA6E4}">
+                  <adec:decorative xmlns:adec="http://schemas.microsoft.com/office/drawing/2017/decorative" val="1"/>
+                </a:ext>
+              </a:extLst>
+            </p:cNvPr>
+            <p:cNvSpPr/>
+            <p:nvPr>
+              <p:extLst>
+                <p:ext uri="{386F3935-93C4-4BCD-93E2-E3B085C9AB24}">
+                  <p16:designElem xmlns:p16="http://schemas.microsoft.com/office/powerpoint/2015/main" val="1"/>
+                </p:ext>
+              </p:extLst>
+            </p:nvPr>
+          </p:nvSpPr>
+          <p:spPr>
+            <a:xfrm>
+              <a:off x="8637944" y="73152"/>
+              <a:ext cx="54368" cy="59227"/>
+            </a:xfrm>
+            <a:prstGeom prst="ellipse">
+              <a:avLst/>
+            </a:prstGeom>
+            <a:solidFill>
+              <a:schemeClr val="accent1"/>
+            </a:solidFill>
+            <a:ln>
+              <a:noFill/>
+            </a:ln>
+          </p:spPr>
+          <p:style>
+            <a:lnRef idx="2">
+              <a:schemeClr val="accent1">
+                <a:shade val="50000"/>
+              </a:schemeClr>
+            </a:lnRef>
+            <a:fillRef idx="1">
+              <a:schemeClr val="accent1"/>
+            </a:fillRef>
+            <a:effectRef idx="0">
+              <a:schemeClr val="accent1"/>
+            </a:effectRef>
+            <a:fontRef idx="minor">
+              <a:schemeClr val="lt1"/>
+            </a:fontRef>
+          </p:style>
+          <p:txBody>
+            <a:bodyPr rtlCol="0" anchor="ctr"/>
+            <a:lstStyle/>
+            <a:p>
+              <a:pPr algn="ctr"/>
+              <a:endParaRPr lang="en-US"/>
+            </a:p>
+          </p:txBody>
+        </p:sp>
+        <p:sp>
+          <p:nvSpPr>
+            <p:cNvPr id="30" name="Rectangle 66">
+              <a:extLst>
+                <a:ext uri="{FF2B5EF4-FFF2-40B4-BE49-F238E27FC236}">
+                  <a16:creationId xmlns:a16="http://schemas.microsoft.com/office/drawing/2014/main" id="{A5C0019E-5136-4C5E-A223-1E1717FD47C7}"/>
+                </a:ext>
+                <a:ext uri="{C183D7F6-B498-43B3-948B-1728B52AA6E4}">
+                  <adec:decorative xmlns:adec="http://schemas.microsoft.com/office/drawing/2017/decorative" val="1"/>
+                </a:ext>
+              </a:extLst>
+            </p:cNvPr>
+            <p:cNvSpPr/>
+            <p:nvPr>
+              <p:extLst>
+                <p:ext uri="{386F3935-93C4-4BCD-93E2-E3B085C9AB24}">
+                  <p16:designElem xmlns:p16="http://schemas.microsoft.com/office/powerpoint/2015/main" val="1"/>
+                </p:ext>
+              </p:extLst>
+            </p:nvPr>
+          </p:nvSpPr>
+          <p:spPr>
+            <a:xfrm>
+              <a:off x="8637944" y="246888"/>
+              <a:ext cx="54368" cy="59227"/>
+            </a:xfrm>
+            <a:prstGeom prst="ellipse">
+              <a:avLst/>
+            </a:prstGeom>
+            <a:solidFill>
+              <a:schemeClr val="accent1"/>
+            </a:solidFill>
+            <a:ln>
+              <a:noFill/>
+            </a:ln>
+          </p:spPr>
+          <p:style>
+            <a:lnRef idx="2">
+              <a:schemeClr val="accent1">
+                <a:shade val="50000"/>
+              </a:schemeClr>
+            </a:lnRef>
+            <a:fillRef idx="1">
+              <a:schemeClr val="accent1"/>
+            </a:fillRef>
+            <a:effectRef idx="0">
+              <a:schemeClr val="accent1"/>
+            </a:effectRef>
+            <a:fontRef idx="minor">
+              <a:schemeClr val="lt1"/>
+            </a:fontRef>
+          </p:style>
+          <p:txBody>
+            <a:bodyPr rtlCol="0" anchor="ctr"/>
+            <a:lstStyle/>
+            <a:p>
+              <a:pPr algn="ctr"/>
+              <a:endParaRPr lang="en-US"/>
+            </a:p>
+          </p:txBody>
+        </p:sp>
+        <p:sp>
+          <p:nvSpPr>
+            <p:cNvPr id="31" name="Rectangle 64">
+              <a:extLst>
+                <a:ext uri="{FF2B5EF4-FFF2-40B4-BE49-F238E27FC236}">
+                  <a16:creationId xmlns:a16="http://schemas.microsoft.com/office/drawing/2014/main" id="{29705F60-CFE6-47C5-96E5-05E7731FC84C}"/>
+                </a:ext>
+                <a:ext uri="{C183D7F6-B498-43B3-948B-1728B52AA6E4}">
+                  <adec:decorative xmlns:adec="http://schemas.microsoft.com/office/drawing/2017/decorative" val="1"/>
+                </a:ext>
+              </a:extLst>
+            </p:cNvPr>
+            <p:cNvSpPr/>
+            <p:nvPr>
+              <p:extLst>
+                <p:ext uri="{386F3935-93C4-4BCD-93E2-E3B085C9AB24}">
+                  <p16:designElem xmlns:p16="http://schemas.microsoft.com/office/powerpoint/2015/main" val="1"/>
+                </p:ext>
+              </p:extLst>
+            </p:nvPr>
+          </p:nvSpPr>
+          <p:spPr>
+            <a:xfrm>
+              <a:off x="8512988" y="73152"/>
+              <a:ext cx="54368" cy="59227"/>
+            </a:xfrm>
+            <a:prstGeom prst="ellipse">
+              <a:avLst/>
+            </a:prstGeom>
+            <a:solidFill>
+              <a:schemeClr val="accent1"/>
+            </a:solidFill>
+            <a:ln>
+              <a:noFill/>
+            </a:ln>
+          </p:spPr>
+          <p:style>
+            <a:lnRef idx="2">
+              <a:schemeClr val="accent1">
+                <a:shade val="50000"/>
+              </a:schemeClr>
+            </a:lnRef>
+            <a:fillRef idx="1">
+              <a:schemeClr val="accent1"/>
+            </a:fillRef>
+            <a:effectRef idx="0">
+              <a:schemeClr val="accent1"/>
+            </a:effectRef>
+            <a:fontRef idx="minor">
+              <a:schemeClr val="lt1"/>
+            </a:fontRef>
+          </p:style>
+          <p:txBody>
+            <a:bodyPr rtlCol="0" anchor="ctr"/>
+            <a:lstStyle/>
+            <a:p>
+              <a:pPr algn="ctr"/>
+              <a:endParaRPr lang="en-US"/>
+            </a:p>
+          </p:txBody>
+        </p:sp>
+        <p:sp>
+          <p:nvSpPr>
+            <p:cNvPr id="32" name="Rectangle 66">
+              <a:extLst>
+                <a:ext uri="{FF2B5EF4-FFF2-40B4-BE49-F238E27FC236}">
+                  <a16:creationId xmlns:a16="http://schemas.microsoft.com/office/drawing/2014/main" id="{090E047C-18BC-4180-8D10-9F18F517BAEA}"/>
+                </a:ext>
+                <a:ext uri="{C183D7F6-B498-43B3-948B-1728B52AA6E4}">
+                  <adec:decorative xmlns:adec="http://schemas.microsoft.com/office/drawing/2017/decorative" val="1"/>
+                </a:ext>
+              </a:extLst>
+            </p:cNvPr>
+            <p:cNvSpPr/>
+            <p:nvPr>
+              <p:extLst>
+                <p:ext uri="{386F3935-93C4-4BCD-93E2-E3B085C9AB24}">
+                  <p16:designElem xmlns:p16="http://schemas.microsoft.com/office/powerpoint/2015/main" val="1"/>
+                </p:ext>
+              </p:extLst>
+            </p:nvPr>
+          </p:nvSpPr>
+          <p:spPr>
+            <a:xfrm>
+              <a:off x="8512988" y="246888"/>
+              <a:ext cx="54368" cy="59227"/>
+            </a:xfrm>
+            <a:prstGeom prst="ellipse">
+              <a:avLst/>
+            </a:prstGeom>
+            <a:solidFill>
+              <a:schemeClr val="accent1"/>
+            </a:solidFill>
+            <a:ln>
+              <a:noFill/>
+            </a:ln>
+          </p:spPr>
+          <p:style>
+            <a:lnRef idx="2">
+              <a:schemeClr val="accent1">
+                <a:shade val="50000"/>
+              </a:schemeClr>
+            </a:lnRef>
+            <a:fillRef idx="1">
+              <a:schemeClr val="accent1"/>
+            </a:fillRef>
+            <a:effectRef idx="0">
+              <a:schemeClr val="accent1"/>
+            </a:effectRef>
+            <a:fontRef idx="minor">
+              <a:schemeClr val="lt1"/>
+            </a:fontRef>
+          </p:style>
+          <p:txBody>
+            <a:bodyPr rtlCol="0" anchor="ctr"/>
+            <a:lstStyle/>
+            <a:p>
+              <a:pPr algn="ctr"/>
+              <a:endParaRPr lang="en-US"/>
+            </a:p>
+          </p:txBody>
+        </p:sp>
+        <p:sp>
+          <p:nvSpPr>
+            <p:cNvPr id="33" name="Rectangle 64">
+              <a:extLst>
+                <a:ext uri="{FF2B5EF4-FFF2-40B4-BE49-F238E27FC236}">
+                  <a16:creationId xmlns:a16="http://schemas.microsoft.com/office/drawing/2014/main" id="{A153194A-C8B1-46DB-9C6B-9847B06FAEFE}"/>
+                </a:ext>
+                <a:ext uri="{C183D7F6-B498-43B3-948B-1728B52AA6E4}">
+                  <adec:decorative xmlns:adec="http://schemas.microsoft.com/office/drawing/2017/decorative" val="1"/>
+                </a:ext>
+              </a:extLst>
+            </p:cNvPr>
+            <p:cNvSpPr/>
+            <p:nvPr>
+              <p:extLst>
+                <p:ext uri="{386F3935-93C4-4BCD-93E2-E3B085C9AB24}">
+                  <p16:designElem xmlns:p16="http://schemas.microsoft.com/office/powerpoint/2015/main" val="1"/>
+                </p:ext>
+              </p:extLst>
+            </p:nvPr>
+          </p:nvSpPr>
+          <p:spPr>
+            <a:xfrm>
+              <a:off x="8388033" y="73152"/>
+              <a:ext cx="54368" cy="59227"/>
+            </a:xfrm>
+            <a:prstGeom prst="ellipse">
+              <a:avLst/>
+            </a:prstGeom>
+            <a:solidFill>
+              <a:schemeClr val="accent1"/>
+            </a:solidFill>
+            <a:ln>
+              <a:noFill/>
+            </a:ln>
+          </p:spPr>
+          <p:style>
+            <a:lnRef idx="2">
+              <a:schemeClr val="accent1">
+                <a:shade val="50000"/>
+              </a:schemeClr>
+            </a:lnRef>
+            <a:fillRef idx="1">
+              <a:schemeClr val="accent1"/>
+            </a:fillRef>
+            <a:effectRef idx="0">
+              <a:schemeClr val="accent1"/>
+            </a:effectRef>
+            <a:fontRef idx="minor">
+              <a:schemeClr val="lt1"/>
+            </a:fontRef>
+          </p:style>
+          <p:txBody>
+            <a:bodyPr rtlCol="0" anchor="ctr"/>
+            <a:lstStyle/>
+            <a:p>
+              <a:pPr algn="ctr"/>
+              <a:endParaRPr lang="en-US"/>
+            </a:p>
+          </p:txBody>
+        </p:sp>
+        <p:sp>
+          <p:nvSpPr>
+            <p:cNvPr id="34" name="Rectangle 66">
+              <a:extLst>
+                <a:ext uri="{FF2B5EF4-FFF2-40B4-BE49-F238E27FC236}">
+                  <a16:creationId xmlns:a16="http://schemas.microsoft.com/office/drawing/2014/main" id="{5C0235EA-4E98-43EA-9AAE-2BD893DEAF55}"/>
+                </a:ext>
+                <a:ext uri="{C183D7F6-B498-43B3-948B-1728B52AA6E4}">
+                  <adec:decorative xmlns:adec="http://schemas.microsoft.com/office/drawing/2017/decorative" val="1"/>
+                </a:ext>
+              </a:extLst>
+            </p:cNvPr>
+            <p:cNvSpPr/>
+            <p:nvPr>
+              <p:extLst>
+                <p:ext uri="{386F3935-93C4-4BCD-93E2-E3B085C9AB24}">
+                  <p16:designElem xmlns:p16="http://schemas.microsoft.com/office/powerpoint/2015/main" val="1"/>
+                </p:ext>
+              </p:extLst>
+            </p:nvPr>
+          </p:nvSpPr>
+          <p:spPr>
+            <a:xfrm>
+              <a:off x="8388033" y="246888"/>
+              <a:ext cx="54368" cy="59227"/>
+            </a:xfrm>
+            <a:prstGeom prst="ellipse">
+              <a:avLst/>
+            </a:prstGeom>
+            <a:solidFill>
+              <a:schemeClr val="accent1"/>
+            </a:solidFill>
+            <a:ln>
+              <a:noFill/>
+            </a:ln>
+          </p:spPr>
+          <p:style>
+            <a:lnRef idx="2">
+              <a:schemeClr val="accent1">
+                <a:shade val="50000"/>
+              </a:schemeClr>
+            </a:lnRef>
+            <a:fillRef idx="1">
+              <a:schemeClr val="accent1"/>
+            </a:fillRef>
+            <a:effectRef idx="0">
+              <a:schemeClr val="accent1"/>
+            </a:effectRef>
+            <a:fontRef idx="minor">
+              <a:schemeClr val="lt1"/>
+            </a:fontRef>
+          </p:style>
+          <p:txBody>
+            <a:bodyPr rtlCol="0" anchor="ctr"/>
+            <a:lstStyle/>
+            <a:p>
+              <a:pPr algn="ctr"/>
+              <a:endParaRPr lang="en-US"/>
+            </a:p>
+          </p:txBody>
+        </p:sp>
+      </p:grpSp>
       <p:pic>
         <p:nvPicPr>
           <p:cNvPr id="4" name="Picture 3">
@@ -13432,6 +15158,69 @@
           </a:prstGeom>
         </p:spPr>
       </p:pic>
+      <p:sp>
+        <p:nvSpPr>
+          <p:cNvPr id="36" name="Rectangle 35">
+            <a:extLst>
+              <a:ext uri="{FF2B5EF4-FFF2-40B4-BE49-F238E27FC236}">
+                <a16:creationId xmlns:a16="http://schemas.microsoft.com/office/drawing/2014/main" id="{D9F5512A-48E1-4C07-B75E-3CCC517B6804}"/>
+              </a:ext>
+              <a:ext uri="{C183D7F6-B498-43B3-948B-1728B52AA6E4}">
+                <adec:decorative xmlns:adec="http://schemas.microsoft.com/office/drawing/2017/decorative" val="1"/>
+              </a:ext>
+            </a:extLst>
+          </p:cNvPr>
+          <p:cNvSpPr>
+            <a:spLocks noGrp="1" noRot="1" noChangeAspect="1" noMove="1" noResize="1" noEditPoints="1" noAdjustHandles="1" noChangeArrowheads="1" noChangeShapeType="1" noTextEdit="1"/>
+          </p:cNvSpPr>
+          <p:nvPr>
+            <p:extLst>
+              <p:ext uri="{386F3935-93C4-4BCD-93E2-E3B085C9AB24}">
+                <p16:designElem xmlns:p16="http://schemas.microsoft.com/office/powerpoint/2015/main" val="1"/>
+              </p:ext>
+            </p:extLst>
+          </p:nvPr>
+        </p:nvSpPr>
+        <p:spPr>
+          <a:xfrm>
+            <a:off x="0" y="3233650"/>
+            <a:ext cx="455228" cy="3624350"/>
+          </a:xfrm>
+          <a:prstGeom prst="rect">
+            <a:avLst/>
+          </a:prstGeom>
+          <a:solidFill>
+            <a:schemeClr val="accent1"/>
+          </a:solidFill>
+          <a:ln>
+            <a:noFill/>
+          </a:ln>
+        </p:spPr>
+        <p:style>
+          <a:lnRef idx="2">
+            <a:schemeClr val="accent1">
+              <a:shade val="50000"/>
+            </a:schemeClr>
+          </a:lnRef>
+          <a:fillRef idx="1">
+            <a:schemeClr val="accent1"/>
+          </a:fillRef>
+          <a:effectRef idx="0">
+            <a:schemeClr val="accent1"/>
+          </a:effectRef>
+          <a:fontRef idx="minor">
+            <a:schemeClr val="lt1"/>
+          </a:fontRef>
+        </p:style>
+        <p:txBody>
+          <a:bodyPr rtlCol="0" anchor="ctr"/>
+          <a:lstStyle/>
+          <a:p>
+            <a:pPr algn="ctr"/>
+            <a:endParaRPr lang="en-US"/>
+          </a:p>
+        </p:txBody>
+      </p:sp>
       <p:pic>
         <p:nvPicPr>
           <p:cNvPr id="5" name="Picture 4">
@@ -13907,7 +15696,7 @@
               <a:defRPr/>
             </a:pPr>
             <a:r>
-              <a:rPr lang="en-US" dirty="0"/>
+              <a:rPr lang="en-US"/>
               <a:t>Inheritance Run Amok?</a:t>
             </a:r>
           </a:p>
@@ -14799,4 +16588,224 @@
   <a:objectDefaults/>
   <a:extraClrSchemeLst/>
 </a:theme>
+</file>
+
+<file path=customXml/item1.xml><?xml version="1.0" encoding="utf-8"?>
+<?mso-contentType ?>
+<FormTemplates xmlns="http://schemas.microsoft.com/sharepoint/v3/contenttype/forms">
+  <Display>DocumentLibraryForm</Display>
+  <Edit>DocumentLibraryForm</Edit>
+  <New>DocumentLibraryForm</New>
+</FormTemplates>
+</file>
+
+<file path=customXml/item2.xml><?xml version="1.0" encoding="utf-8"?>
+<ct:contentTypeSchema xmlns:ct="http://schemas.microsoft.com/office/2006/metadata/contentType" xmlns:ma="http://schemas.microsoft.com/office/2006/metadata/properties/metaAttributes" ct:_="" ma:_="" ma:contentTypeName="Document" ma:contentTypeID="0x0101001570BCAAD2E4294F9443DCB038A55380" ma:contentTypeVersion="8" ma:contentTypeDescription="Create a new document." ma:contentTypeScope="" ma:versionID="9523c79d6bab9e2ad858b5223ec5ed94">
+  <xsd:schema xmlns:xsd="http://www.w3.org/2001/XMLSchema" xmlns:xs="http://www.w3.org/2001/XMLSchema" xmlns:p="http://schemas.microsoft.com/office/2006/metadata/properties" xmlns:ns2="201674f6-2bdd-4f13-ba1e-424e4aa70473" targetNamespace="http://schemas.microsoft.com/office/2006/metadata/properties" ma:root="true" ma:fieldsID="587afc94f70b507ec5be5f4d78229b0b" ns2:_="">
+    <xsd:import namespace="201674f6-2bdd-4f13-ba1e-424e4aa70473"/>
+    <xsd:element name="properties">
+      <xsd:complexType>
+        <xsd:sequence>
+          <xsd:element name="documentManagement">
+            <xsd:complexType>
+              <xsd:all>
+                <xsd:element ref="ns2:MediaServiceMetadata" minOccurs="0"/>
+                <xsd:element ref="ns2:MediaServiceFastMetadata" minOccurs="0"/>
+                <xsd:element ref="ns2:MediaServiceDateTaken" minOccurs="0"/>
+                <xsd:element ref="ns2:MediaServiceAutoTags" minOccurs="0"/>
+                <xsd:element ref="ns2:MediaLengthInSeconds" minOccurs="0"/>
+                <xsd:element ref="ns2:MediaServiceOCR" minOccurs="0"/>
+                <xsd:element ref="ns2:MediaServiceGenerationTime" minOccurs="0"/>
+                <xsd:element ref="ns2:MediaServiceEventHashCode" minOccurs="0"/>
+              </xsd:all>
+            </xsd:complexType>
+          </xsd:element>
+        </xsd:sequence>
+      </xsd:complexType>
+    </xsd:element>
+  </xsd:schema>
+  <xsd:schema xmlns:xsd="http://www.w3.org/2001/XMLSchema" xmlns:xs="http://www.w3.org/2001/XMLSchema" xmlns:dms="http://schemas.microsoft.com/office/2006/documentManagement/types" xmlns:pc="http://schemas.microsoft.com/office/infopath/2007/PartnerControls" targetNamespace="201674f6-2bdd-4f13-ba1e-424e4aa70473" elementFormDefault="qualified">
+    <xsd:import namespace="http://schemas.microsoft.com/office/2006/documentManagement/types"/>
+    <xsd:import namespace="http://schemas.microsoft.com/office/infopath/2007/PartnerControls"/>
+    <xsd:element name="MediaServiceMetadata" ma:index="8" nillable="true" ma:displayName="MediaServiceMetadata" ma:hidden="true" ma:internalName="MediaServiceMetadata" ma:readOnly="true">
+      <xsd:simpleType>
+        <xsd:restriction base="dms:Note"/>
+      </xsd:simpleType>
+    </xsd:element>
+    <xsd:element name="MediaServiceFastMetadata" ma:index="9" nillable="true" ma:displayName="MediaServiceFastMetadata" ma:hidden="true" ma:internalName="MediaServiceFastMetadata" ma:readOnly="true">
+      <xsd:simpleType>
+        <xsd:restriction base="dms:Note"/>
+      </xsd:simpleType>
+    </xsd:element>
+    <xsd:element name="MediaServiceDateTaken" ma:index="10" nillable="true" ma:displayName="MediaServiceDateTaken" ma:hidden="true" ma:internalName="MediaServiceDateTaken" ma:readOnly="true">
+      <xsd:simpleType>
+        <xsd:restriction base="dms:Text"/>
+      </xsd:simpleType>
+    </xsd:element>
+    <xsd:element name="MediaServiceAutoTags" ma:index="11" nillable="true" ma:displayName="Tags" ma:internalName="MediaServiceAutoTags" ma:readOnly="true">
+      <xsd:simpleType>
+        <xsd:restriction base="dms:Text"/>
+      </xsd:simpleType>
+    </xsd:element>
+    <xsd:element name="MediaLengthInSeconds" ma:index="12" nillable="true" ma:displayName="MediaLengthInSeconds" ma:hidden="true" ma:internalName="MediaLengthInSeconds" ma:readOnly="true">
+      <xsd:simpleType>
+        <xsd:restriction base="dms:Unknown"/>
+      </xsd:simpleType>
+    </xsd:element>
+    <xsd:element name="MediaServiceOCR" ma:index="13" nillable="true" ma:displayName="Extracted Text" ma:internalName="MediaServiceOCR" ma:readOnly="true">
+      <xsd:simpleType>
+        <xsd:restriction base="dms:Note">
+          <xsd:maxLength value="255"/>
+        </xsd:restriction>
+      </xsd:simpleType>
+    </xsd:element>
+    <xsd:element name="MediaServiceGenerationTime" ma:index="14" nillable="true" ma:displayName="MediaServiceGenerationTime" ma:hidden="true" ma:internalName="MediaServiceGenerationTime" ma:readOnly="true">
+      <xsd:simpleType>
+        <xsd:restriction base="dms:Text"/>
+      </xsd:simpleType>
+    </xsd:element>
+    <xsd:element name="MediaServiceEventHashCode" ma:index="15" nillable="true" ma:displayName="MediaServiceEventHashCode" ma:hidden="true" ma:internalName="MediaServiceEventHashCode" ma:readOnly="true">
+      <xsd:simpleType>
+        <xsd:restriction base="dms:Text"/>
+      </xsd:simpleType>
+    </xsd:element>
+  </xsd:schema>
+  <xsd:schema xmlns="http://schemas.openxmlformats.org/package/2006/metadata/core-properties" xmlns:xsd="http://www.w3.org/2001/XMLSchema" xmlns:xsi="http://www.w3.org/2001/XMLSchema-instance" xmlns:dc="http://purl.org/dc/elements/1.1/" xmlns:dcterms="http://purl.org/dc/terms/" xmlns:odoc="http://schemas.microsoft.com/internal/obd" targetNamespace="http://schemas.openxmlformats.org/package/2006/metadata/core-properties" elementFormDefault="qualified" attributeFormDefault="unqualified" blockDefault="#all">
+    <xsd:import namespace="http://purl.org/dc/elements/1.1/" schemaLocation="http://dublincore.org/schemas/xmls/qdc/2003/04/02/dc.xsd"/>
+    <xsd:import namespace="http://purl.org/dc/terms/" schemaLocation="http://dublincore.org/schemas/xmls/qdc/2003/04/02/dcterms.xsd"/>
+    <xsd:element name="coreProperties" type="CT_coreProperties"/>
+    <xsd:complexType name="CT_coreProperties">
+      <xsd:all>
+        <xsd:element ref="dc:creator" minOccurs="0" maxOccurs="1"/>
+        <xsd:element ref="dcterms:created" minOccurs="0" maxOccurs="1"/>
+        <xsd:element ref="dc:identifier" minOccurs="0" maxOccurs="1"/>
+        <xsd:element name="contentType" minOccurs="0" maxOccurs="1" type="xsd:string" ma:index="0" ma:displayName="Content Type"/>
+        <xsd:element ref="dc:title" minOccurs="0" maxOccurs="1" ma:index="4" ma:displayName="Title"/>
+        <xsd:element ref="dc:subject" minOccurs="0" maxOccurs="1"/>
+        <xsd:element ref="dc:description" minOccurs="0" maxOccurs="1"/>
+        <xsd:element name="keywords" minOccurs="0" maxOccurs="1" type="xsd:string"/>
+        <xsd:element ref="dc:language" minOccurs="0" maxOccurs="1"/>
+        <xsd:element name="category" minOccurs="0" maxOccurs="1" type="xsd:string"/>
+        <xsd:element name="version" minOccurs="0" maxOccurs="1" type="xsd:string"/>
+        <xsd:element name="revision" minOccurs="0" maxOccurs="1" type="xsd:string">
+          <xsd:annotation>
+            <xsd:documentation>
+                        This value indicates the number of saves or revisions. The application is responsible for updating this value after each revision.
+                    </xsd:documentation>
+          </xsd:annotation>
+        </xsd:element>
+        <xsd:element name="lastModifiedBy" minOccurs="0" maxOccurs="1" type="xsd:string"/>
+        <xsd:element ref="dcterms:modified" minOccurs="0" maxOccurs="1"/>
+        <xsd:element name="contentStatus" minOccurs="0" maxOccurs="1" type="xsd:string"/>
+      </xsd:all>
+    </xsd:complexType>
+  </xsd:schema>
+  <xs:schema xmlns:pc="http://schemas.microsoft.com/office/infopath/2007/PartnerControls" xmlns:xs="http://www.w3.org/2001/XMLSchema" targetNamespace="http://schemas.microsoft.com/office/infopath/2007/PartnerControls" elementFormDefault="qualified" attributeFormDefault="unqualified">
+    <xs:element name="Person">
+      <xs:complexType>
+        <xs:sequence>
+          <xs:element ref="pc:DisplayName" minOccurs="0"/>
+          <xs:element ref="pc:AccountId" minOccurs="0"/>
+          <xs:element ref="pc:AccountType" minOccurs="0"/>
+        </xs:sequence>
+      </xs:complexType>
+    </xs:element>
+    <xs:element name="DisplayName" type="xs:string"/>
+    <xs:element name="AccountId" type="xs:string"/>
+    <xs:element name="AccountType" type="xs:string"/>
+    <xs:element name="BDCAssociatedEntity">
+      <xs:complexType>
+        <xs:sequence>
+          <xs:element ref="pc:BDCEntity" minOccurs="0" maxOccurs="unbounded"/>
+        </xs:sequence>
+        <xs:attribute ref="pc:EntityNamespace"/>
+        <xs:attribute ref="pc:EntityName"/>
+        <xs:attribute ref="pc:SystemInstanceName"/>
+        <xs:attribute ref="pc:AssociationName"/>
+      </xs:complexType>
+    </xs:element>
+    <xs:attribute name="EntityNamespace" type="xs:string"/>
+    <xs:attribute name="EntityName" type="xs:string"/>
+    <xs:attribute name="SystemInstanceName" type="xs:string"/>
+    <xs:attribute name="AssociationName" type="xs:string"/>
+    <xs:element name="BDCEntity">
+      <xs:complexType>
+        <xs:sequence>
+          <xs:element ref="pc:EntityDisplayName" minOccurs="0"/>
+          <xs:element ref="pc:EntityInstanceReference" minOccurs="0"/>
+          <xs:element ref="pc:EntityId1" minOccurs="0"/>
+          <xs:element ref="pc:EntityId2" minOccurs="0"/>
+          <xs:element ref="pc:EntityId3" minOccurs="0"/>
+          <xs:element ref="pc:EntityId4" minOccurs="0"/>
+          <xs:element ref="pc:EntityId5" minOccurs="0"/>
+        </xs:sequence>
+      </xs:complexType>
+    </xs:element>
+    <xs:element name="EntityDisplayName" type="xs:string"/>
+    <xs:element name="EntityInstanceReference" type="xs:string"/>
+    <xs:element name="EntityId1" type="xs:string"/>
+    <xs:element name="EntityId2" type="xs:string"/>
+    <xs:element name="EntityId3" type="xs:string"/>
+    <xs:element name="EntityId4" type="xs:string"/>
+    <xs:element name="EntityId5" type="xs:string"/>
+    <xs:element name="Terms">
+      <xs:complexType>
+        <xs:sequence>
+          <xs:element ref="pc:TermInfo" minOccurs="0" maxOccurs="unbounded"/>
+        </xs:sequence>
+      </xs:complexType>
+    </xs:element>
+    <xs:element name="TermInfo">
+      <xs:complexType>
+        <xs:sequence>
+          <xs:element ref="pc:TermName" minOccurs="0"/>
+          <xs:element ref="pc:TermId" minOccurs="0"/>
+        </xs:sequence>
+      </xs:complexType>
+    </xs:element>
+    <xs:element name="TermName" type="xs:string"/>
+    <xs:element name="TermId" type="xs:string"/>
+  </xs:schema>
+</ct:contentTypeSchema>
+</file>
+
+<file path=customXml/item3.xml><?xml version="1.0" encoding="utf-8"?>
+<p:properties xmlns:p="http://schemas.microsoft.com/office/2006/metadata/properties" xmlns:xsi="http://www.w3.org/2001/XMLSchema-instance" xmlns:pc="http://schemas.microsoft.com/office/infopath/2007/PartnerControls">
+  <documentManagement/>
+</p:properties>
+</file>
+
+<file path=customXml/itemProps1.xml><?xml version="1.0" encoding="utf-8"?>
+<ds:datastoreItem xmlns:ds="http://schemas.openxmlformats.org/officeDocument/2006/customXml" ds:itemID="{3C4378FB-03E6-44FD-B96F-DE665721A11C}">
+  <ds:schemaRefs>
+    <ds:schemaRef ds:uri="http://schemas.microsoft.com/sharepoint/v3/contenttype/forms"/>
+  </ds:schemaRefs>
+</ds:datastoreItem>
+</file>
+
+<file path=customXml/itemProps2.xml><?xml version="1.0" encoding="utf-8"?>
+<ds:datastoreItem xmlns:ds="http://schemas.openxmlformats.org/officeDocument/2006/customXml" ds:itemID="{60F9EA22-5825-4E8D-9432-59C9592C3427}">
+  <ds:schemaRefs>
+    <ds:schemaRef ds:uri="http://schemas.microsoft.com/office/2006/metadata/contentType"/>
+    <ds:schemaRef ds:uri="http://schemas.microsoft.com/office/2006/metadata/properties/metaAttributes"/>
+    <ds:schemaRef ds:uri="http://www.w3.org/2001/XMLSchema"/>
+    <ds:schemaRef ds:uri="http://schemas.microsoft.com/office/2006/metadata/properties"/>
+    <ds:schemaRef ds:uri="201674f6-2bdd-4f13-ba1e-424e4aa70473"/>
+    <ds:schemaRef ds:uri="http://schemas.microsoft.com/office/2006/documentManagement/types"/>
+    <ds:schemaRef ds:uri="http://schemas.microsoft.com/office/infopath/2007/PartnerControls"/>
+    <ds:schemaRef ds:uri="http://schemas.openxmlformats.org/package/2006/metadata/core-properties"/>
+    <ds:schemaRef ds:uri="http://purl.org/dc/elements/1.1/"/>
+    <ds:schemaRef ds:uri="http://purl.org/dc/terms/"/>
+    <ds:schemaRef ds:uri="http://schemas.microsoft.com/internal/obd"/>
+  </ds:schemaRefs>
+</ds:datastoreItem>
+</file>
+
+<file path=customXml/itemProps3.xml><?xml version="1.0" encoding="utf-8"?>
+<ds:datastoreItem xmlns:ds="http://schemas.openxmlformats.org/officeDocument/2006/customXml" ds:itemID="{72D20C57-C3B5-47E7-874B-37927E7B7865}">
+  <ds:schemaRefs>
+    <ds:schemaRef ds:uri="http://schemas.microsoft.com/office/2006/metadata/properties"/>
+    <ds:schemaRef ds:uri="http://schemas.microsoft.com/office/infopath/2007/PartnerControls"/>
+  </ds:schemaRefs>
+</ds:datastoreItem>
 </file>
</xml_diff>